<commit_message>
DungTT submit: Docs release for phase 1 - Core MQTT Broker
</commit_message>
<xml_diff>
--- a/Docs/Referrences/Actor_Model.pptx
+++ b/Docs/Referrences/Actor_Model.pptx
@@ -6,6 +6,7 @@
   </p:sldMasterIdLst>
   <p:sldIdLst>
     <p:sldId id="256" r:id="rId2"/>
+    <p:sldId id="257" r:id="rId3"/>
   </p:sldIdLst>
   <p:sldSz cx="12192000" cy="6858000"/>
   <p:notesSz cx="6858000" cy="9144000"/>
@@ -104,6 +105,11 @@
       </a:defRPr>
     </a:lvl9pPr>
   </p:defaultTextStyle>
+  <p:extLst>
+    <p:ext uri="{EFAFB233-063F-42B5-8137-9DF3F51BA10A}">
+      <p15:sldGuideLst xmlns:p15="http://schemas.microsoft.com/office/powerpoint/2012/main"/>
+    </p:ext>
+  </p:extLst>
 </p:presentation>
 </file>
 
@@ -254,7 +260,7 @@
           <a:p>
             <a:fld id="{3840422F-E917-43B4-AE88-1B2B9C1E7A6B}" type="datetimeFigureOut">
               <a:rPr lang="en-US" smtClean="0"/>
-              <a:t>7/14/2022</a:t>
+              <a:t>7/19/2022</a:t>
             </a:fld>
             <a:endParaRPr lang="en-US"/>
           </a:p>
@@ -452,7 +458,7 @@
           <a:p>
             <a:fld id="{3840422F-E917-43B4-AE88-1B2B9C1E7A6B}" type="datetimeFigureOut">
               <a:rPr lang="en-US" smtClean="0"/>
-              <a:t>7/14/2022</a:t>
+              <a:t>7/19/2022</a:t>
             </a:fld>
             <a:endParaRPr lang="en-US"/>
           </a:p>
@@ -660,7 +666,7 @@
           <a:p>
             <a:fld id="{3840422F-E917-43B4-AE88-1B2B9C1E7A6B}" type="datetimeFigureOut">
               <a:rPr lang="en-US" smtClean="0"/>
-              <a:t>7/14/2022</a:t>
+              <a:t>7/19/2022</a:t>
             </a:fld>
             <a:endParaRPr lang="en-US"/>
           </a:p>
@@ -858,7 +864,7 @@
           <a:p>
             <a:fld id="{3840422F-E917-43B4-AE88-1B2B9C1E7A6B}" type="datetimeFigureOut">
               <a:rPr lang="en-US" smtClean="0"/>
-              <a:t>7/14/2022</a:t>
+              <a:t>7/19/2022</a:t>
             </a:fld>
             <a:endParaRPr lang="en-US"/>
           </a:p>
@@ -1133,7 +1139,7 @@
           <a:p>
             <a:fld id="{3840422F-E917-43B4-AE88-1B2B9C1E7A6B}" type="datetimeFigureOut">
               <a:rPr lang="en-US" smtClean="0"/>
-              <a:t>7/14/2022</a:t>
+              <a:t>7/19/2022</a:t>
             </a:fld>
             <a:endParaRPr lang="en-US"/>
           </a:p>
@@ -1398,7 +1404,7 @@
           <a:p>
             <a:fld id="{3840422F-E917-43B4-AE88-1B2B9C1E7A6B}" type="datetimeFigureOut">
               <a:rPr lang="en-US" smtClean="0"/>
-              <a:t>7/14/2022</a:t>
+              <a:t>7/19/2022</a:t>
             </a:fld>
             <a:endParaRPr lang="en-US"/>
           </a:p>
@@ -1810,7 +1816,7 @@
           <a:p>
             <a:fld id="{3840422F-E917-43B4-AE88-1B2B9C1E7A6B}" type="datetimeFigureOut">
               <a:rPr lang="en-US" smtClean="0"/>
-              <a:t>7/14/2022</a:t>
+              <a:t>7/19/2022</a:t>
             </a:fld>
             <a:endParaRPr lang="en-US"/>
           </a:p>
@@ -1951,7 +1957,7 @@
           <a:p>
             <a:fld id="{3840422F-E917-43B4-AE88-1B2B9C1E7A6B}" type="datetimeFigureOut">
               <a:rPr lang="en-US" smtClean="0"/>
-              <a:t>7/14/2022</a:t>
+              <a:t>7/19/2022</a:t>
             </a:fld>
             <a:endParaRPr lang="en-US"/>
           </a:p>
@@ -2064,7 +2070,7 @@
           <a:p>
             <a:fld id="{3840422F-E917-43B4-AE88-1B2B9C1E7A6B}" type="datetimeFigureOut">
               <a:rPr lang="en-US" smtClean="0"/>
-              <a:t>7/14/2022</a:t>
+              <a:t>7/19/2022</a:t>
             </a:fld>
             <a:endParaRPr lang="en-US"/>
           </a:p>
@@ -2375,7 +2381,7 @@
           <a:p>
             <a:fld id="{3840422F-E917-43B4-AE88-1B2B9C1E7A6B}" type="datetimeFigureOut">
               <a:rPr lang="en-US" smtClean="0"/>
-              <a:t>7/14/2022</a:t>
+              <a:t>7/19/2022</a:t>
             </a:fld>
             <a:endParaRPr lang="en-US"/>
           </a:p>
@@ -2663,7 +2669,7 @@
           <a:p>
             <a:fld id="{3840422F-E917-43B4-AE88-1B2B9C1E7A6B}" type="datetimeFigureOut">
               <a:rPr lang="en-US" smtClean="0"/>
-              <a:t>7/14/2022</a:t>
+              <a:t>7/19/2022</a:t>
             </a:fld>
             <a:endParaRPr lang="en-US"/>
           </a:p>
@@ -2904,7 +2910,7 @@
           <a:p>
             <a:fld id="{3840422F-E917-43B4-AE88-1B2B9C1E7A6B}" type="datetimeFigureOut">
               <a:rPr lang="en-US" smtClean="0"/>
-              <a:t>7/14/2022</a:t>
+              <a:t>7/19/2022</a:t>
             </a:fld>
             <a:endParaRPr lang="en-US"/>
           </a:p>
@@ -3493,10 +3499,9 @@
           <a:p>
             <a:pPr algn="ctr"/>
             <a:r>
-              <a:rPr lang="en-US" sz="1300" b="1" dirty="0" err="1"/>
+              <a:rPr lang="en-US" sz="1300" b="1"/>
               <a:t>TCPConnectionActor</a:t>
             </a:r>
-            <a:endParaRPr lang="en-US" sz="1300" b="1" dirty="0"/>
           </a:p>
         </p:txBody>
       </p:sp>
@@ -3551,10 +3556,10 @@
           <a:p>
             <a:pPr algn="ctr"/>
             <a:r>
-              <a:rPr lang="en-US" sz="1300" b="1" dirty="0" err="1"/>
+              <a:rPr lang="en-US" sz="1300" b="1" err="1"/>
               <a:t>EventHandler</a:t>
             </a:r>
-            <a:endParaRPr lang="en-US" sz="1300" b="1" dirty="0"/>
+            <a:endParaRPr lang="en-US" sz="1300" b="1"/>
           </a:p>
         </p:txBody>
       </p:sp>
@@ -3609,10 +3614,10 @@
           <a:p>
             <a:pPr algn="ctr"/>
             <a:r>
-              <a:rPr lang="en-US" sz="1300" b="1" dirty="0" err="1"/>
+              <a:rPr lang="en-US" sz="1300" b="1" err="1"/>
               <a:t>MqttConnectionActor</a:t>
             </a:r>
-            <a:endParaRPr lang="en-US" sz="1300" b="1" dirty="0"/>
+            <a:endParaRPr lang="en-US" sz="1300" b="1"/>
           </a:p>
         </p:txBody>
       </p:sp>
@@ -3667,10 +3672,10 @@
           <a:p>
             <a:pPr algn="ctr"/>
             <a:r>
-              <a:rPr lang="en-US" sz="1300" b="1" dirty="0" err="1"/>
+              <a:rPr lang="en-US" sz="1300" b="1" err="1"/>
               <a:t>PacketTransformer</a:t>
             </a:r>
-            <a:endParaRPr lang="en-US" sz="1300" b="1" dirty="0"/>
+            <a:endParaRPr lang="en-US" sz="1300" b="1"/>
           </a:p>
         </p:txBody>
       </p:sp>
@@ -3725,10 +3730,10 @@
           <a:p>
             <a:pPr algn="ctr"/>
             <a:r>
-              <a:rPr lang="en-US" sz="1300" b="1" dirty="0" err="1"/>
+              <a:rPr lang="en-US" sz="1300" b="1" err="1"/>
               <a:t>SessionManager</a:t>
             </a:r>
-            <a:endParaRPr lang="en-US" sz="1300" b="1" dirty="0"/>
+            <a:endParaRPr lang="en-US" sz="1300" b="1"/>
           </a:p>
         </p:txBody>
       </p:sp>
@@ -3783,10 +3788,10 @@
           <a:p>
             <a:pPr algn="ctr"/>
             <a:r>
-              <a:rPr lang="en-US" sz="1300" b="1" dirty="0" err="1"/>
+              <a:rPr lang="en-US" sz="1300" b="1" err="1"/>
               <a:t>SessionHandler</a:t>
             </a:r>
-            <a:endParaRPr lang="en-US" sz="1300" b="1" dirty="0"/>
+            <a:endParaRPr lang="en-US" sz="1300" b="1"/>
           </a:p>
         </p:txBody>
       </p:sp>
@@ -3863,7 +3868,7 @@
           <a:lstStyle/>
           <a:p>
             <a:r>
-              <a:rPr lang="en-US" sz="1200" dirty="0"/>
+              <a:rPr lang="en-US" sz="1200"/>
               <a:t>Packet Stream</a:t>
             </a:r>
           </a:p>
@@ -3899,14 +3904,14 @@
           <a:p>
             <a:pPr algn="ctr"/>
             <a:r>
-              <a:rPr lang="en-US" sz="1200" dirty="0"/>
+              <a:rPr lang="en-US" sz="1200"/>
               <a:t>+ 1 Connection</a:t>
             </a:r>
           </a:p>
           <a:p>
             <a:pPr algn="ctr"/>
             <a:r>
-              <a:rPr lang="en-US" sz="1200" dirty="0"/>
+              <a:rPr lang="en-US" sz="1200"/>
               <a:t>Create new Actor</a:t>
             </a:r>
           </a:p>
@@ -3984,14 +3989,14 @@
           <a:lstStyle/>
           <a:p>
             <a:r>
-              <a:rPr lang="en-US" sz="1200" dirty="0"/>
+              <a:rPr lang="en-US" sz="1200"/>
               <a:t>! packet </a:t>
             </a:r>
             <a:r>
-              <a:rPr lang="en-US" sz="1200" dirty="0" err="1"/>
+              <a:rPr lang="en-US" sz="1200" err="1"/>
               <a:t>infor</a:t>
             </a:r>
-            <a:endParaRPr lang="en-US" sz="1200" dirty="0"/>
+            <a:endParaRPr lang="en-US" sz="1200"/>
           </a:p>
         </p:txBody>
       </p:sp>
@@ -4024,13 +4029,13 @@
           <a:lstStyle/>
           <a:p>
             <a:r>
-              <a:rPr lang="en-US" sz="1200" dirty="0"/>
+              <a:rPr lang="en-US" sz="1200"/>
               <a:t>+ Packet valid</a:t>
             </a:r>
           </a:p>
           <a:p>
             <a:r>
-              <a:rPr lang="en-US" sz="1200" dirty="0"/>
+              <a:rPr lang="en-US" sz="1200"/>
               <a:t>Create new Actor</a:t>
             </a:r>
           </a:p>
@@ -4109,21 +4114,21 @@
           <a:lstStyle/>
           <a:p>
             <a:r>
-              <a:rPr lang="en-US" sz="1200" dirty="0"/>
+              <a:rPr lang="en-US" sz="1200"/>
               <a:t>? New </a:t>
             </a:r>
             <a:r>
-              <a:rPr lang="en-US" sz="1200" dirty="0" err="1"/>
+              <a:rPr lang="en-US" sz="1200" err="1"/>
               <a:t>SessionHandler</a:t>
             </a:r>
             <a:r>
-              <a:rPr lang="en-US" sz="1200" dirty="0"/>
+              <a:rPr lang="en-US" sz="1200"/>
               <a:t> Actor </a:t>
             </a:r>
           </a:p>
           <a:p>
             <a:r>
-              <a:rPr lang="en-US" sz="1200" dirty="0"/>
+              <a:rPr lang="en-US" sz="1200"/>
               <a:t>to Handle new Connection</a:t>
             </a:r>
           </a:p>
@@ -4158,13 +4163,13 @@
           <a:lstStyle/>
           <a:p>
             <a:r>
-              <a:rPr lang="en-US" sz="1200" dirty="0"/>
+              <a:rPr lang="en-US" sz="1200"/>
               <a:t>+ New device</a:t>
             </a:r>
           </a:p>
           <a:p>
             <a:r>
-              <a:rPr lang="en-US" sz="1200" dirty="0"/>
+              <a:rPr lang="en-US" sz="1200"/>
               <a:t>Create new Actor</a:t>
             </a:r>
           </a:p>
@@ -4242,7 +4247,7 @@
           <a:lstStyle/>
           <a:p>
             <a:r>
-              <a:rPr lang="en-US" sz="1200" dirty="0"/>
+              <a:rPr lang="en-US" sz="1200"/>
               <a:t>Receive raw packets</a:t>
             </a:r>
           </a:p>
@@ -4320,7 +4325,7 @@
           <a:lstStyle/>
           <a:p>
             <a:r>
-              <a:rPr lang="en-US" sz="1200" dirty="0"/>
+              <a:rPr lang="en-US" sz="1200"/>
               <a:t>Analyze packets</a:t>
             </a:r>
           </a:p>
@@ -4355,7 +4360,7 @@
           <a:lstStyle/>
           <a:p>
             <a:r>
-              <a:rPr lang="en-US" sz="1200" dirty="0"/>
+              <a:rPr lang="en-US" sz="1200"/>
               <a:t>Distribute packets</a:t>
             </a:r>
           </a:p>
@@ -4477,7 +4482,7 @@
           <a:lstStyle/>
           <a:p>
             <a:r>
-              <a:rPr lang="en-US" sz="1200" dirty="0"/>
+              <a:rPr lang="en-US" sz="1200"/>
               <a:t>Receive analyzed packets</a:t>
             </a:r>
           </a:p>
@@ -4555,21 +4560,21 @@
           <a:lstStyle/>
           <a:p>
             <a:r>
-              <a:rPr lang="en-US" sz="1200" dirty="0"/>
+              <a:rPr lang="en-US" sz="1200"/>
               <a:t>If connection: request to create </a:t>
             </a:r>
           </a:p>
           <a:p>
             <a:r>
-              <a:rPr lang="en-US" sz="1200" dirty="0"/>
+              <a:rPr lang="en-US" sz="1200"/>
               <a:t>new </a:t>
             </a:r>
             <a:r>
-              <a:rPr lang="en-US" sz="1200" dirty="0" err="1"/>
+              <a:rPr lang="en-US" sz="1200" err="1"/>
               <a:t>SessionHandler</a:t>
             </a:r>
             <a:r>
-              <a:rPr lang="en-US" sz="1200" dirty="0"/>
+              <a:rPr lang="en-US" sz="1200"/>
               <a:t> Actor </a:t>
             </a:r>
           </a:p>
@@ -4604,7 +4609,7 @@
           <a:lstStyle/>
           <a:p>
             <a:r>
-              <a:rPr lang="en-US" sz="1200" dirty="0"/>
+              <a:rPr lang="en-US" sz="1200"/>
               <a:t>Receive analyzed packets</a:t>
             </a:r>
           </a:p>
@@ -4683,17 +4688,17 @@
           <a:lstStyle/>
           <a:p>
             <a:r>
-              <a:rPr lang="en-US" sz="1300" dirty="0"/>
+              <a:rPr lang="en-US" sz="1300"/>
               <a:t>Check and create new </a:t>
             </a:r>
           </a:p>
           <a:p>
             <a:r>
-              <a:rPr lang="en-US" sz="1300" dirty="0" err="1"/>
+              <a:rPr lang="en-US" sz="1300" err="1"/>
               <a:t>SessionHandler</a:t>
             </a:r>
             <a:r>
-              <a:rPr lang="en-US" sz="1300" dirty="0"/>
+              <a:rPr lang="en-US" sz="1300"/>
               <a:t> Actor</a:t>
             </a:r>
           </a:p>
@@ -4952,7 +4957,7 @@
           <a:lstStyle/>
           <a:p>
             <a:r>
-              <a:rPr lang="en-US" sz="1300" dirty="0"/>
+              <a:rPr lang="en-US" sz="1300"/>
               <a:t>Listen to devices</a:t>
             </a:r>
           </a:p>
@@ -4987,15 +4992,15 @@
           <a:lstStyle/>
           <a:p>
             <a:r>
-              <a:rPr lang="en-US" sz="1300" dirty="0"/>
+              <a:rPr lang="en-US" sz="1300"/>
               <a:t>Stream raw data to </a:t>
             </a:r>
             <a:r>
-              <a:rPr lang="en-US" sz="1300" dirty="0" err="1"/>
+              <a:rPr lang="en-US" sz="1300" err="1"/>
               <a:t>PacketTransformer</a:t>
             </a:r>
             <a:r>
-              <a:rPr lang="en-US" sz="1300" dirty="0"/>
+              <a:rPr lang="en-US" sz="1300"/>
               <a:t> </a:t>
             </a:r>
           </a:p>
@@ -5108,7 +5113,7 @@
           <a:lstStyle/>
           <a:p>
             <a:r>
-              <a:rPr lang="en-US" sz="1300" dirty="0"/>
+              <a:rPr lang="en-US" sz="1300"/>
               <a:t>Implement tasks for each packet</a:t>
             </a:r>
           </a:p>
@@ -5143,7 +5148,7 @@
           <a:lstStyle/>
           <a:p>
             <a:r>
-              <a:rPr lang="en-US" sz="1300" dirty="0"/>
+              <a:rPr lang="en-US" sz="1300"/>
               <a:t>Classify packet</a:t>
             </a:r>
           </a:p>
@@ -5178,14 +5183,14 @@
           <a:lstStyle/>
           <a:p>
             <a:r>
-              <a:rPr lang="en-US" sz="1300" dirty="0"/>
+              <a:rPr lang="en-US" sz="1300"/>
               <a:t>Get packet’s </a:t>
             </a:r>
             <a:r>
-              <a:rPr lang="en-US" sz="1300" dirty="0" err="1"/>
+              <a:rPr lang="en-US" sz="1300" err="1"/>
               <a:t>infor</a:t>
             </a:r>
-            <a:endParaRPr lang="en-US" sz="1300" dirty="0"/>
+            <a:endParaRPr lang="en-US" sz="1300"/>
           </a:p>
         </p:txBody>
       </p:sp>
@@ -5240,6 +5245,2375 @@
     <p:extLst>
       <p:ext uri="{BB962C8B-B14F-4D97-AF65-F5344CB8AC3E}">
         <p14:creationId xmlns:p14="http://schemas.microsoft.com/office/powerpoint/2010/main" val="473801754"/>
+      </p:ext>
+    </p:extLst>
+  </p:cSld>
+  <p:clrMapOvr>
+    <a:masterClrMapping/>
+  </p:clrMapOvr>
+</p:sld>
+</file>
+
+<file path=ppt/slides/slide2.xml><?xml version="1.0" encoding="utf-8"?>
+<p:sld xmlns:a="http://schemas.openxmlformats.org/drawingml/2006/main" xmlns:r="http://schemas.openxmlformats.org/officeDocument/2006/relationships" xmlns:p="http://schemas.openxmlformats.org/presentationml/2006/main">
+  <p:cSld>
+    <p:spTree>
+      <p:nvGrpSpPr>
+        <p:cNvPr id="1" name=""/>
+        <p:cNvGrpSpPr/>
+        <p:nvPr/>
+      </p:nvGrpSpPr>
+      <p:grpSpPr>
+        <a:xfrm>
+          <a:off x="0" y="0"/>
+          <a:ext cx="0" cy="0"/>
+          <a:chOff x="0" y="0"/>
+          <a:chExt cx="0" cy="0"/>
+        </a:xfrm>
+      </p:grpSpPr>
+      <p:sp>
+        <p:nvSpPr>
+          <p:cNvPr id="4" name="Oval 3">
+            <a:extLst>
+              <a:ext uri="{FF2B5EF4-FFF2-40B4-BE49-F238E27FC236}">
+                <a16:creationId xmlns:a16="http://schemas.microsoft.com/office/drawing/2014/main" id="{520CF227-8246-1B88-0B45-03BF8B9133F4}"/>
+              </a:ext>
+            </a:extLst>
+          </p:cNvPr>
+          <p:cNvSpPr/>
+          <p:nvPr/>
+        </p:nvSpPr>
+        <p:spPr>
+          <a:xfrm>
+            <a:off x="3712980" y="410107"/>
+            <a:ext cx="2347784" cy="733168"/>
+          </a:xfrm>
+          <a:prstGeom prst="ellipse">
+            <a:avLst/>
+          </a:prstGeom>
+          <a:noFill/>
+          <a:ln w="28575" cap="flat" cmpd="sng" algn="ctr">
+            <a:solidFill>
+              <a:schemeClr val="dk1"/>
+            </a:solidFill>
+            <a:prstDash val="solid"/>
+            <a:round/>
+            <a:headEnd type="none" w="med" len="med"/>
+            <a:tailEnd type="none" w="med" len="med"/>
+          </a:ln>
+        </p:spPr>
+        <p:style>
+          <a:lnRef idx="0">
+            <a:scrgbClr r="0" g="0" b="0"/>
+          </a:lnRef>
+          <a:fillRef idx="0">
+            <a:scrgbClr r="0" g="0" b="0"/>
+          </a:fillRef>
+          <a:effectRef idx="0">
+            <a:scrgbClr r="0" g="0" b="0"/>
+          </a:effectRef>
+          <a:fontRef idx="minor">
+            <a:schemeClr val="dk1"/>
+          </a:fontRef>
+        </p:style>
+        <p:txBody>
+          <a:bodyPr rtlCol="0" anchor="ctr"/>
+          <a:lstStyle/>
+          <a:p>
+            <a:pPr algn="ctr"/>
+            <a:r>
+              <a:rPr lang="en-US" sz="1300" b="1"/>
+              <a:t>TCPConnectionActor</a:t>
+            </a:r>
+          </a:p>
+        </p:txBody>
+      </p:sp>
+      <p:sp>
+        <p:nvSpPr>
+          <p:cNvPr id="5" name="Oval 4">
+            <a:extLst>
+              <a:ext uri="{FF2B5EF4-FFF2-40B4-BE49-F238E27FC236}">
+                <a16:creationId xmlns:a16="http://schemas.microsoft.com/office/drawing/2014/main" id="{E793D8B9-7C10-A1FF-ECE8-4100D8413501}"/>
+              </a:ext>
+            </a:extLst>
+          </p:cNvPr>
+          <p:cNvSpPr/>
+          <p:nvPr/>
+        </p:nvSpPr>
+        <p:spPr>
+          <a:xfrm>
+            <a:off x="2739884" y="1806606"/>
+            <a:ext cx="1822623" cy="636374"/>
+          </a:xfrm>
+          <a:prstGeom prst="ellipse">
+            <a:avLst/>
+          </a:prstGeom>
+          <a:noFill/>
+          <a:ln w="28575" cap="flat" cmpd="sng" algn="ctr">
+            <a:solidFill>
+              <a:schemeClr val="dk1"/>
+            </a:solidFill>
+            <a:prstDash val="solid"/>
+            <a:round/>
+            <a:headEnd type="none" w="med" len="med"/>
+            <a:tailEnd type="none" w="med" len="med"/>
+          </a:ln>
+        </p:spPr>
+        <p:style>
+          <a:lnRef idx="0">
+            <a:scrgbClr r="0" g="0" b="0"/>
+          </a:lnRef>
+          <a:fillRef idx="0">
+            <a:scrgbClr r="0" g="0" b="0"/>
+          </a:fillRef>
+          <a:effectRef idx="0">
+            <a:scrgbClr r="0" g="0" b="0"/>
+          </a:effectRef>
+          <a:fontRef idx="minor">
+            <a:schemeClr val="dk1"/>
+          </a:fontRef>
+        </p:style>
+        <p:txBody>
+          <a:bodyPr rtlCol="0" anchor="ctr"/>
+          <a:lstStyle/>
+          <a:p>
+            <a:pPr algn="ctr"/>
+            <a:r>
+              <a:rPr lang="en-US" sz="1300" b="1" err="1"/>
+              <a:t>EventHandler</a:t>
+            </a:r>
+            <a:endParaRPr lang="en-US" sz="1300" b="1"/>
+          </a:p>
+        </p:txBody>
+      </p:sp>
+      <p:sp>
+        <p:nvSpPr>
+          <p:cNvPr id="6" name="Oval 5">
+            <a:extLst>
+              <a:ext uri="{FF2B5EF4-FFF2-40B4-BE49-F238E27FC236}">
+                <a16:creationId xmlns:a16="http://schemas.microsoft.com/office/drawing/2014/main" id="{38D779C5-B302-6C0E-D06D-20C9849D6438}"/>
+              </a:ext>
+            </a:extLst>
+          </p:cNvPr>
+          <p:cNvSpPr/>
+          <p:nvPr/>
+        </p:nvSpPr>
+        <p:spPr>
+          <a:xfrm>
+            <a:off x="3788699" y="4791832"/>
+            <a:ext cx="2505330" cy="733168"/>
+          </a:xfrm>
+          <a:prstGeom prst="ellipse">
+            <a:avLst/>
+          </a:prstGeom>
+          <a:noFill/>
+          <a:ln w="28575" cap="flat" cmpd="sng" algn="ctr">
+            <a:solidFill>
+              <a:schemeClr val="dk1"/>
+            </a:solidFill>
+            <a:prstDash val="solid"/>
+            <a:round/>
+            <a:headEnd type="none" w="med" len="med"/>
+            <a:tailEnd type="none" w="med" len="med"/>
+          </a:ln>
+        </p:spPr>
+        <p:style>
+          <a:lnRef idx="0">
+            <a:scrgbClr r="0" g="0" b="0"/>
+          </a:lnRef>
+          <a:fillRef idx="0">
+            <a:scrgbClr r="0" g="0" b="0"/>
+          </a:fillRef>
+          <a:effectRef idx="0">
+            <a:scrgbClr r="0" g="0" b="0"/>
+          </a:effectRef>
+          <a:fontRef idx="minor">
+            <a:schemeClr val="dk1"/>
+          </a:fontRef>
+        </p:style>
+        <p:txBody>
+          <a:bodyPr rtlCol="0" anchor="ctr"/>
+          <a:lstStyle/>
+          <a:p>
+            <a:pPr algn="ctr"/>
+            <a:r>
+              <a:rPr lang="en-US" sz="1300" b="1" err="1"/>
+              <a:t>MqttConnectionActor</a:t>
+            </a:r>
+            <a:endParaRPr lang="en-US" sz="1300" b="1"/>
+          </a:p>
+        </p:txBody>
+      </p:sp>
+      <p:sp>
+        <p:nvSpPr>
+          <p:cNvPr id="7" name="Oval 6">
+            <a:extLst>
+              <a:ext uri="{FF2B5EF4-FFF2-40B4-BE49-F238E27FC236}">
+                <a16:creationId xmlns:a16="http://schemas.microsoft.com/office/drawing/2014/main" id="{4F5241F0-74D0-D1B7-BE27-58F478B44262}"/>
+              </a:ext>
+            </a:extLst>
+          </p:cNvPr>
+          <p:cNvSpPr/>
+          <p:nvPr/>
+        </p:nvSpPr>
+        <p:spPr>
+          <a:xfrm>
+            <a:off x="6745306" y="2286720"/>
+            <a:ext cx="2197445" cy="636374"/>
+          </a:xfrm>
+          <a:prstGeom prst="ellipse">
+            <a:avLst/>
+          </a:prstGeom>
+          <a:noFill/>
+          <a:ln w="28575" cap="flat" cmpd="sng" algn="ctr">
+            <a:solidFill>
+              <a:schemeClr val="dk1"/>
+            </a:solidFill>
+            <a:prstDash val="solid"/>
+            <a:round/>
+            <a:headEnd type="none" w="med" len="med"/>
+            <a:tailEnd type="none" w="med" len="med"/>
+          </a:ln>
+        </p:spPr>
+        <p:style>
+          <a:lnRef idx="0">
+            <a:scrgbClr r="0" g="0" b="0"/>
+          </a:lnRef>
+          <a:fillRef idx="0">
+            <a:scrgbClr r="0" g="0" b="0"/>
+          </a:fillRef>
+          <a:effectRef idx="0">
+            <a:scrgbClr r="0" g="0" b="0"/>
+          </a:effectRef>
+          <a:fontRef idx="minor">
+            <a:schemeClr val="dk1"/>
+          </a:fontRef>
+        </p:style>
+        <p:txBody>
+          <a:bodyPr rtlCol="0" anchor="ctr"/>
+          <a:lstStyle/>
+          <a:p>
+            <a:pPr algn="ctr"/>
+            <a:r>
+              <a:rPr lang="en-US" sz="1300" b="1" err="1"/>
+              <a:t>PacketTransformer</a:t>
+            </a:r>
+            <a:endParaRPr lang="en-US" sz="1300" b="1"/>
+          </a:p>
+        </p:txBody>
+      </p:sp>
+      <p:sp>
+        <p:nvSpPr>
+          <p:cNvPr id="8" name="Oval 7">
+            <a:extLst>
+              <a:ext uri="{FF2B5EF4-FFF2-40B4-BE49-F238E27FC236}">
+                <a16:creationId xmlns:a16="http://schemas.microsoft.com/office/drawing/2014/main" id="{ACFB14D4-1DE2-CD62-191C-6E6355E32ABA}"/>
+              </a:ext>
+            </a:extLst>
+          </p:cNvPr>
+          <p:cNvSpPr/>
+          <p:nvPr/>
+        </p:nvSpPr>
+        <p:spPr>
+          <a:xfrm>
+            <a:off x="191304" y="1758210"/>
+            <a:ext cx="2347784" cy="733168"/>
+          </a:xfrm>
+          <a:prstGeom prst="ellipse">
+            <a:avLst/>
+          </a:prstGeom>
+          <a:noFill/>
+          <a:ln w="28575" cap="flat" cmpd="sng" algn="ctr">
+            <a:solidFill>
+              <a:schemeClr val="dk1"/>
+            </a:solidFill>
+            <a:prstDash val="solid"/>
+            <a:round/>
+            <a:headEnd type="none" w="med" len="med"/>
+            <a:tailEnd type="none" w="med" len="med"/>
+          </a:ln>
+        </p:spPr>
+        <p:style>
+          <a:lnRef idx="0">
+            <a:scrgbClr r="0" g="0" b="0"/>
+          </a:lnRef>
+          <a:fillRef idx="0">
+            <a:scrgbClr r="0" g="0" b="0"/>
+          </a:fillRef>
+          <a:effectRef idx="0">
+            <a:scrgbClr r="0" g="0" b="0"/>
+          </a:effectRef>
+          <a:fontRef idx="minor">
+            <a:schemeClr val="dk1"/>
+          </a:fontRef>
+        </p:style>
+        <p:txBody>
+          <a:bodyPr rtlCol="0" anchor="ctr"/>
+          <a:lstStyle/>
+          <a:p>
+            <a:pPr algn="ctr"/>
+            <a:r>
+              <a:rPr lang="en-US" sz="1300" b="1" err="1"/>
+              <a:t>SessionManager</a:t>
+            </a:r>
+            <a:endParaRPr lang="en-US" sz="1300" b="1"/>
+          </a:p>
+        </p:txBody>
+      </p:sp>
+      <p:sp>
+        <p:nvSpPr>
+          <p:cNvPr id="9" name="Oval 8">
+            <a:extLst>
+              <a:ext uri="{FF2B5EF4-FFF2-40B4-BE49-F238E27FC236}">
+                <a16:creationId xmlns:a16="http://schemas.microsoft.com/office/drawing/2014/main" id="{9866ACD9-C9D5-B07F-FFDF-287000A8AD5D}"/>
+              </a:ext>
+            </a:extLst>
+          </p:cNvPr>
+          <p:cNvSpPr/>
+          <p:nvPr/>
+        </p:nvSpPr>
+        <p:spPr>
+          <a:xfrm>
+            <a:off x="3169329" y="2963045"/>
+            <a:ext cx="2347784" cy="733168"/>
+          </a:xfrm>
+          <a:prstGeom prst="ellipse">
+            <a:avLst/>
+          </a:prstGeom>
+          <a:noFill/>
+          <a:ln w="28575" cap="flat" cmpd="sng" algn="ctr">
+            <a:solidFill>
+              <a:schemeClr val="dk1"/>
+            </a:solidFill>
+            <a:prstDash val="solid"/>
+            <a:round/>
+            <a:headEnd type="none" w="med" len="med"/>
+            <a:tailEnd type="none" w="med" len="med"/>
+          </a:ln>
+        </p:spPr>
+        <p:style>
+          <a:lnRef idx="0">
+            <a:scrgbClr r="0" g="0" b="0"/>
+          </a:lnRef>
+          <a:fillRef idx="0">
+            <a:scrgbClr r="0" g="0" b="0"/>
+          </a:fillRef>
+          <a:effectRef idx="0">
+            <a:scrgbClr r="0" g="0" b="0"/>
+          </a:effectRef>
+          <a:fontRef idx="minor">
+            <a:schemeClr val="dk1"/>
+          </a:fontRef>
+        </p:style>
+        <p:txBody>
+          <a:bodyPr rtlCol="0" anchor="ctr"/>
+          <a:lstStyle/>
+          <a:p>
+            <a:pPr algn="ctr"/>
+            <a:r>
+              <a:rPr lang="en-US" sz="1300" b="1" err="1"/>
+              <a:t>SessionHandler</a:t>
+            </a:r>
+            <a:endParaRPr lang="en-US" sz="1300" b="1"/>
+          </a:p>
+        </p:txBody>
+      </p:sp>
+      <p:cxnSp>
+        <p:nvCxnSpPr>
+          <p:cNvPr id="14" name="Connector: Curved 13">
+            <a:extLst>
+              <a:ext uri="{FF2B5EF4-FFF2-40B4-BE49-F238E27FC236}">
+                <a16:creationId xmlns:a16="http://schemas.microsoft.com/office/drawing/2014/main" id="{B71D1616-604D-9FF3-6875-9C9C6FE62B34}"/>
+              </a:ext>
+            </a:extLst>
+          </p:cNvPr>
+          <p:cNvCxnSpPr>
+            <a:cxnSpLocks/>
+            <a:stCxn id="4" idx="6"/>
+            <a:endCxn id="7" idx="0"/>
+          </p:cNvCxnSpPr>
+          <p:nvPr/>
+        </p:nvCxnSpPr>
+        <p:spPr>
+          <a:xfrm>
+            <a:off x="6060764" y="776691"/>
+            <a:ext cx="1783265" cy="1510029"/>
+          </a:xfrm>
+          <a:prstGeom prst="curvedConnector2">
+            <a:avLst/>
+          </a:prstGeom>
+          <a:ln w="28575">
+            <a:headEnd type="triangle"/>
+            <a:tailEnd type="triangle"/>
+          </a:ln>
+        </p:spPr>
+        <p:style>
+          <a:lnRef idx="1">
+            <a:schemeClr val="accent1"/>
+          </a:lnRef>
+          <a:fillRef idx="0">
+            <a:schemeClr val="accent1"/>
+          </a:fillRef>
+          <a:effectRef idx="0">
+            <a:schemeClr val="accent1"/>
+          </a:effectRef>
+          <a:fontRef idx="minor">
+            <a:schemeClr val="tx1"/>
+          </a:fontRef>
+        </p:style>
+      </p:cxnSp>
+      <p:sp>
+        <p:nvSpPr>
+          <p:cNvPr id="15" name="TextBox 14">
+            <a:extLst>
+              <a:ext uri="{FF2B5EF4-FFF2-40B4-BE49-F238E27FC236}">
+                <a16:creationId xmlns:a16="http://schemas.microsoft.com/office/drawing/2014/main" id="{2A6FD2AB-DF3F-5ED8-F4B8-8D5DF3191B85}"/>
+              </a:ext>
+            </a:extLst>
+          </p:cNvPr>
+          <p:cNvSpPr txBox="1"/>
+          <p:nvPr/>
+        </p:nvSpPr>
+        <p:spPr>
+          <a:xfrm>
+            <a:off x="7681164" y="1323102"/>
+            <a:ext cx="1076000" cy="276999"/>
+          </a:xfrm>
+          <a:prstGeom prst="rect">
+            <a:avLst/>
+          </a:prstGeom>
+          <a:noFill/>
+        </p:spPr>
+        <p:txBody>
+          <a:bodyPr wrap="none" rtlCol="0">
+            <a:spAutoFit/>
+          </a:bodyPr>
+          <a:lstStyle/>
+          <a:p>
+            <a:r>
+              <a:rPr lang="en-US" sz="1200"/>
+              <a:t>Packet Stream</a:t>
+            </a:r>
+          </a:p>
+        </p:txBody>
+      </p:sp>
+      <p:sp>
+        <p:nvSpPr>
+          <p:cNvPr id="19" name="TextBox 18">
+            <a:extLst>
+              <a:ext uri="{FF2B5EF4-FFF2-40B4-BE49-F238E27FC236}">
+                <a16:creationId xmlns:a16="http://schemas.microsoft.com/office/drawing/2014/main" id="{2F33FFE0-1121-2046-9B8D-D33F4C46DA86}"/>
+              </a:ext>
+            </a:extLst>
+          </p:cNvPr>
+          <p:cNvSpPr txBox="1"/>
+          <p:nvPr/>
+        </p:nvSpPr>
+        <p:spPr>
+          <a:xfrm>
+            <a:off x="5236975" y="1260348"/>
+            <a:ext cx="1632562" cy="461665"/>
+          </a:xfrm>
+          <a:prstGeom prst="rect">
+            <a:avLst/>
+          </a:prstGeom>
+          <a:noFill/>
+        </p:spPr>
+        <p:txBody>
+          <a:bodyPr wrap="square" rtlCol="0">
+            <a:spAutoFit/>
+          </a:bodyPr>
+          <a:lstStyle/>
+          <a:p>
+            <a:pPr algn="ctr"/>
+            <a:r>
+              <a:rPr lang="en-US" sz="1200"/>
+              <a:t>+ 1 Connection</a:t>
+            </a:r>
+          </a:p>
+          <a:p>
+            <a:pPr algn="ctr"/>
+            <a:r>
+              <a:rPr lang="en-US" sz="1200"/>
+              <a:t>Create new Actor</a:t>
+            </a:r>
+          </a:p>
+        </p:txBody>
+      </p:sp>
+      <p:cxnSp>
+        <p:nvCxnSpPr>
+          <p:cNvPr id="24" name="Connector: Curved 23">
+            <a:extLst>
+              <a:ext uri="{FF2B5EF4-FFF2-40B4-BE49-F238E27FC236}">
+                <a16:creationId xmlns:a16="http://schemas.microsoft.com/office/drawing/2014/main" id="{0AA06163-BF86-93E0-D9E2-518E0EDD0B70}"/>
+              </a:ext>
+            </a:extLst>
+          </p:cNvPr>
+          <p:cNvCxnSpPr>
+            <a:cxnSpLocks/>
+            <a:stCxn id="7" idx="4"/>
+            <a:endCxn id="6" idx="6"/>
+          </p:cNvCxnSpPr>
+          <p:nvPr/>
+        </p:nvCxnSpPr>
+        <p:spPr>
+          <a:xfrm rot="5400000">
+            <a:off x="5951368" y="3265755"/>
+            <a:ext cx="2235322" cy="1550000"/>
+          </a:xfrm>
+          <a:prstGeom prst="curvedConnector2">
+            <a:avLst/>
+          </a:prstGeom>
+          <a:ln w="28575">
+            <a:headEnd type="triangle"/>
+            <a:tailEnd type="triangle"/>
+          </a:ln>
+        </p:spPr>
+        <p:style>
+          <a:lnRef idx="1">
+            <a:schemeClr val="dk1"/>
+          </a:lnRef>
+          <a:fillRef idx="0">
+            <a:schemeClr val="dk1"/>
+          </a:fillRef>
+          <a:effectRef idx="0">
+            <a:schemeClr val="dk1"/>
+          </a:effectRef>
+          <a:fontRef idx="minor">
+            <a:schemeClr val="tx1"/>
+          </a:fontRef>
+        </p:style>
+      </p:cxnSp>
+      <p:sp>
+        <p:nvSpPr>
+          <p:cNvPr id="26" name="TextBox 25">
+            <a:extLst>
+              <a:ext uri="{FF2B5EF4-FFF2-40B4-BE49-F238E27FC236}">
+                <a16:creationId xmlns:a16="http://schemas.microsoft.com/office/drawing/2014/main" id="{ED9401C0-30CA-B209-1591-E3246B3CBB81}"/>
+              </a:ext>
+            </a:extLst>
+          </p:cNvPr>
+          <p:cNvSpPr txBox="1"/>
+          <p:nvPr/>
+        </p:nvSpPr>
+        <p:spPr>
+          <a:xfrm rot="19493869">
+            <a:off x="6468800" y="4818794"/>
+            <a:ext cx="1272464" cy="276999"/>
+          </a:xfrm>
+          <a:prstGeom prst="rect">
+            <a:avLst/>
+          </a:prstGeom>
+          <a:noFill/>
+        </p:spPr>
+        <p:txBody>
+          <a:bodyPr wrap="none" rtlCol="0">
+            <a:spAutoFit/>
+          </a:bodyPr>
+          <a:lstStyle/>
+          <a:p>
+            <a:r>
+              <a:rPr lang="en-US" sz="1200"/>
+              <a:t>! Decoded packet</a:t>
+            </a:r>
+          </a:p>
+        </p:txBody>
+      </p:sp>
+      <p:sp>
+        <p:nvSpPr>
+          <p:cNvPr id="32" name="TextBox 31">
+            <a:extLst>
+              <a:ext uri="{FF2B5EF4-FFF2-40B4-BE49-F238E27FC236}">
+                <a16:creationId xmlns:a16="http://schemas.microsoft.com/office/drawing/2014/main" id="{79909873-B902-EF69-88C2-249A2D37BAD1}"/>
+              </a:ext>
+            </a:extLst>
+          </p:cNvPr>
+          <p:cNvSpPr txBox="1"/>
+          <p:nvPr/>
+        </p:nvSpPr>
+        <p:spPr>
+          <a:xfrm>
+            <a:off x="5539321" y="3861842"/>
+            <a:ext cx="1270541" cy="461665"/>
+          </a:xfrm>
+          <a:prstGeom prst="rect">
+            <a:avLst/>
+          </a:prstGeom>
+          <a:noFill/>
+        </p:spPr>
+        <p:txBody>
+          <a:bodyPr wrap="none" rtlCol="0">
+            <a:spAutoFit/>
+          </a:bodyPr>
+          <a:lstStyle/>
+          <a:p>
+            <a:r>
+              <a:rPr lang="en-US" sz="1200"/>
+              <a:t>+ Packet valid</a:t>
+            </a:r>
+          </a:p>
+          <a:p>
+            <a:r>
+              <a:rPr lang="en-US" sz="1200"/>
+              <a:t>Create new Actor</a:t>
+            </a:r>
+          </a:p>
+        </p:txBody>
+      </p:sp>
+      <p:sp>
+        <p:nvSpPr>
+          <p:cNvPr id="37" name="TextBox 36">
+            <a:extLst>
+              <a:ext uri="{FF2B5EF4-FFF2-40B4-BE49-F238E27FC236}">
+                <a16:creationId xmlns:a16="http://schemas.microsoft.com/office/drawing/2014/main" id="{7E10595A-1269-63B9-DAC2-7A94FB4B7793}"/>
+              </a:ext>
+            </a:extLst>
+          </p:cNvPr>
+          <p:cNvSpPr txBox="1"/>
+          <p:nvPr/>
+        </p:nvSpPr>
+        <p:spPr>
+          <a:xfrm>
+            <a:off x="230515" y="3632723"/>
+            <a:ext cx="1608967" cy="646331"/>
+          </a:xfrm>
+          <a:prstGeom prst="rect">
+            <a:avLst/>
+          </a:prstGeom>
+          <a:noFill/>
+        </p:spPr>
+        <p:txBody>
+          <a:bodyPr wrap="none" rtlCol="0">
+            <a:spAutoFit/>
+          </a:bodyPr>
+          <a:lstStyle/>
+          <a:p>
+            <a:pPr algn="ctr"/>
+            <a:r>
+              <a:rPr lang="en-US" sz="1200"/>
+              <a:t>? New </a:t>
+            </a:r>
+            <a:r>
+              <a:rPr lang="en-US" sz="1200" err="1"/>
+              <a:t>SessionHandler</a:t>
+            </a:r>
+            <a:r>
+              <a:rPr lang="en-US" sz="1200"/>
+              <a:t> </a:t>
+            </a:r>
+          </a:p>
+          <a:p>
+            <a:pPr algn="ctr"/>
+            <a:r>
+              <a:rPr lang="en-US" sz="1200"/>
+              <a:t>Actor  to Handle </a:t>
+            </a:r>
+          </a:p>
+          <a:p>
+            <a:pPr algn="ctr"/>
+            <a:r>
+              <a:rPr lang="en-US" sz="1200"/>
+              <a:t>new Connection</a:t>
+            </a:r>
+          </a:p>
+        </p:txBody>
+      </p:sp>
+      <p:sp>
+        <p:nvSpPr>
+          <p:cNvPr id="43" name="TextBox 42">
+            <a:extLst>
+              <a:ext uri="{FF2B5EF4-FFF2-40B4-BE49-F238E27FC236}">
+                <a16:creationId xmlns:a16="http://schemas.microsoft.com/office/drawing/2014/main" id="{8EC46595-E9FE-929C-9F05-8C07297D949C}"/>
+              </a:ext>
+            </a:extLst>
+          </p:cNvPr>
+          <p:cNvSpPr txBox="1"/>
+          <p:nvPr/>
+        </p:nvSpPr>
+        <p:spPr>
+          <a:xfrm>
+            <a:off x="2231960" y="2407812"/>
+            <a:ext cx="1270541" cy="461665"/>
+          </a:xfrm>
+          <a:prstGeom prst="rect">
+            <a:avLst/>
+          </a:prstGeom>
+          <a:noFill/>
+        </p:spPr>
+        <p:txBody>
+          <a:bodyPr wrap="none" rtlCol="0">
+            <a:spAutoFit/>
+          </a:bodyPr>
+          <a:lstStyle/>
+          <a:p>
+            <a:r>
+              <a:rPr lang="en-US" sz="1200"/>
+              <a:t>+ New device</a:t>
+            </a:r>
+          </a:p>
+          <a:p>
+            <a:r>
+              <a:rPr lang="en-US" sz="1200"/>
+              <a:t>Create new Actor</a:t>
+            </a:r>
+          </a:p>
+        </p:txBody>
+      </p:sp>
+      <p:sp>
+        <p:nvSpPr>
+          <p:cNvPr id="46" name="TextBox 45">
+            <a:extLst>
+              <a:ext uri="{FF2B5EF4-FFF2-40B4-BE49-F238E27FC236}">
+                <a16:creationId xmlns:a16="http://schemas.microsoft.com/office/drawing/2014/main" id="{8C5A3595-7A94-EFA2-BF1C-2B788EB740C5}"/>
+              </a:ext>
+            </a:extLst>
+          </p:cNvPr>
+          <p:cNvSpPr txBox="1"/>
+          <p:nvPr/>
+        </p:nvSpPr>
+        <p:spPr>
+          <a:xfrm>
+            <a:off x="9237206" y="1986294"/>
+            <a:ext cx="1441741" cy="276999"/>
+          </a:xfrm>
+          <a:prstGeom prst="rect">
+            <a:avLst/>
+          </a:prstGeom>
+          <a:noFill/>
+        </p:spPr>
+        <p:txBody>
+          <a:bodyPr wrap="none" rtlCol="0">
+            <a:spAutoFit/>
+          </a:bodyPr>
+          <a:lstStyle/>
+          <a:p>
+            <a:r>
+              <a:rPr lang="en-US" sz="1200"/>
+              <a:t>Receive raw packets</a:t>
+            </a:r>
+          </a:p>
+        </p:txBody>
+      </p:sp>
+      <p:sp>
+        <p:nvSpPr>
+          <p:cNvPr id="49" name="TextBox 48">
+            <a:extLst>
+              <a:ext uri="{FF2B5EF4-FFF2-40B4-BE49-F238E27FC236}">
+                <a16:creationId xmlns:a16="http://schemas.microsoft.com/office/drawing/2014/main" id="{A1D2755F-B6B6-9F59-C7EC-70254FC61857}"/>
+              </a:ext>
+            </a:extLst>
+          </p:cNvPr>
+          <p:cNvSpPr txBox="1"/>
+          <p:nvPr/>
+        </p:nvSpPr>
+        <p:spPr>
+          <a:xfrm>
+            <a:off x="9342524" y="2405964"/>
+            <a:ext cx="1174424" cy="276999"/>
+          </a:xfrm>
+          <a:prstGeom prst="rect">
+            <a:avLst/>
+          </a:prstGeom>
+          <a:noFill/>
+        </p:spPr>
+        <p:txBody>
+          <a:bodyPr wrap="none" rtlCol="0">
+            <a:spAutoFit/>
+          </a:bodyPr>
+          <a:lstStyle/>
+          <a:p>
+            <a:r>
+              <a:rPr lang="en-US" sz="1200"/>
+              <a:t>Analyze packets</a:t>
+            </a:r>
+          </a:p>
+        </p:txBody>
+      </p:sp>
+      <p:sp>
+        <p:nvSpPr>
+          <p:cNvPr id="50" name="TextBox 49">
+            <a:extLst>
+              <a:ext uri="{FF2B5EF4-FFF2-40B4-BE49-F238E27FC236}">
+                <a16:creationId xmlns:a16="http://schemas.microsoft.com/office/drawing/2014/main" id="{EDECA568-596F-F50C-20DE-94F32E7EBD2A}"/>
+              </a:ext>
+            </a:extLst>
+          </p:cNvPr>
+          <p:cNvSpPr txBox="1"/>
+          <p:nvPr/>
+        </p:nvSpPr>
+        <p:spPr>
+          <a:xfrm>
+            <a:off x="9314748" y="2848636"/>
+            <a:ext cx="1308820" cy="276999"/>
+          </a:xfrm>
+          <a:prstGeom prst="rect">
+            <a:avLst/>
+          </a:prstGeom>
+          <a:noFill/>
+        </p:spPr>
+        <p:txBody>
+          <a:bodyPr wrap="none" rtlCol="0">
+            <a:spAutoFit/>
+          </a:bodyPr>
+          <a:lstStyle/>
+          <a:p>
+            <a:r>
+              <a:rPr lang="en-US" sz="1200"/>
+              <a:t>Distribute packets</a:t>
+            </a:r>
+          </a:p>
+        </p:txBody>
+      </p:sp>
+      <p:sp>
+        <p:nvSpPr>
+          <p:cNvPr id="56" name="TextBox 55">
+            <a:extLst>
+              <a:ext uri="{FF2B5EF4-FFF2-40B4-BE49-F238E27FC236}">
+                <a16:creationId xmlns:a16="http://schemas.microsoft.com/office/drawing/2014/main" id="{7CCCB0F6-B427-9637-E638-76168ACD40FE}"/>
+              </a:ext>
+            </a:extLst>
+          </p:cNvPr>
+          <p:cNvSpPr txBox="1"/>
+          <p:nvPr/>
+        </p:nvSpPr>
+        <p:spPr>
+          <a:xfrm>
+            <a:off x="7724138" y="5013839"/>
+            <a:ext cx="1749197" cy="276999"/>
+          </a:xfrm>
+          <a:prstGeom prst="rect">
+            <a:avLst/>
+          </a:prstGeom>
+          <a:noFill/>
+        </p:spPr>
+        <p:txBody>
+          <a:bodyPr wrap="none" rtlCol="0">
+            <a:spAutoFit/>
+          </a:bodyPr>
+          <a:lstStyle/>
+          <a:p>
+            <a:r>
+              <a:rPr lang="en-US" sz="1200"/>
+              <a:t>Receive decoded packets</a:t>
+            </a:r>
+          </a:p>
+        </p:txBody>
+      </p:sp>
+      <p:sp>
+        <p:nvSpPr>
+          <p:cNvPr id="59" name="TextBox 58">
+            <a:extLst>
+              <a:ext uri="{FF2B5EF4-FFF2-40B4-BE49-F238E27FC236}">
+                <a16:creationId xmlns:a16="http://schemas.microsoft.com/office/drawing/2014/main" id="{AA0D86C8-3F50-ABD4-7B26-BB329CDFABB0}"/>
+              </a:ext>
+            </a:extLst>
+          </p:cNvPr>
+          <p:cNvSpPr txBox="1"/>
+          <p:nvPr/>
+        </p:nvSpPr>
+        <p:spPr>
+          <a:xfrm>
+            <a:off x="7724138" y="5261785"/>
+            <a:ext cx="2184765" cy="461665"/>
+          </a:xfrm>
+          <a:prstGeom prst="rect">
+            <a:avLst/>
+          </a:prstGeom>
+          <a:noFill/>
+        </p:spPr>
+        <p:txBody>
+          <a:bodyPr wrap="none" rtlCol="0">
+            <a:spAutoFit/>
+          </a:bodyPr>
+          <a:lstStyle/>
+          <a:p>
+            <a:r>
+              <a:rPr lang="en-US" sz="1200"/>
+              <a:t>If connection: request to create </a:t>
+            </a:r>
+          </a:p>
+          <a:p>
+            <a:r>
+              <a:rPr lang="en-US" sz="1200"/>
+              <a:t>new </a:t>
+            </a:r>
+            <a:r>
+              <a:rPr lang="en-US" sz="1200" err="1"/>
+              <a:t>SessionHandler</a:t>
+            </a:r>
+            <a:r>
+              <a:rPr lang="en-US" sz="1200"/>
+              <a:t> Actor </a:t>
+            </a:r>
+          </a:p>
+        </p:txBody>
+      </p:sp>
+      <p:sp>
+        <p:nvSpPr>
+          <p:cNvPr id="60" name="TextBox 59">
+            <a:extLst>
+              <a:ext uri="{FF2B5EF4-FFF2-40B4-BE49-F238E27FC236}">
+                <a16:creationId xmlns:a16="http://schemas.microsoft.com/office/drawing/2014/main" id="{96181793-3501-2AE9-A0CD-4039B61D605D}"/>
+              </a:ext>
+            </a:extLst>
+          </p:cNvPr>
+          <p:cNvSpPr txBox="1"/>
+          <p:nvPr/>
+        </p:nvSpPr>
+        <p:spPr>
+          <a:xfrm>
+            <a:off x="7705498" y="5694397"/>
+            <a:ext cx="3380862" cy="276999"/>
+          </a:xfrm>
+          <a:prstGeom prst="rect">
+            <a:avLst/>
+          </a:prstGeom>
+          <a:noFill/>
+        </p:spPr>
+        <p:txBody>
+          <a:bodyPr wrap="none" rtlCol="0">
+            <a:spAutoFit/>
+          </a:bodyPr>
+          <a:lstStyle/>
+          <a:p>
+            <a:r>
+              <a:rPr lang="en-US" sz="1200"/>
+              <a:t>Check packet and tell PacketTransformer the action</a:t>
+            </a:r>
+          </a:p>
+        </p:txBody>
+      </p:sp>
+      <p:cxnSp>
+        <p:nvCxnSpPr>
+          <p:cNvPr id="62" name="Straight Connector 61">
+            <a:extLst>
+              <a:ext uri="{FF2B5EF4-FFF2-40B4-BE49-F238E27FC236}">
+                <a16:creationId xmlns:a16="http://schemas.microsoft.com/office/drawing/2014/main" id="{FE542DF7-7FBD-EBB8-80DD-9AC1A8CA721C}"/>
+              </a:ext>
+            </a:extLst>
+          </p:cNvPr>
+          <p:cNvCxnSpPr>
+            <a:stCxn id="6" idx="5"/>
+            <a:endCxn id="60" idx="1"/>
+          </p:cNvCxnSpPr>
+          <p:nvPr/>
+        </p:nvCxnSpPr>
+        <p:spPr>
+          <a:xfrm>
+            <a:off x="5927132" y="5417630"/>
+            <a:ext cx="1778366" cy="415267"/>
+          </a:xfrm>
+          <a:prstGeom prst="line">
+            <a:avLst/>
+          </a:prstGeom>
+          <a:ln>
+            <a:solidFill>
+              <a:schemeClr val="tx1"/>
+            </a:solidFill>
+          </a:ln>
+        </p:spPr>
+        <p:style>
+          <a:lnRef idx="1">
+            <a:schemeClr val="accent1"/>
+          </a:lnRef>
+          <a:fillRef idx="0">
+            <a:schemeClr val="accent1"/>
+          </a:fillRef>
+          <a:effectRef idx="0">
+            <a:schemeClr val="accent1"/>
+          </a:effectRef>
+          <a:fontRef idx="minor">
+            <a:schemeClr val="tx1"/>
+          </a:fontRef>
+        </p:style>
+      </p:cxnSp>
+      <p:sp>
+        <p:nvSpPr>
+          <p:cNvPr id="68" name="TextBox 67">
+            <a:extLst>
+              <a:ext uri="{FF2B5EF4-FFF2-40B4-BE49-F238E27FC236}">
+                <a16:creationId xmlns:a16="http://schemas.microsoft.com/office/drawing/2014/main" id="{4F8251FB-CD12-95CF-E13C-34F1DECC2C9D}"/>
+              </a:ext>
+            </a:extLst>
+          </p:cNvPr>
+          <p:cNvSpPr txBox="1"/>
+          <p:nvPr/>
+        </p:nvSpPr>
+        <p:spPr>
+          <a:xfrm>
+            <a:off x="123884" y="1159440"/>
+            <a:ext cx="1715598" cy="492443"/>
+          </a:xfrm>
+          <a:prstGeom prst="rect">
+            <a:avLst/>
+          </a:prstGeom>
+          <a:noFill/>
+        </p:spPr>
+        <p:txBody>
+          <a:bodyPr wrap="none" rtlCol="0">
+            <a:spAutoFit/>
+          </a:bodyPr>
+          <a:lstStyle/>
+          <a:p>
+            <a:r>
+              <a:rPr lang="en-US" sz="1300"/>
+              <a:t>Check and create new </a:t>
+            </a:r>
+          </a:p>
+          <a:p>
+            <a:r>
+              <a:rPr lang="en-US" sz="1300" err="1"/>
+              <a:t>SessionHandler</a:t>
+            </a:r>
+            <a:r>
+              <a:rPr lang="en-US" sz="1300"/>
+              <a:t> Actor</a:t>
+            </a:r>
+          </a:p>
+        </p:txBody>
+      </p:sp>
+      <p:cxnSp>
+        <p:nvCxnSpPr>
+          <p:cNvPr id="81" name="Connector: Curved 80">
+            <a:extLst>
+              <a:ext uri="{FF2B5EF4-FFF2-40B4-BE49-F238E27FC236}">
+                <a16:creationId xmlns:a16="http://schemas.microsoft.com/office/drawing/2014/main" id="{E7BD2B6E-1614-72BA-861C-5E1A16D9DB7B}"/>
+              </a:ext>
+            </a:extLst>
+          </p:cNvPr>
+          <p:cNvCxnSpPr>
+            <a:stCxn id="4" idx="4"/>
+            <a:endCxn id="7" idx="1"/>
+          </p:cNvCxnSpPr>
+          <p:nvPr/>
+        </p:nvCxnSpPr>
+        <p:spPr>
+          <a:xfrm rot="16200000" flipH="1">
+            <a:off x="5358673" y="671474"/>
+            <a:ext cx="1236640" cy="2180242"/>
+          </a:xfrm>
+          <a:prstGeom prst="curvedConnector3">
+            <a:avLst>
+              <a:gd name="adj1" fmla="val 50000"/>
+            </a:avLst>
+          </a:prstGeom>
+          <a:ln w="28575">
+            <a:solidFill>
+              <a:schemeClr val="accent6">
+                <a:lumMod val="75000"/>
+              </a:schemeClr>
+            </a:solidFill>
+            <a:tailEnd type="triangle"/>
+          </a:ln>
+        </p:spPr>
+        <p:style>
+          <a:lnRef idx="1">
+            <a:schemeClr val="accent1"/>
+          </a:lnRef>
+          <a:fillRef idx="0">
+            <a:schemeClr val="accent1"/>
+          </a:fillRef>
+          <a:effectRef idx="0">
+            <a:schemeClr val="accent1"/>
+          </a:effectRef>
+          <a:fontRef idx="minor">
+            <a:schemeClr val="tx1"/>
+          </a:fontRef>
+        </p:style>
+      </p:cxnSp>
+      <p:cxnSp>
+        <p:nvCxnSpPr>
+          <p:cNvPr id="84" name="Connector: Curved 83">
+            <a:extLst>
+              <a:ext uri="{FF2B5EF4-FFF2-40B4-BE49-F238E27FC236}">
+                <a16:creationId xmlns:a16="http://schemas.microsoft.com/office/drawing/2014/main" id="{DB13D366-F21A-CF98-A3A3-052B6F861817}"/>
+              </a:ext>
+            </a:extLst>
+          </p:cNvPr>
+          <p:cNvCxnSpPr>
+            <a:stCxn id="7" idx="3"/>
+            <a:endCxn id="6" idx="0"/>
+          </p:cNvCxnSpPr>
+          <p:nvPr/>
+        </p:nvCxnSpPr>
+        <p:spPr>
+          <a:xfrm rot="5400000">
+            <a:off x="5073273" y="2797990"/>
+            <a:ext cx="1961933" cy="2025750"/>
+          </a:xfrm>
+          <a:prstGeom prst="curvedConnector3">
+            <a:avLst/>
+          </a:prstGeom>
+          <a:ln w="28575">
+            <a:solidFill>
+              <a:schemeClr val="accent6">
+                <a:lumMod val="75000"/>
+              </a:schemeClr>
+            </a:solidFill>
+            <a:tailEnd type="triangle"/>
+          </a:ln>
+        </p:spPr>
+        <p:style>
+          <a:lnRef idx="1">
+            <a:schemeClr val="accent6"/>
+          </a:lnRef>
+          <a:fillRef idx="0">
+            <a:schemeClr val="accent6"/>
+          </a:fillRef>
+          <a:effectRef idx="0">
+            <a:schemeClr val="accent6"/>
+          </a:effectRef>
+          <a:fontRef idx="minor">
+            <a:schemeClr val="tx1"/>
+          </a:fontRef>
+        </p:style>
+      </p:cxnSp>
+      <p:sp>
+        <p:nvSpPr>
+          <p:cNvPr id="88" name="TextBox 87">
+            <a:extLst>
+              <a:ext uri="{FF2B5EF4-FFF2-40B4-BE49-F238E27FC236}">
+                <a16:creationId xmlns:a16="http://schemas.microsoft.com/office/drawing/2014/main" id="{61204FD1-8A10-C321-B66E-064487524B54}"/>
+              </a:ext>
+            </a:extLst>
+          </p:cNvPr>
+          <p:cNvSpPr txBox="1"/>
+          <p:nvPr/>
+        </p:nvSpPr>
+        <p:spPr>
+          <a:xfrm>
+            <a:off x="7109428" y="295979"/>
+            <a:ext cx="1307089" cy="292388"/>
+          </a:xfrm>
+          <a:prstGeom prst="rect">
+            <a:avLst/>
+          </a:prstGeom>
+          <a:noFill/>
+        </p:spPr>
+        <p:txBody>
+          <a:bodyPr wrap="none" rtlCol="0">
+            <a:spAutoFit/>
+          </a:bodyPr>
+          <a:lstStyle/>
+          <a:p>
+            <a:r>
+              <a:rPr lang="en-US" sz="1300"/>
+              <a:t>Listen to devices</a:t>
+            </a:r>
+          </a:p>
+        </p:txBody>
+      </p:sp>
+      <p:sp>
+        <p:nvSpPr>
+          <p:cNvPr id="89" name="TextBox 88">
+            <a:extLst>
+              <a:ext uri="{FF2B5EF4-FFF2-40B4-BE49-F238E27FC236}">
+                <a16:creationId xmlns:a16="http://schemas.microsoft.com/office/drawing/2014/main" id="{15EBA0D4-CE92-EB87-438E-B992F1E60ACA}"/>
+              </a:ext>
+            </a:extLst>
+          </p:cNvPr>
+          <p:cNvSpPr txBox="1"/>
+          <p:nvPr/>
+        </p:nvSpPr>
+        <p:spPr>
+          <a:xfrm>
+            <a:off x="7109428" y="683745"/>
+            <a:ext cx="2825902" cy="292388"/>
+          </a:xfrm>
+          <a:prstGeom prst="rect">
+            <a:avLst/>
+          </a:prstGeom>
+          <a:noFill/>
+        </p:spPr>
+        <p:txBody>
+          <a:bodyPr wrap="none" rtlCol="0">
+            <a:spAutoFit/>
+          </a:bodyPr>
+          <a:lstStyle/>
+          <a:p>
+            <a:r>
+              <a:rPr lang="en-US" sz="1300"/>
+              <a:t>Stream raw data to </a:t>
+            </a:r>
+            <a:r>
+              <a:rPr lang="en-US" sz="1300" err="1"/>
+              <a:t>PacketTransformer</a:t>
+            </a:r>
+            <a:r>
+              <a:rPr lang="en-US" sz="1300"/>
+              <a:t> </a:t>
+            </a:r>
+          </a:p>
+        </p:txBody>
+      </p:sp>
+      <p:cxnSp>
+        <p:nvCxnSpPr>
+          <p:cNvPr id="91" name="Straight Connector 90">
+            <a:extLst>
+              <a:ext uri="{FF2B5EF4-FFF2-40B4-BE49-F238E27FC236}">
+                <a16:creationId xmlns:a16="http://schemas.microsoft.com/office/drawing/2014/main" id="{0AE453DB-9EA4-D33B-1159-033DAD19084B}"/>
+              </a:ext>
+            </a:extLst>
+          </p:cNvPr>
+          <p:cNvCxnSpPr>
+            <a:stCxn id="4" idx="7"/>
+            <a:endCxn id="88" idx="1"/>
+          </p:cNvCxnSpPr>
+          <p:nvPr/>
+        </p:nvCxnSpPr>
+        <p:spPr>
+          <a:xfrm flipV="1">
+            <a:off x="5716939" y="442173"/>
+            <a:ext cx="1392489" cy="75304"/>
+          </a:xfrm>
+          <a:prstGeom prst="line">
+            <a:avLst/>
+          </a:prstGeom>
+        </p:spPr>
+        <p:style>
+          <a:lnRef idx="1">
+            <a:schemeClr val="dk1"/>
+          </a:lnRef>
+          <a:fillRef idx="0">
+            <a:schemeClr val="dk1"/>
+          </a:fillRef>
+          <a:effectRef idx="0">
+            <a:schemeClr val="dk1"/>
+          </a:effectRef>
+          <a:fontRef idx="minor">
+            <a:schemeClr val="tx1"/>
+          </a:fontRef>
+        </p:style>
+      </p:cxnSp>
+      <p:sp>
+        <p:nvSpPr>
+          <p:cNvPr id="96" name="TextBox 95">
+            <a:extLst>
+              <a:ext uri="{FF2B5EF4-FFF2-40B4-BE49-F238E27FC236}">
+                <a16:creationId xmlns:a16="http://schemas.microsoft.com/office/drawing/2014/main" id="{24023960-4920-7185-305A-135CC3F2678B}"/>
+              </a:ext>
+            </a:extLst>
+          </p:cNvPr>
+          <p:cNvSpPr txBox="1"/>
+          <p:nvPr/>
+        </p:nvSpPr>
+        <p:spPr>
+          <a:xfrm>
+            <a:off x="1119373" y="804969"/>
+            <a:ext cx="2385077" cy="292388"/>
+          </a:xfrm>
+          <a:prstGeom prst="rect">
+            <a:avLst/>
+          </a:prstGeom>
+          <a:noFill/>
+        </p:spPr>
+        <p:txBody>
+          <a:bodyPr wrap="none" rtlCol="0">
+            <a:spAutoFit/>
+          </a:bodyPr>
+          <a:lstStyle/>
+          <a:p>
+            <a:r>
+              <a:rPr lang="en-US" sz="1300"/>
+              <a:t>Implement tasks for each packet</a:t>
+            </a:r>
+          </a:p>
+        </p:txBody>
+      </p:sp>
+      <p:sp>
+        <p:nvSpPr>
+          <p:cNvPr id="97" name="TextBox 96">
+            <a:extLst>
+              <a:ext uri="{FF2B5EF4-FFF2-40B4-BE49-F238E27FC236}">
+                <a16:creationId xmlns:a16="http://schemas.microsoft.com/office/drawing/2014/main" id="{A5B1C2F5-E5EC-90F4-171B-420A5A131026}"/>
+              </a:ext>
+            </a:extLst>
+          </p:cNvPr>
+          <p:cNvSpPr txBox="1"/>
+          <p:nvPr/>
+        </p:nvSpPr>
+        <p:spPr>
+          <a:xfrm>
+            <a:off x="2284298" y="3858698"/>
+            <a:ext cx="1174681" cy="292388"/>
+          </a:xfrm>
+          <a:prstGeom prst="rect">
+            <a:avLst/>
+          </a:prstGeom>
+          <a:noFill/>
+        </p:spPr>
+        <p:txBody>
+          <a:bodyPr wrap="none" rtlCol="0">
+            <a:spAutoFit/>
+          </a:bodyPr>
+          <a:lstStyle/>
+          <a:p>
+            <a:r>
+              <a:rPr lang="en-US" sz="1300"/>
+              <a:t>Classify packet</a:t>
+            </a:r>
+          </a:p>
+        </p:txBody>
+      </p:sp>
+      <p:sp>
+        <p:nvSpPr>
+          <p:cNvPr id="98" name="TextBox 97">
+            <a:extLst>
+              <a:ext uri="{FF2B5EF4-FFF2-40B4-BE49-F238E27FC236}">
+                <a16:creationId xmlns:a16="http://schemas.microsoft.com/office/drawing/2014/main" id="{8348CB7F-06A9-DFAA-A346-5C6A2598729A}"/>
+              </a:ext>
+            </a:extLst>
+          </p:cNvPr>
+          <p:cNvSpPr txBox="1"/>
+          <p:nvPr/>
+        </p:nvSpPr>
+        <p:spPr>
+          <a:xfrm>
+            <a:off x="2111152" y="3566310"/>
+            <a:ext cx="1375633" cy="292388"/>
+          </a:xfrm>
+          <a:prstGeom prst="rect">
+            <a:avLst/>
+          </a:prstGeom>
+          <a:noFill/>
+        </p:spPr>
+        <p:txBody>
+          <a:bodyPr wrap="none" rtlCol="0">
+            <a:spAutoFit/>
+          </a:bodyPr>
+          <a:lstStyle/>
+          <a:p>
+            <a:r>
+              <a:rPr lang="en-US" sz="1300"/>
+              <a:t>Get packet’s </a:t>
+            </a:r>
+            <a:r>
+              <a:rPr lang="en-US" sz="1300" err="1"/>
+              <a:t>infor</a:t>
+            </a:r>
+            <a:endParaRPr lang="en-US" sz="1300"/>
+          </a:p>
+        </p:txBody>
+      </p:sp>
+      <p:cxnSp>
+        <p:nvCxnSpPr>
+          <p:cNvPr id="51" name="Straight Connector 50">
+            <a:extLst>
+              <a:ext uri="{FF2B5EF4-FFF2-40B4-BE49-F238E27FC236}">
+                <a16:creationId xmlns:a16="http://schemas.microsoft.com/office/drawing/2014/main" id="{D11620F7-8A8E-3BB3-8AC2-1ABAF54AAA29}"/>
+              </a:ext>
+            </a:extLst>
+          </p:cNvPr>
+          <p:cNvCxnSpPr>
+            <a:stCxn id="6" idx="5"/>
+            <a:endCxn id="56" idx="1"/>
+          </p:cNvCxnSpPr>
+          <p:nvPr/>
+        </p:nvCxnSpPr>
+        <p:spPr>
+          <a:xfrm flipV="1">
+            <a:off x="5927132" y="5152339"/>
+            <a:ext cx="1797006" cy="265291"/>
+          </a:xfrm>
+          <a:prstGeom prst="line">
+            <a:avLst/>
+          </a:prstGeom>
+        </p:spPr>
+        <p:style>
+          <a:lnRef idx="1">
+            <a:schemeClr val="dk1"/>
+          </a:lnRef>
+          <a:fillRef idx="0">
+            <a:schemeClr val="dk1"/>
+          </a:fillRef>
+          <a:effectRef idx="0">
+            <a:schemeClr val="dk1"/>
+          </a:effectRef>
+          <a:fontRef idx="minor">
+            <a:schemeClr val="tx1"/>
+          </a:fontRef>
+        </p:style>
+      </p:cxnSp>
+      <p:cxnSp>
+        <p:nvCxnSpPr>
+          <p:cNvPr id="54" name="Straight Connector 53">
+            <a:extLst>
+              <a:ext uri="{FF2B5EF4-FFF2-40B4-BE49-F238E27FC236}">
+                <a16:creationId xmlns:a16="http://schemas.microsoft.com/office/drawing/2014/main" id="{DF15BB7B-BC46-D9FD-E92D-F69B31BCFCE3}"/>
+              </a:ext>
+            </a:extLst>
+          </p:cNvPr>
+          <p:cNvCxnSpPr>
+            <a:stCxn id="6" idx="5"/>
+            <a:endCxn id="59" idx="1"/>
+          </p:cNvCxnSpPr>
+          <p:nvPr/>
+        </p:nvCxnSpPr>
+        <p:spPr>
+          <a:xfrm>
+            <a:off x="5927132" y="5417630"/>
+            <a:ext cx="1797006" cy="74988"/>
+          </a:xfrm>
+          <a:prstGeom prst="line">
+            <a:avLst/>
+          </a:prstGeom>
+        </p:spPr>
+        <p:style>
+          <a:lnRef idx="1">
+            <a:schemeClr val="dk1"/>
+          </a:lnRef>
+          <a:fillRef idx="0">
+            <a:schemeClr val="dk1"/>
+          </a:fillRef>
+          <a:effectRef idx="0">
+            <a:schemeClr val="dk1"/>
+          </a:effectRef>
+          <a:fontRef idx="minor">
+            <a:schemeClr val="tx1"/>
+          </a:fontRef>
+        </p:style>
+      </p:cxnSp>
+      <p:cxnSp>
+        <p:nvCxnSpPr>
+          <p:cNvPr id="64" name="Connector: Curved 63">
+            <a:extLst>
+              <a:ext uri="{FF2B5EF4-FFF2-40B4-BE49-F238E27FC236}">
+                <a16:creationId xmlns:a16="http://schemas.microsoft.com/office/drawing/2014/main" id="{22FC1696-E3D2-3DBB-5ED0-A1ED77213A8C}"/>
+              </a:ext>
+            </a:extLst>
+          </p:cNvPr>
+          <p:cNvCxnSpPr>
+            <a:cxnSpLocks/>
+            <a:stCxn id="6" idx="2"/>
+            <a:endCxn id="8" idx="4"/>
+          </p:cNvCxnSpPr>
+          <p:nvPr/>
+        </p:nvCxnSpPr>
+        <p:spPr>
+          <a:xfrm rot="10800000">
+            <a:off x="1365197" y="2491378"/>
+            <a:ext cx="2423503" cy="2667038"/>
+          </a:xfrm>
+          <a:prstGeom prst="curvedConnector2">
+            <a:avLst/>
+          </a:prstGeom>
+          <a:ln w="28575">
+            <a:solidFill>
+              <a:schemeClr val="tx1"/>
+            </a:solidFill>
+            <a:tailEnd type="triangle"/>
+          </a:ln>
+        </p:spPr>
+        <p:style>
+          <a:lnRef idx="1">
+            <a:schemeClr val="accent1"/>
+          </a:lnRef>
+          <a:fillRef idx="0">
+            <a:schemeClr val="accent1"/>
+          </a:fillRef>
+          <a:effectRef idx="0">
+            <a:schemeClr val="accent1"/>
+          </a:effectRef>
+          <a:fontRef idx="minor">
+            <a:schemeClr val="tx1"/>
+          </a:fontRef>
+        </p:style>
+      </p:cxnSp>
+      <p:cxnSp>
+        <p:nvCxnSpPr>
+          <p:cNvPr id="71" name="Straight Connector 70">
+            <a:extLst>
+              <a:ext uri="{FF2B5EF4-FFF2-40B4-BE49-F238E27FC236}">
+                <a16:creationId xmlns:a16="http://schemas.microsoft.com/office/drawing/2014/main" id="{11D5598C-6B2F-3885-69AA-6E2B415E0CD7}"/>
+              </a:ext>
+            </a:extLst>
+          </p:cNvPr>
+          <p:cNvCxnSpPr>
+            <a:stCxn id="4" idx="7"/>
+            <a:endCxn id="89" idx="1"/>
+          </p:cNvCxnSpPr>
+          <p:nvPr/>
+        </p:nvCxnSpPr>
+        <p:spPr>
+          <a:xfrm>
+            <a:off x="5716939" y="517477"/>
+            <a:ext cx="1392489" cy="312462"/>
+          </a:xfrm>
+          <a:prstGeom prst="line">
+            <a:avLst/>
+          </a:prstGeom>
+        </p:spPr>
+        <p:style>
+          <a:lnRef idx="1">
+            <a:schemeClr val="dk1"/>
+          </a:lnRef>
+          <a:fillRef idx="0">
+            <a:schemeClr val="dk1"/>
+          </a:fillRef>
+          <a:effectRef idx="0">
+            <a:schemeClr val="dk1"/>
+          </a:effectRef>
+          <a:fontRef idx="minor">
+            <a:schemeClr val="tx1"/>
+          </a:fontRef>
+        </p:style>
+      </p:cxnSp>
+      <p:cxnSp>
+        <p:nvCxnSpPr>
+          <p:cNvPr id="78" name="Connector: Curved 77">
+            <a:extLst>
+              <a:ext uri="{FF2B5EF4-FFF2-40B4-BE49-F238E27FC236}">
+                <a16:creationId xmlns:a16="http://schemas.microsoft.com/office/drawing/2014/main" id="{728D551F-2FCC-7CC0-9544-BF76AD5A6A76}"/>
+              </a:ext>
+            </a:extLst>
+          </p:cNvPr>
+          <p:cNvCxnSpPr>
+            <a:stCxn id="8" idx="5"/>
+            <a:endCxn id="9" idx="2"/>
+          </p:cNvCxnSpPr>
+          <p:nvPr/>
+        </p:nvCxnSpPr>
+        <p:spPr>
+          <a:xfrm rot="16200000" flipH="1">
+            <a:off x="2209486" y="2369785"/>
+            <a:ext cx="945621" cy="974066"/>
+          </a:xfrm>
+          <a:prstGeom prst="curvedConnector2">
+            <a:avLst/>
+          </a:prstGeom>
+          <a:ln w="28575">
+            <a:solidFill>
+              <a:schemeClr val="accent6">
+                <a:lumMod val="75000"/>
+              </a:schemeClr>
+            </a:solidFill>
+            <a:tailEnd type="triangle"/>
+          </a:ln>
+        </p:spPr>
+        <p:style>
+          <a:lnRef idx="1">
+            <a:schemeClr val="accent1"/>
+          </a:lnRef>
+          <a:fillRef idx="0">
+            <a:schemeClr val="accent1"/>
+          </a:fillRef>
+          <a:effectRef idx="0">
+            <a:schemeClr val="accent1"/>
+          </a:effectRef>
+          <a:fontRef idx="minor">
+            <a:schemeClr val="tx1"/>
+          </a:fontRef>
+        </p:style>
+      </p:cxnSp>
+      <p:cxnSp>
+        <p:nvCxnSpPr>
+          <p:cNvPr id="80" name="Straight Connector 79">
+            <a:extLst>
+              <a:ext uri="{FF2B5EF4-FFF2-40B4-BE49-F238E27FC236}">
+                <a16:creationId xmlns:a16="http://schemas.microsoft.com/office/drawing/2014/main" id="{0955C3A1-15D9-3F75-8E7B-F59B2A20E17B}"/>
+              </a:ext>
+            </a:extLst>
+          </p:cNvPr>
+          <p:cNvCxnSpPr>
+            <a:stCxn id="9" idx="4"/>
+            <a:endCxn id="98" idx="3"/>
+          </p:cNvCxnSpPr>
+          <p:nvPr/>
+        </p:nvCxnSpPr>
+        <p:spPr>
+          <a:xfrm flipH="1">
+            <a:off x="3486785" y="3696213"/>
+            <a:ext cx="856436" cy="16291"/>
+          </a:xfrm>
+          <a:prstGeom prst="line">
+            <a:avLst/>
+          </a:prstGeom>
+        </p:spPr>
+        <p:style>
+          <a:lnRef idx="1">
+            <a:schemeClr val="dk1"/>
+          </a:lnRef>
+          <a:fillRef idx="0">
+            <a:schemeClr val="dk1"/>
+          </a:fillRef>
+          <a:effectRef idx="0">
+            <a:schemeClr val="dk1"/>
+          </a:effectRef>
+          <a:fontRef idx="minor">
+            <a:schemeClr val="tx1"/>
+          </a:fontRef>
+        </p:style>
+      </p:cxnSp>
+      <p:cxnSp>
+        <p:nvCxnSpPr>
+          <p:cNvPr id="83" name="Straight Connector 82">
+            <a:extLst>
+              <a:ext uri="{FF2B5EF4-FFF2-40B4-BE49-F238E27FC236}">
+                <a16:creationId xmlns:a16="http://schemas.microsoft.com/office/drawing/2014/main" id="{CB9E0BF7-F0C0-2136-8F3D-1BC9EA4E260E}"/>
+              </a:ext>
+            </a:extLst>
+          </p:cNvPr>
+          <p:cNvCxnSpPr>
+            <a:stCxn id="9" idx="4"/>
+            <a:endCxn id="97" idx="3"/>
+          </p:cNvCxnSpPr>
+          <p:nvPr/>
+        </p:nvCxnSpPr>
+        <p:spPr>
+          <a:xfrm flipH="1">
+            <a:off x="3458979" y="3696213"/>
+            <a:ext cx="884242" cy="308679"/>
+          </a:xfrm>
+          <a:prstGeom prst="line">
+            <a:avLst/>
+          </a:prstGeom>
+        </p:spPr>
+        <p:style>
+          <a:lnRef idx="1">
+            <a:schemeClr val="dk1"/>
+          </a:lnRef>
+          <a:fillRef idx="0">
+            <a:schemeClr val="dk1"/>
+          </a:fillRef>
+          <a:effectRef idx="0">
+            <a:schemeClr val="dk1"/>
+          </a:effectRef>
+          <a:fontRef idx="minor">
+            <a:schemeClr val="tx1"/>
+          </a:fontRef>
+        </p:style>
+      </p:cxnSp>
+      <p:cxnSp>
+        <p:nvCxnSpPr>
+          <p:cNvPr id="94" name="Straight Arrow Connector 93">
+            <a:extLst>
+              <a:ext uri="{FF2B5EF4-FFF2-40B4-BE49-F238E27FC236}">
+                <a16:creationId xmlns:a16="http://schemas.microsoft.com/office/drawing/2014/main" id="{D428ACF1-2BBC-261E-0457-5ABBE1C7EFF3}"/>
+              </a:ext>
+            </a:extLst>
+          </p:cNvPr>
+          <p:cNvCxnSpPr>
+            <a:stCxn id="5" idx="4"/>
+            <a:endCxn id="9" idx="0"/>
+          </p:cNvCxnSpPr>
+          <p:nvPr/>
+        </p:nvCxnSpPr>
+        <p:spPr>
+          <a:xfrm>
+            <a:off x="3651196" y="2442980"/>
+            <a:ext cx="692025" cy="520065"/>
+          </a:xfrm>
+          <a:prstGeom prst="straightConnector1">
+            <a:avLst/>
+          </a:prstGeom>
+          <a:ln w="28575">
+            <a:headEnd type="triangle"/>
+            <a:tailEnd type="triangle"/>
+          </a:ln>
+        </p:spPr>
+        <p:style>
+          <a:lnRef idx="1">
+            <a:schemeClr val="dk1"/>
+          </a:lnRef>
+          <a:fillRef idx="0">
+            <a:schemeClr val="dk1"/>
+          </a:fillRef>
+          <a:effectRef idx="0">
+            <a:schemeClr val="dk1"/>
+          </a:effectRef>
+          <a:fontRef idx="minor">
+            <a:schemeClr val="tx1"/>
+          </a:fontRef>
+        </p:style>
+      </p:cxnSp>
+      <p:cxnSp>
+        <p:nvCxnSpPr>
+          <p:cNvPr id="99" name="Straight Connector 98">
+            <a:extLst>
+              <a:ext uri="{FF2B5EF4-FFF2-40B4-BE49-F238E27FC236}">
+                <a16:creationId xmlns:a16="http://schemas.microsoft.com/office/drawing/2014/main" id="{97B1B3AF-2C14-B682-D5D8-7891374B3ADD}"/>
+              </a:ext>
+            </a:extLst>
+          </p:cNvPr>
+          <p:cNvCxnSpPr>
+            <a:stCxn id="7" idx="6"/>
+            <a:endCxn id="46" idx="1"/>
+          </p:cNvCxnSpPr>
+          <p:nvPr/>
+        </p:nvCxnSpPr>
+        <p:spPr>
+          <a:xfrm flipV="1">
+            <a:off x="8942751" y="2124794"/>
+            <a:ext cx="294455" cy="480113"/>
+          </a:xfrm>
+          <a:prstGeom prst="line">
+            <a:avLst/>
+          </a:prstGeom>
+        </p:spPr>
+        <p:style>
+          <a:lnRef idx="1">
+            <a:schemeClr val="dk1"/>
+          </a:lnRef>
+          <a:fillRef idx="0">
+            <a:schemeClr val="dk1"/>
+          </a:fillRef>
+          <a:effectRef idx="0">
+            <a:schemeClr val="dk1"/>
+          </a:effectRef>
+          <a:fontRef idx="minor">
+            <a:schemeClr val="tx1"/>
+          </a:fontRef>
+        </p:style>
+      </p:cxnSp>
+      <p:cxnSp>
+        <p:nvCxnSpPr>
+          <p:cNvPr id="102" name="Straight Connector 101">
+            <a:extLst>
+              <a:ext uri="{FF2B5EF4-FFF2-40B4-BE49-F238E27FC236}">
+                <a16:creationId xmlns:a16="http://schemas.microsoft.com/office/drawing/2014/main" id="{81AEA8AD-FAF2-3E97-4158-F35389BACAC8}"/>
+              </a:ext>
+            </a:extLst>
+          </p:cNvPr>
+          <p:cNvCxnSpPr>
+            <a:stCxn id="7" idx="6"/>
+            <a:endCxn id="49" idx="1"/>
+          </p:cNvCxnSpPr>
+          <p:nvPr/>
+        </p:nvCxnSpPr>
+        <p:spPr>
+          <a:xfrm flipV="1">
+            <a:off x="8942751" y="2544464"/>
+            <a:ext cx="399773" cy="60443"/>
+          </a:xfrm>
+          <a:prstGeom prst="line">
+            <a:avLst/>
+          </a:prstGeom>
+        </p:spPr>
+        <p:style>
+          <a:lnRef idx="1">
+            <a:schemeClr val="dk1"/>
+          </a:lnRef>
+          <a:fillRef idx="0">
+            <a:schemeClr val="dk1"/>
+          </a:fillRef>
+          <a:effectRef idx="0">
+            <a:schemeClr val="dk1"/>
+          </a:effectRef>
+          <a:fontRef idx="minor">
+            <a:schemeClr val="tx1"/>
+          </a:fontRef>
+        </p:style>
+      </p:cxnSp>
+      <p:cxnSp>
+        <p:nvCxnSpPr>
+          <p:cNvPr id="104" name="Straight Connector 103">
+            <a:extLst>
+              <a:ext uri="{FF2B5EF4-FFF2-40B4-BE49-F238E27FC236}">
+                <a16:creationId xmlns:a16="http://schemas.microsoft.com/office/drawing/2014/main" id="{15797E16-74F8-1005-8753-8C1E17563290}"/>
+              </a:ext>
+            </a:extLst>
+          </p:cNvPr>
+          <p:cNvCxnSpPr>
+            <a:stCxn id="7" idx="6"/>
+            <a:endCxn id="50" idx="1"/>
+          </p:cNvCxnSpPr>
+          <p:nvPr/>
+        </p:nvCxnSpPr>
+        <p:spPr>
+          <a:xfrm>
+            <a:off x="8942751" y="2604907"/>
+            <a:ext cx="371997" cy="382229"/>
+          </a:xfrm>
+          <a:prstGeom prst="line">
+            <a:avLst/>
+          </a:prstGeom>
+        </p:spPr>
+        <p:style>
+          <a:lnRef idx="1">
+            <a:schemeClr val="dk1"/>
+          </a:lnRef>
+          <a:fillRef idx="0">
+            <a:schemeClr val="dk1"/>
+          </a:fillRef>
+          <a:effectRef idx="0">
+            <a:schemeClr val="dk1"/>
+          </a:effectRef>
+          <a:fontRef idx="minor">
+            <a:schemeClr val="tx1"/>
+          </a:fontRef>
+        </p:style>
+      </p:cxnSp>
+      <p:cxnSp>
+        <p:nvCxnSpPr>
+          <p:cNvPr id="113" name="Connector: Curved 112">
+            <a:extLst>
+              <a:ext uri="{FF2B5EF4-FFF2-40B4-BE49-F238E27FC236}">
+                <a16:creationId xmlns:a16="http://schemas.microsoft.com/office/drawing/2014/main" id="{32913139-B9B8-B244-6D1E-24E25A4EA159}"/>
+              </a:ext>
+            </a:extLst>
+          </p:cNvPr>
+          <p:cNvCxnSpPr>
+            <a:stCxn id="4" idx="4"/>
+            <a:endCxn id="5" idx="0"/>
+          </p:cNvCxnSpPr>
+          <p:nvPr/>
+        </p:nvCxnSpPr>
+        <p:spPr>
+          <a:xfrm rot="5400000">
+            <a:off x="3937369" y="857102"/>
+            <a:ext cx="663331" cy="1235676"/>
+          </a:xfrm>
+          <a:prstGeom prst="curvedConnector3">
+            <a:avLst/>
+          </a:prstGeom>
+          <a:ln w="28575">
+            <a:solidFill>
+              <a:schemeClr val="accent6">
+                <a:lumMod val="75000"/>
+              </a:schemeClr>
+            </a:solidFill>
+            <a:tailEnd type="triangle"/>
+          </a:ln>
+        </p:spPr>
+        <p:style>
+          <a:lnRef idx="1">
+            <a:schemeClr val="accent1"/>
+          </a:lnRef>
+          <a:fillRef idx="0">
+            <a:schemeClr val="accent1"/>
+          </a:fillRef>
+          <a:effectRef idx="0">
+            <a:schemeClr val="accent1"/>
+          </a:effectRef>
+          <a:fontRef idx="minor">
+            <a:schemeClr val="tx1"/>
+          </a:fontRef>
+        </p:style>
+      </p:cxnSp>
+      <p:cxnSp>
+        <p:nvCxnSpPr>
+          <p:cNvPr id="119" name="Connector: Curved 118">
+            <a:extLst>
+              <a:ext uri="{FF2B5EF4-FFF2-40B4-BE49-F238E27FC236}">
+                <a16:creationId xmlns:a16="http://schemas.microsoft.com/office/drawing/2014/main" id="{11557DC5-C7D1-A2F2-6BEB-7FA2AC0AF239}"/>
+              </a:ext>
+            </a:extLst>
+          </p:cNvPr>
+          <p:cNvCxnSpPr>
+            <a:stCxn id="4" idx="4"/>
+            <a:endCxn id="8" idx="0"/>
+          </p:cNvCxnSpPr>
+          <p:nvPr/>
+        </p:nvCxnSpPr>
+        <p:spPr>
+          <a:xfrm rot="5400000">
+            <a:off x="2818567" y="-310096"/>
+            <a:ext cx="614935" cy="3521676"/>
+          </a:xfrm>
+          <a:prstGeom prst="curvedConnector3">
+            <a:avLst/>
+          </a:prstGeom>
+          <a:ln w="28575">
+            <a:solidFill>
+              <a:schemeClr val="accent6">
+                <a:lumMod val="75000"/>
+              </a:schemeClr>
+            </a:solidFill>
+            <a:tailEnd type="triangle"/>
+          </a:ln>
+        </p:spPr>
+        <p:style>
+          <a:lnRef idx="1">
+            <a:schemeClr val="accent1"/>
+          </a:lnRef>
+          <a:fillRef idx="0">
+            <a:schemeClr val="accent1"/>
+          </a:fillRef>
+          <a:effectRef idx="0">
+            <a:schemeClr val="accent1"/>
+          </a:effectRef>
+          <a:fontRef idx="minor">
+            <a:schemeClr val="tx1"/>
+          </a:fontRef>
+        </p:style>
+      </p:cxnSp>
+      <p:cxnSp>
+        <p:nvCxnSpPr>
+          <p:cNvPr id="121" name="Straight Connector 120">
+            <a:extLst>
+              <a:ext uri="{FF2B5EF4-FFF2-40B4-BE49-F238E27FC236}">
+                <a16:creationId xmlns:a16="http://schemas.microsoft.com/office/drawing/2014/main" id="{9A11AD75-49C9-5DF5-4D82-AAD458D19BC0}"/>
+              </a:ext>
+            </a:extLst>
+          </p:cNvPr>
+          <p:cNvCxnSpPr>
+            <a:stCxn id="5" idx="2"/>
+            <a:endCxn id="96" idx="2"/>
+          </p:cNvCxnSpPr>
+          <p:nvPr/>
+        </p:nvCxnSpPr>
+        <p:spPr>
+          <a:xfrm flipH="1" flipV="1">
+            <a:off x="2311912" y="1097357"/>
+            <a:ext cx="427972" cy="1027436"/>
+          </a:xfrm>
+          <a:prstGeom prst="line">
+            <a:avLst/>
+          </a:prstGeom>
+        </p:spPr>
+        <p:style>
+          <a:lnRef idx="1">
+            <a:schemeClr val="dk1"/>
+          </a:lnRef>
+          <a:fillRef idx="0">
+            <a:schemeClr val="dk1"/>
+          </a:fillRef>
+          <a:effectRef idx="0">
+            <a:schemeClr val="dk1"/>
+          </a:effectRef>
+          <a:fontRef idx="minor">
+            <a:schemeClr val="tx1"/>
+          </a:fontRef>
+        </p:style>
+      </p:cxnSp>
+      <p:cxnSp>
+        <p:nvCxnSpPr>
+          <p:cNvPr id="124" name="Straight Connector 123">
+            <a:extLst>
+              <a:ext uri="{FF2B5EF4-FFF2-40B4-BE49-F238E27FC236}">
+                <a16:creationId xmlns:a16="http://schemas.microsoft.com/office/drawing/2014/main" id="{5E66B919-87C8-DCF2-A40B-A02C23F9425E}"/>
+              </a:ext>
+            </a:extLst>
+          </p:cNvPr>
+          <p:cNvCxnSpPr>
+            <a:stCxn id="8" idx="1"/>
+            <a:endCxn id="68" idx="2"/>
+          </p:cNvCxnSpPr>
+          <p:nvPr/>
+        </p:nvCxnSpPr>
+        <p:spPr>
+          <a:xfrm flipV="1">
+            <a:off x="535129" y="1651883"/>
+            <a:ext cx="446554" cy="213697"/>
+          </a:xfrm>
+          <a:prstGeom prst="line">
+            <a:avLst/>
+          </a:prstGeom>
+        </p:spPr>
+        <p:style>
+          <a:lnRef idx="1">
+            <a:schemeClr val="dk1"/>
+          </a:lnRef>
+          <a:fillRef idx="0">
+            <a:schemeClr val="dk1"/>
+          </a:fillRef>
+          <a:effectRef idx="0">
+            <a:schemeClr val="dk1"/>
+          </a:effectRef>
+          <a:fontRef idx="minor">
+            <a:schemeClr val="tx1"/>
+          </a:fontRef>
+        </p:style>
+      </p:cxnSp>
+      <p:sp>
+        <p:nvSpPr>
+          <p:cNvPr id="139" name="TextBox 138">
+            <a:extLst>
+              <a:ext uri="{FF2B5EF4-FFF2-40B4-BE49-F238E27FC236}">
+                <a16:creationId xmlns:a16="http://schemas.microsoft.com/office/drawing/2014/main" id="{CB5BE816-8752-526A-0B3E-73A7E2AA95FD}"/>
+              </a:ext>
+            </a:extLst>
+          </p:cNvPr>
+          <p:cNvSpPr txBox="1"/>
+          <p:nvPr/>
+        </p:nvSpPr>
+        <p:spPr>
+          <a:xfrm>
+            <a:off x="2406798" y="4192027"/>
+            <a:ext cx="1240532" cy="292388"/>
+          </a:xfrm>
+          <a:prstGeom prst="rect">
+            <a:avLst/>
+          </a:prstGeom>
+          <a:noFill/>
+        </p:spPr>
+        <p:txBody>
+          <a:bodyPr wrap="none" rtlCol="0">
+            <a:spAutoFit/>
+          </a:bodyPr>
+          <a:lstStyle/>
+          <a:p>
+            <a:r>
+              <a:rPr lang="en-US" sz="1300"/>
+              <a:t>Control process</a:t>
+            </a:r>
+          </a:p>
+        </p:txBody>
+      </p:sp>
+      <p:cxnSp>
+        <p:nvCxnSpPr>
+          <p:cNvPr id="141" name="Straight Connector 140">
+            <a:extLst>
+              <a:ext uri="{FF2B5EF4-FFF2-40B4-BE49-F238E27FC236}">
+                <a16:creationId xmlns:a16="http://schemas.microsoft.com/office/drawing/2014/main" id="{47BBFFCD-0E8F-243A-5F79-CDFC7339064E}"/>
+              </a:ext>
+            </a:extLst>
+          </p:cNvPr>
+          <p:cNvCxnSpPr>
+            <a:stCxn id="9" idx="4"/>
+            <a:endCxn id="139" idx="3"/>
+          </p:cNvCxnSpPr>
+          <p:nvPr/>
+        </p:nvCxnSpPr>
+        <p:spPr>
+          <a:xfrm flipH="1">
+            <a:off x="3647330" y="3696213"/>
+            <a:ext cx="695891" cy="642008"/>
+          </a:xfrm>
+          <a:prstGeom prst="line">
+            <a:avLst/>
+          </a:prstGeom>
+        </p:spPr>
+        <p:style>
+          <a:lnRef idx="1">
+            <a:schemeClr val="dk1"/>
+          </a:lnRef>
+          <a:fillRef idx="0">
+            <a:schemeClr val="dk1"/>
+          </a:fillRef>
+          <a:effectRef idx="0">
+            <a:schemeClr val="dk1"/>
+          </a:effectRef>
+          <a:fontRef idx="minor">
+            <a:schemeClr val="tx1"/>
+          </a:fontRef>
+        </p:style>
+      </p:cxnSp>
+      <p:sp>
+        <p:nvSpPr>
+          <p:cNvPr id="143" name="TextBox 142">
+            <a:extLst>
+              <a:ext uri="{FF2B5EF4-FFF2-40B4-BE49-F238E27FC236}">
+                <a16:creationId xmlns:a16="http://schemas.microsoft.com/office/drawing/2014/main" id="{D01A786B-3965-17D4-FE6C-B001E091927B}"/>
+              </a:ext>
+            </a:extLst>
+          </p:cNvPr>
+          <p:cNvSpPr txBox="1"/>
+          <p:nvPr/>
+        </p:nvSpPr>
+        <p:spPr>
+          <a:xfrm>
+            <a:off x="3802898" y="2379652"/>
+            <a:ext cx="1185517" cy="292388"/>
+          </a:xfrm>
+          <a:prstGeom prst="rect">
+            <a:avLst/>
+          </a:prstGeom>
+          <a:noFill/>
+        </p:spPr>
+        <p:txBody>
+          <a:bodyPr wrap="none" rtlCol="0">
+            <a:spAutoFit/>
+          </a:bodyPr>
+          <a:lstStyle/>
+          <a:p>
+            <a:r>
+              <a:rPr lang="en-US" sz="1300"/>
+              <a:t>! </a:t>
+            </a:r>
+            <a:r>
+              <a:rPr lang="en-US" sz="1300" err="1"/>
+              <a:t>Packet+event</a:t>
+            </a:r>
+            <a:endParaRPr lang="en-US" sz="1300"/>
+          </a:p>
+        </p:txBody>
+      </p:sp>
+      <p:sp>
+        <p:nvSpPr>
+          <p:cNvPr id="147" name="TextBox 146">
+            <a:extLst>
+              <a:ext uri="{FF2B5EF4-FFF2-40B4-BE49-F238E27FC236}">
+                <a16:creationId xmlns:a16="http://schemas.microsoft.com/office/drawing/2014/main" id="{E272B534-54E4-15AC-CE37-A571E55A15CC}"/>
+              </a:ext>
+            </a:extLst>
+          </p:cNvPr>
+          <p:cNvSpPr txBox="1"/>
+          <p:nvPr/>
+        </p:nvSpPr>
+        <p:spPr>
+          <a:xfrm>
+            <a:off x="622942" y="5077358"/>
+            <a:ext cx="1851533" cy="492443"/>
+          </a:xfrm>
+          <a:prstGeom prst="rect">
+            <a:avLst/>
+          </a:prstGeom>
+          <a:noFill/>
+        </p:spPr>
+        <p:txBody>
+          <a:bodyPr wrap="none" rtlCol="0">
+            <a:spAutoFit/>
+          </a:bodyPr>
+          <a:lstStyle/>
+          <a:p>
+            <a:r>
+              <a:rPr lang="en-US" sz="1300"/>
+              <a:t>(!): tell – fire and forget</a:t>
+            </a:r>
+          </a:p>
+          <a:p>
+            <a:r>
+              <a:rPr lang="en-US" sz="1300"/>
+              <a:t>(?): ask – require answer</a:t>
+            </a:r>
+          </a:p>
+        </p:txBody>
+      </p:sp>
+      <p:sp>
+        <p:nvSpPr>
+          <p:cNvPr id="148" name="Rectangle 147">
+            <a:extLst>
+              <a:ext uri="{FF2B5EF4-FFF2-40B4-BE49-F238E27FC236}">
+                <a16:creationId xmlns:a16="http://schemas.microsoft.com/office/drawing/2014/main" id="{5584575C-C9BC-B20E-30A6-B653441D33EF}"/>
+              </a:ext>
+            </a:extLst>
+          </p:cNvPr>
+          <p:cNvSpPr/>
+          <p:nvPr/>
+        </p:nvSpPr>
+        <p:spPr>
+          <a:xfrm>
+            <a:off x="626973" y="5077358"/>
+            <a:ext cx="1866142" cy="492443"/>
+          </a:xfrm>
+          <a:prstGeom prst="rect">
+            <a:avLst/>
+          </a:prstGeom>
+          <a:noFill/>
+          <a:ln w="28575" cap="flat" cmpd="sng" algn="ctr">
+            <a:solidFill>
+              <a:srgbClr val="FF0000"/>
+            </a:solidFill>
+            <a:prstDash val="solid"/>
+            <a:round/>
+            <a:headEnd type="none" w="med" len="med"/>
+            <a:tailEnd type="none" w="med" len="med"/>
+          </a:ln>
+        </p:spPr>
+        <p:style>
+          <a:lnRef idx="0">
+            <a:scrgbClr r="0" g="0" b="0"/>
+          </a:lnRef>
+          <a:fillRef idx="0">
+            <a:scrgbClr r="0" g="0" b="0"/>
+          </a:fillRef>
+          <a:effectRef idx="0">
+            <a:scrgbClr r="0" g="0" b="0"/>
+          </a:effectRef>
+          <a:fontRef idx="minor">
+            <a:schemeClr val="accent2"/>
+          </a:fontRef>
+        </p:style>
+        <p:txBody>
+          <a:bodyPr rtlCol="0" anchor="ctr"/>
+          <a:lstStyle/>
+          <a:p>
+            <a:pPr algn="ctr"/>
+            <a:endParaRPr lang="en-US"/>
+          </a:p>
+        </p:txBody>
+      </p:sp>
+      <p:cxnSp>
+        <p:nvCxnSpPr>
+          <p:cNvPr id="167" name="Connector: Curved 166">
+            <a:extLst>
+              <a:ext uri="{FF2B5EF4-FFF2-40B4-BE49-F238E27FC236}">
+                <a16:creationId xmlns:a16="http://schemas.microsoft.com/office/drawing/2014/main" id="{0CDEB4F8-84DA-9290-6757-87826582D141}"/>
+              </a:ext>
+            </a:extLst>
+          </p:cNvPr>
+          <p:cNvCxnSpPr>
+            <a:stCxn id="9" idx="5"/>
+            <a:endCxn id="6" idx="1"/>
+          </p:cNvCxnSpPr>
+          <p:nvPr/>
+        </p:nvCxnSpPr>
+        <p:spPr>
+          <a:xfrm rot="5400000">
+            <a:off x="4009263" y="3735176"/>
+            <a:ext cx="1310359" cy="1017692"/>
+          </a:xfrm>
+          <a:prstGeom prst="curvedConnector3">
+            <a:avLst/>
+          </a:prstGeom>
+          <a:ln w="28575">
+            <a:solidFill>
+              <a:schemeClr val="tx1"/>
+            </a:solidFill>
+            <a:headEnd type="triangle"/>
+            <a:tailEnd type="triangle"/>
+          </a:ln>
+        </p:spPr>
+        <p:style>
+          <a:lnRef idx="1">
+            <a:schemeClr val="accent1"/>
+          </a:lnRef>
+          <a:fillRef idx="0">
+            <a:schemeClr val="accent1"/>
+          </a:fillRef>
+          <a:effectRef idx="0">
+            <a:schemeClr val="accent1"/>
+          </a:effectRef>
+          <a:fontRef idx="minor">
+            <a:schemeClr val="tx1"/>
+          </a:fontRef>
+        </p:style>
+      </p:cxnSp>
+      <p:sp>
+        <p:nvSpPr>
+          <p:cNvPr id="168" name="TextBox 167">
+            <a:extLst>
+              <a:ext uri="{FF2B5EF4-FFF2-40B4-BE49-F238E27FC236}">
+                <a16:creationId xmlns:a16="http://schemas.microsoft.com/office/drawing/2014/main" id="{B445A428-1F6C-2DF4-AD0B-307BF7D905BB}"/>
+              </a:ext>
+            </a:extLst>
+          </p:cNvPr>
+          <p:cNvSpPr txBox="1"/>
+          <p:nvPr/>
+        </p:nvSpPr>
+        <p:spPr>
+          <a:xfrm rot="17847370">
+            <a:off x="4661810" y="3890950"/>
+            <a:ext cx="1009828" cy="276999"/>
+          </a:xfrm>
+          <a:prstGeom prst="rect">
+            <a:avLst/>
+          </a:prstGeom>
+          <a:noFill/>
+        </p:spPr>
+        <p:txBody>
+          <a:bodyPr wrap="none" rtlCol="0">
+            <a:spAutoFit/>
+          </a:bodyPr>
+          <a:lstStyle/>
+          <a:p>
+            <a:r>
+              <a:rPr lang="en-US" sz="1200"/>
+              <a:t>! Packet Infor</a:t>
+            </a:r>
+          </a:p>
+        </p:txBody>
+      </p:sp>
+      <p:sp>
+        <p:nvSpPr>
+          <p:cNvPr id="169" name="TextBox 168">
+            <a:extLst>
+              <a:ext uri="{FF2B5EF4-FFF2-40B4-BE49-F238E27FC236}">
+                <a16:creationId xmlns:a16="http://schemas.microsoft.com/office/drawing/2014/main" id="{5C1DEE2F-4B32-643B-6989-ECF4C7A6971C}"/>
+              </a:ext>
+            </a:extLst>
+          </p:cNvPr>
+          <p:cNvSpPr txBox="1"/>
+          <p:nvPr/>
+        </p:nvSpPr>
+        <p:spPr>
+          <a:xfrm rot="16846335">
+            <a:off x="7322119" y="3102065"/>
+            <a:ext cx="673582" cy="276999"/>
+          </a:xfrm>
+          <a:prstGeom prst="rect">
+            <a:avLst/>
+          </a:prstGeom>
+          <a:noFill/>
+        </p:spPr>
+        <p:txBody>
+          <a:bodyPr wrap="none" rtlCol="0">
+            <a:spAutoFit/>
+          </a:bodyPr>
+          <a:lstStyle/>
+          <a:p>
+            <a:r>
+              <a:rPr lang="en-US" sz="1200"/>
+              <a:t>! Action</a:t>
+            </a:r>
+          </a:p>
+        </p:txBody>
+      </p:sp>
+      <p:sp>
+        <p:nvSpPr>
+          <p:cNvPr id="181" name="TextBox 180">
+            <a:extLst>
+              <a:ext uri="{FF2B5EF4-FFF2-40B4-BE49-F238E27FC236}">
+                <a16:creationId xmlns:a16="http://schemas.microsoft.com/office/drawing/2014/main" id="{18FA430E-60E3-F779-3C20-88B861F782FF}"/>
+              </a:ext>
+            </a:extLst>
+          </p:cNvPr>
+          <p:cNvSpPr txBox="1"/>
+          <p:nvPr/>
+        </p:nvSpPr>
+        <p:spPr>
+          <a:xfrm rot="17847370">
+            <a:off x="3670594" y="4415023"/>
+            <a:ext cx="964688" cy="276999"/>
+          </a:xfrm>
+          <a:prstGeom prst="rect">
+            <a:avLst/>
+          </a:prstGeom>
+          <a:noFill/>
+        </p:spPr>
+        <p:txBody>
+          <a:bodyPr wrap="none" rtlCol="0">
+            <a:spAutoFit/>
+          </a:bodyPr>
+          <a:lstStyle/>
+          <a:p>
+            <a:r>
+              <a:rPr lang="en-US" sz="1200"/>
+              <a:t>! ACK Packet</a:t>
+            </a:r>
+          </a:p>
+        </p:txBody>
+      </p:sp>
+      <p:sp>
+        <p:nvSpPr>
+          <p:cNvPr id="183" name="TextBox 182">
+            <a:extLst>
+              <a:ext uri="{FF2B5EF4-FFF2-40B4-BE49-F238E27FC236}">
+                <a16:creationId xmlns:a16="http://schemas.microsoft.com/office/drawing/2014/main" id="{3AC2EDA5-18CE-1132-9982-EA9D3C11E05C}"/>
+              </a:ext>
+            </a:extLst>
+          </p:cNvPr>
+          <p:cNvSpPr txBox="1"/>
+          <p:nvPr/>
+        </p:nvSpPr>
+        <p:spPr>
+          <a:xfrm>
+            <a:off x="3667262" y="2733722"/>
+            <a:ext cx="593047" cy="292388"/>
+          </a:xfrm>
+          <a:prstGeom prst="rect">
+            <a:avLst/>
+          </a:prstGeom>
+          <a:noFill/>
+        </p:spPr>
+        <p:txBody>
+          <a:bodyPr wrap="none" rtlCol="0">
+            <a:spAutoFit/>
+          </a:bodyPr>
+          <a:lstStyle/>
+          <a:p>
+            <a:r>
+              <a:rPr lang="en-US" sz="1300"/>
+              <a:t>! Data</a:t>
+            </a:r>
+          </a:p>
+        </p:txBody>
+      </p:sp>
+    </p:spTree>
+    <p:extLst>
+      <p:ext uri="{BB962C8B-B14F-4D97-AF65-F5344CB8AC3E}">
+        <p14:creationId xmlns:p14="http://schemas.microsoft.com/office/powerpoint/2010/main" val="3179286469"/>
       </p:ext>
     </p:extLst>
   </p:cSld>

</xml_diff>

<commit_message>
Update report for web
</commit_message>
<xml_diff>
--- a/Docs/Referrences/Actor_Model.pptx
+++ b/Docs/Referrences/Actor_Model.pptx
@@ -7,6 +7,7 @@
   <p:sldIdLst>
     <p:sldId id="256" r:id="rId2"/>
     <p:sldId id="257" r:id="rId3"/>
+    <p:sldId id="258" r:id="rId4"/>
   </p:sldIdLst>
   <p:sldSz cx="12192000" cy="6858000"/>
   <p:notesSz cx="6858000" cy="9144000"/>
@@ -260,7 +261,7 @@
           <a:p>
             <a:fld id="{3840422F-E917-43B4-AE88-1B2B9C1E7A6B}" type="datetimeFigureOut">
               <a:rPr lang="en-US" smtClean="0"/>
-              <a:t>7/19/2022</a:t>
+              <a:t>8/29/2022</a:t>
             </a:fld>
             <a:endParaRPr lang="en-US"/>
           </a:p>
@@ -458,7 +459,7 @@
           <a:p>
             <a:fld id="{3840422F-E917-43B4-AE88-1B2B9C1E7A6B}" type="datetimeFigureOut">
               <a:rPr lang="en-US" smtClean="0"/>
-              <a:t>7/19/2022</a:t>
+              <a:t>8/29/2022</a:t>
             </a:fld>
             <a:endParaRPr lang="en-US"/>
           </a:p>
@@ -666,7 +667,7 @@
           <a:p>
             <a:fld id="{3840422F-E917-43B4-AE88-1B2B9C1E7A6B}" type="datetimeFigureOut">
               <a:rPr lang="en-US" smtClean="0"/>
-              <a:t>7/19/2022</a:t>
+              <a:t>8/29/2022</a:t>
             </a:fld>
             <a:endParaRPr lang="en-US"/>
           </a:p>
@@ -864,7 +865,7 @@
           <a:p>
             <a:fld id="{3840422F-E917-43B4-AE88-1B2B9C1E7A6B}" type="datetimeFigureOut">
               <a:rPr lang="en-US" smtClean="0"/>
-              <a:t>7/19/2022</a:t>
+              <a:t>8/29/2022</a:t>
             </a:fld>
             <a:endParaRPr lang="en-US"/>
           </a:p>
@@ -1139,7 +1140,7 @@
           <a:p>
             <a:fld id="{3840422F-E917-43B4-AE88-1B2B9C1E7A6B}" type="datetimeFigureOut">
               <a:rPr lang="en-US" smtClean="0"/>
-              <a:t>7/19/2022</a:t>
+              <a:t>8/29/2022</a:t>
             </a:fld>
             <a:endParaRPr lang="en-US"/>
           </a:p>
@@ -1404,7 +1405,7 @@
           <a:p>
             <a:fld id="{3840422F-E917-43B4-AE88-1B2B9C1E7A6B}" type="datetimeFigureOut">
               <a:rPr lang="en-US" smtClean="0"/>
-              <a:t>7/19/2022</a:t>
+              <a:t>8/29/2022</a:t>
             </a:fld>
             <a:endParaRPr lang="en-US"/>
           </a:p>
@@ -1816,7 +1817,7 @@
           <a:p>
             <a:fld id="{3840422F-E917-43B4-AE88-1B2B9C1E7A6B}" type="datetimeFigureOut">
               <a:rPr lang="en-US" smtClean="0"/>
-              <a:t>7/19/2022</a:t>
+              <a:t>8/29/2022</a:t>
             </a:fld>
             <a:endParaRPr lang="en-US"/>
           </a:p>
@@ -1957,7 +1958,7 @@
           <a:p>
             <a:fld id="{3840422F-E917-43B4-AE88-1B2B9C1E7A6B}" type="datetimeFigureOut">
               <a:rPr lang="en-US" smtClean="0"/>
-              <a:t>7/19/2022</a:t>
+              <a:t>8/29/2022</a:t>
             </a:fld>
             <a:endParaRPr lang="en-US"/>
           </a:p>
@@ -2070,7 +2071,7 @@
           <a:p>
             <a:fld id="{3840422F-E917-43B4-AE88-1B2B9C1E7A6B}" type="datetimeFigureOut">
               <a:rPr lang="en-US" smtClean="0"/>
-              <a:t>7/19/2022</a:t>
+              <a:t>8/29/2022</a:t>
             </a:fld>
             <a:endParaRPr lang="en-US"/>
           </a:p>
@@ -2381,7 +2382,7 @@
           <a:p>
             <a:fld id="{3840422F-E917-43B4-AE88-1B2B9C1E7A6B}" type="datetimeFigureOut">
               <a:rPr lang="en-US" smtClean="0"/>
-              <a:t>7/19/2022</a:t>
+              <a:t>8/29/2022</a:t>
             </a:fld>
             <a:endParaRPr lang="en-US"/>
           </a:p>
@@ -2669,7 +2670,7 @@
           <a:p>
             <a:fld id="{3840422F-E917-43B4-AE88-1B2B9C1E7A6B}" type="datetimeFigureOut">
               <a:rPr lang="en-US" smtClean="0"/>
-              <a:t>7/19/2022</a:t>
+              <a:t>8/29/2022</a:t>
             </a:fld>
             <a:endParaRPr lang="en-US"/>
           </a:p>
@@ -2910,7 +2911,7 @@
           <a:p>
             <a:fld id="{3840422F-E917-43B4-AE88-1B2B9C1E7A6B}" type="datetimeFigureOut">
               <a:rPr lang="en-US" smtClean="0"/>
-              <a:t>7/19/2022</a:t>
+              <a:t>8/29/2022</a:t>
             </a:fld>
             <a:endParaRPr lang="en-US"/>
           </a:p>
@@ -7623,6 +7624,2553 @@
 </p:sld>
 </file>
 
+<file path=ppt/slides/slide3.xml><?xml version="1.0" encoding="utf-8"?>
+<p:sld xmlns:a="http://schemas.openxmlformats.org/drawingml/2006/main" xmlns:r="http://schemas.openxmlformats.org/officeDocument/2006/relationships" xmlns:p="http://schemas.openxmlformats.org/presentationml/2006/main">
+  <p:cSld>
+    <p:spTree>
+      <p:nvGrpSpPr>
+        <p:cNvPr id="1" name=""/>
+        <p:cNvGrpSpPr/>
+        <p:nvPr/>
+      </p:nvGrpSpPr>
+      <p:grpSpPr>
+        <a:xfrm>
+          <a:off x="0" y="0"/>
+          <a:ext cx="0" cy="0"/>
+          <a:chOff x="0" y="0"/>
+          <a:chExt cx="0" cy="0"/>
+        </a:xfrm>
+      </p:grpSpPr>
+      <p:sp>
+        <p:nvSpPr>
+          <p:cNvPr id="4" name="Oval 3">
+            <a:extLst>
+              <a:ext uri="{FF2B5EF4-FFF2-40B4-BE49-F238E27FC236}">
+                <a16:creationId xmlns:a16="http://schemas.microsoft.com/office/drawing/2014/main" id="{520CF227-8246-1B88-0B45-03BF8B9133F4}"/>
+              </a:ext>
+            </a:extLst>
+          </p:cNvPr>
+          <p:cNvSpPr/>
+          <p:nvPr/>
+        </p:nvSpPr>
+        <p:spPr>
+          <a:xfrm>
+            <a:off x="4364012" y="1131076"/>
+            <a:ext cx="2347784" cy="733168"/>
+          </a:xfrm>
+          <a:prstGeom prst="ellipse">
+            <a:avLst/>
+          </a:prstGeom>
+          <a:noFill/>
+          <a:ln w="28575" cap="flat" cmpd="sng" algn="ctr">
+            <a:solidFill>
+              <a:schemeClr val="dk1"/>
+            </a:solidFill>
+            <a:prstDash val="solid"/>
+            <a:round/>
+            <a:headEnd type="none" w="med" len="med"/>
+            <a:tailEnd type="none" w="med" len="med"/>
+          </a:ln>
+        </p:spPr>
+        <p:style>
+          <a:lnRef idx="0">
+            <a:scrgbClr r="0" g="0" b="0"/>
+          </a:lnRef>
+          <a:fillRef idx="0">
+            <a:scrgbClr r="0" g="0" b="0"/>
+          </a:fillRef>
+          <a:effectRef idx="0">
+            <a:scrgbClr r="0" g="0" b="0"/>
+          </a:effectRef>
+          <a:fontRef idx="minor">
+            <a:schemeClr val="dk1"/>
+          </a:fontRef>
+        </p:style>
+        <p:txBody>
+          <a:bodyPr rtlCol="0" anchor="ctr"/>
+          <a:lstStyle/>
+          <a:p>
+            <a:pPr algn="ctr"/>
+            <a:r>
+              <a:rPr lang="en-US" sz="1300" b="1"/>
+              <a:t>TCPConnectionActor</a:t>
+            </a:r>
+          </a:p>
+        </p:txBody>
+      </p:sp>
+      <p:sp>
+        <p:nvSpPr>
+          <p:cNvPr id="5" name="Oval 4">
+            <a:extLst>
+              <a:ext uri="{FF2B5EF4-FFF2-40B4-BE49-F238E27FC236}">
+                <a16:creationId xmlns:a16="http://schemas.microsoft.com/office/drawing/2014/main" id="{E793D8B9-7C10-A1FF-ECE8-4100D8413501}"/>
+              </a:ext>
+            </a:extLst>
+          </p:cNvPr>
+          <p:cNvSpPr/>
+          <p:nvPr/>
+        </p:nvSpPr>
+        <p:spPr>
+          <a:xfrm>
+            <a:off x="3390916" y="2527575"/>
+            <a:ext cx="1822623" cy="636374"/>
+          </a:xfrm>
+          <a:prstGeom prst="ellipse">
+            <a:avLst/>
+          </a:prstGeom>
+          <a:noFill/>
+          <a:ln w="28575" cap="flat" cmpd="sng" algn="ctr">
+            <a:solidFill>
+              <a:schemeClr val="dk1"/>
+            </a:solidFill>
+            <a:prstDash val="solid"/>
+            <a:round/>
+            <a:headEnd type="none" w="med" len="med"/>
+            <a:tailEnd type="none" w="med" len="med"/>
+          </a:ln>
+        </p:spPr>
+        <p:style>
+          <a:lnRef idx="0">
+            <a:scrgbClr r="0" g="0" b="0"/>
+          </a:lnRef>
+          <a:fillRef idx="0">
+            <a:scrgbClr r="0" g="0" b="0"/>
+          </a:fillRef>
+          <a:effectRef idx="0">
+            <a:scrgbClr r="0" g="0" b="0"/>
+          </a:effectRef>
+          <a:fontRef idx="minor">
+            <a:schemeClr val="dk1"/>
+          </a:fontRef>
+        </p:style>
+        <p:txBody>
+          <a:bodyPr rtlCol="0" anchor="ctr"/>
+          <a:lstStyle/>
+          <a:p>
+            <a:pPr algn="ctr"/>
+            <a:r>
+              <a:rPr lang="en-US" sz="1300" b="1" err="1"/>
+              <a:t>EventHandler</a:t>
+            </a:r>
+            <a:endParaRPr lang="en-US" sz="1300" b="1"/>
+          </a:p>
+        </p:txBody>
+      </p:sp>
+      <p:sp>
+        <p:nvSpPr>
+          <p:cNvPr id="6" name="Oval 5">
+            <a:extLst>
+              <a:ext uri="{FF2B5EF4-FFF2-40B4-BE49-F238E27FC236}">
+                <a16:creationId xmlns:a16="http://schemas.microsoft.com/office/drawing/2014/main" id="{38D779C5-B302-6C0E-D06D-20C9849D6438}"/>
+              </a:ext>
+            </a:extLst>
+          </p:cNvPr>
+          <p:cNvSpPr/>
+          <p:nvPr/>
+        </p:nvSpPr>
+        <p:spPr>
+          <a:xfrm>
+            <a:off x="4439731" y="5512801"/>
+            <a:ext cx="2505330" cy="733168"/>
+          </a:xfrm>
+          <a:prstGeom prst="ellipse">
+            <a:avLst/>
+          </a:prstGeom>
+          <a:noFill/>
+          <a:ln w="28575" cap="flat" cmpd="sng" algn="ctr">
+            <a:solidFill>
+              <a:schemeClr val="dk1"/>
+            </a:solidFill>
+            <a:prstDash val="solid"/>
+            <a:round/>
+            <a:headEnd type="none" w="med" len="med"/>
+            <a:tailEnd type="none" w="med" len="med"/>
+          </a:ln>
+        </p:spPr>
+        <p:style>
+          <a:lnRef idx="0">
+            <a:scrgbClr r="0" g="0" b="0"/>
+          </a:lnRef>
+          <a:fillRef idx="0">
+            <a:scrgbClr r="0" g="0" b="0"/>
+          </a:fillRef>
+          <a:effectRef idx="0">
+            <a:scrgbClr r="0" g="0" b="0"/>
+          </a:effectRef>
+          <a:fontRef idx="minor">
+            <a:schemeClr val="dk1"/>
+          </a:fontRef>
+        </p:style>
+        <p:txBody>
+          <a:bodyPr rtlCol="0" anchor="ctr"/>
+          <a:lstStyle/>
+          <a:p>
+            <a:pPr algn="ctr"/>
+            <a:r>
+              <a:rPr lang="en-US" sz="1300" b="1" err="1"/>
+              <a:t>MqttConnectionActor</a:t>
+            </a:r>
+            <a:endParaRPr lang="en-US" sz="1300" b="1"/>
+          </a:p>
+        </p:txBody>
+      </p:sp>
+      <p:sp>
+        <p:nvSpPr>
+          <p:cNvPr id="7" name="Oval 6">
+            <a:extLst>
+              <a:ext uri="{FF2B5EF4-FFF2-40B4-BE49-F238E27FC236}">
+                <a16:creationId xmlns:a16="http://schemas.microsoft.com/office/drawing/2014/main" id="{4F5241F0-74D0-D1B7-BE27-58F478B44262}"/>
+              </a:ext>
+            </a:extLst>
+          </p:cNvPr>
+          <p:cNvSpPr/>
+          <p:nvPr/>
+        </p:nvSpPr>
+        <p:spPr>
+          <a:xfrm>
+            <a:off x="7396338" y="3007689"/>
+            <a:ext cx="2197445" cy="636374"/>
+          </a:xfrm>
+          <a:prstGeom prst="ellipse">
+            <a:avLst/>
+          </a:prstGeom>
+          <a:noFill/>
+          <a:ln w="28575" cap="flat" cmpd="sng" algn="ctr">
+            <a:solidFill>
+              <a:schemeClr val="dk1"/>
+            </a:solidFill>
+            <a:prstDash val="solid"/>
+            <a:round/>
+            <a:headEnd type="none" w="med" len="med"/>
+            <a:tailEnd type="none" w="med" len="med"/>
+          </a:ln>
+        </p:spPr>
+        <p:style>
+          <a:lnRef idx="0">
+            <a:scrgbClr r="0" g="0" b="0"/>
+          </a:lnRef>
+          <a:fillRef idx="0">
+            <a:scrgbClr r="0" g="0" b="0"/>
+          </a:fillRef>
+          <a:effectRef idx="0">
+            <a:scrgbClr r="0" g="0" b="0"/>
+          </a:effectRef>
+          <a:fontRef idx="minor">
+            <a:schemeClr val="dk1"/>
+          </a:fontRef>
+        </p:style>
+        <p:txBody>
+          <a:bodyPr rtlCol="0" anchor="ctr"/>
+          <a:lstStyle/>
+          <a:p>
+            <a:pPr algn="ctr"/>
+            <a:r>
+              <a:rPr lang="en-US" sz="1300" b="1" err="1"/>
+              <a:t>PacketTransformer</a:t>
+            </a:r>
+            <a:endParaRPr lang="en-US" sz="1300" b="1"/>
+          </a:p>
+        </p:txBody>
+      </p:sp>
+      <p:sp>
+        <p:nvSpPr>
+          <p:cNvPr id="8" name="Oval 7">
+            <a:extLst>
+              <a:ext uri="{FF2B5EF4-FFF2-40B4-BE49-F238E27FC236}">
+                <a16:creationId xmlns:a16="http://schemas.microsoft.com/office/drawing/2014/main" id="{ACFB14D4-1DE2-CD62-191C-6E6355E32ABA}"/>
+              </a:ext>
+            </a:extLst>
+          </p:cNvPr>
+          <p:cNvSpPr/>
+          <p:nvPr/>
+        </p:nvSpPr>
+        <p:spPr>
+          <a:xfrm>
+            <a:off x="842336" y="2479179"/>
+            <a:ext cx="2347784" cy="733168"/>
+          </a:xfrm>
+          <a:prstGeom prst="ellipse">
+            <a:avLst/>
+          </a:prstGeom>
+          <a:noFill/>
+          <a:ln w="28575" cap="flat" cmpd="sng" algn="ctr">
+            <a:solidFill>
+              <a:schemeClr val="dk1"/>
+            </a:solidFill>
+            <a:prstDash val="solid"/>
+            <a:round/>
+            <a:headEnd type="none" w="med" len="med"/>
+            <a:tailEnd type="none" w="med" len="med"/>
+          </a:ln>
+        </p:spPr>
+        <p:style>
+          <a:lnRef idx="0">
+            <a:scrgbClr r="0" g="0" b="0"/>
+          </a:lnRef>
+          <a:fillRef idx="0">
+            <a:scrgbClr r="0" g="0" b="0"/>
+          </a:fillRef>
+          <a:effectRef idx="0">
+            <a:scrgbClr r="0" g="0" b="0"/>
+          </a:effectRef>
+          <a:fontRef idx="minor">
+            <a:schemeClr val="dk1"/>
+          </a:fontRef>
+        </p:style>
+        <p:txBody>
+          <a:bodyPr rtlCol="0" anchor="ctr"/>
+          <a:lstStyle/>
+          <a:p>
+            <a:pPr algn="ctr"/>
+            <a:r>
+              <a:rPr lang="en-US" sz="1300" b="1" err="1"/>
+              <a:t>SessionManager</a:t>
+            </a:r>
+            <a:endParaRPr lang="en-US" sz="1300" b="1"/>
+          </a:p>
+        </p:txBody>
+      </p:sp>
+      <p:sp>
+        <p:nvSpPr>
+          <p:cNvPr id="9" name="Oval 8">
+            <a:extLst>
+              <a:ext uri="{FF2B5EF4-FFF2-40B4-BE49-F238E27FC236}">
+                <a16:creationId xmlns:a16="http://schemas.microsoft.com/office/drawing/2014/main" id="{9866ACD9-C9D5-B07F-FFDF-287000A8AD5D}"/>
+              </a:ext>
+            </a:extLst>
+          </p:cNvPr>
+          <p:cNvSpPr/>
+          <p:nvPr/>
+        </p:nvSpPr>
+        <p:spPr>
+          <a:xfrm>
+            <a:off x="3820361" y="3684014"/>
+            <a:ext cx="2347784" cy="733168"/>
+          </a:xfrm>
+          <a:prstGeom prst="ellipse">
+            <a:avLst/>
+          </a:prstGeom>
+          <a:noFill/>
+          <a:ln w="28575" cap="flat" cmpd="sng" algn="ctr">
+            <a:solidFill>
+              <a:schemeClr val="dk1"/>
+            </a:solidFill>
+            <a:prstDash val="solid"/>
+            <a:round/>
+            <a:headEnd type="none" w="med" len="med"/>
+            <a:tailEnd type="none" w="med" len="med"/>
+          </a:ln>
+        </p:spPr>
+        <p:style>
+          <a:lnRef idx="0">
+            <a:scrgbClr r="0" g="0" b="0"/>
+          </a:lnRef>
+          <a:fillRef idx="0">
+            <a:scrgbClr r="0" g="0" b="0"/>
+          </a:fillRef>
+          <a:effectRef idx="0">
+            <a:scrgbClr r="0" g="0" b="0"/>
+          </a:effectRef>
+          <a:fontRef idx="minor">
+            <a:schemeClr val="dk1"/>
+          </a:fontRef>
+        </p:style>
+        <p:txBody>
+          <a:bodyPr rtlCol="0" anchor="ctr"/>
+          <a:lstStyle/>
+          <a:p>
+            <a:pPr algn="ctr"/>
+            <a:r>
+              <a:rPr lang="en-US" sz="1300" b="1" err="1"/>
+              <a:t>SessionHandler</a:t>
+            </a:r>
+            <a:endParaRPr lang="en-US" sz="1300" b="1"/>
+          </a:p>
+        </p:txBody>
+      </p:sp>
+      <p:cxnSp>
+        <p:nvCxnSpPr>
+          <p:cNvPr id="14" name="Connector: Curved 13">
+            <a:extLst>
+              <a:ext uri="{FF2B5EF4-FFF2-40B4-BE49-F238E27FC236}">
+                <a16:creationId xmlns:a16="http://schemas.microsoft.com/office/drawing/2014/main" id="{B71D1616-604D-9FF3-6875-9C9C6FE62B34}"/>
+              </a:ext>
+            </a:extLst>
+          </p:cNvPr>
+          <p:cNvCxnSpPr>
+            <a:cxnSpLocks/>
+            <a:stCxn id="4" idx="6"/>
+            <a:endCxn id="7" idx="0"/>
+          </p:cNvCxnSpPr>
+          <p:nvPr/>
+        </p:nvCxnSpPr>
+        <p:spPr>
+          <a:xfrm>
+            <a:off x="6711796" y="1497660"/>
+            <a:ext cx="1783265" cy="1510029"/>
+          </a:xfrm>
+          <a:prstGeom prst="curvedConnector2">
+            <a:avLst/>
+          </a:prstGeom>
+          <a:ln w="28575">
+            <a:headEnd type="triangle"/>
+            <a:tailEnd type="triangle"/>
+          </a:ln>
+        </p:spPr>
+        <p:style>
+          <a:lnRef idx="1">
+            <a:schemeClr val="accent1"/>
+          </a:lnRef>
+          <a:fillRef idx="0">
+            <a:schemeClr val="accent1"/>
+          </a:fillRef>
+          <a:effectRef idx="0">
+            <a:schemeClr val="accent1"/>
+          </a:effectRef>
+          <a:fontRef idx="minor">
+            <a:schemeClr val="tx1"/>
+          </a:fontRef>
+        </p:style>
+      </p:cxnSp>
+      <p:sp>
+        <p:nvSpPr>
+          <p:cNvPr id="15" name="TextBox 14">
+            <a:extLst>
+              <a:ext uri="{FF2B5EF4-FFF2-40B4-BE49-F238E27FC236}">
+                <a16:creationId xmlns:a16="http://schemas.microsoft.com/office/drawing/2014/main" id="{2A6FD2AB-DF3F-5ED8-F4B8-8D5DF3191B85}"/>
+              </a:ext>
+            </a:extLst>
+          </p:cNvPr>
+          <p:cNvSpPr txBox="1"/>
+          <p:nvPr/>
+        </p:nvSpPr>
+        <p:spPr>
+          <a:xfrm>
+            <a:off x="8332196" y="2044071"/>
+            <a:ext cx="1076000" cy="276999"/>
+          </a:xfrm>
+          <a:prstGeom prst="rect">
+            <a:avLst/>
+          </a:prstGeom>
+          <a:noFill/>
+        </p:spPr>
+        <p:txBody>
+          <a:bodyPr wrap="none" rtlCol="0">
+            <a:spAutoFit/>
+          </a:bodyPr>
+          <a:lstStyle/>
+          <a:p>
+            <a:r>
+              <a:rPr lang="en-US" sz="1200"/>
+              <a:t>Packet Stream</a:t>
+            </a:r>
+          </a:p>
+        </p:txBody>
+      </p:sp>
+      <p:sp>
+        <p:nvSpPr>
+          <p:cNvPr id="19" name="TextBox 18">
+            <a:extLst>
+              <a:ext uri="{FF2B5EF4-FFF2-40B4-BE49-F238E27FC236}">
+                <a16:creationId xmlns:a16="http://schemas.microsoft.com/office/drawing/2014/main" id="{2F33FFE0-1121-2046-9B8D-D33F4C46DA86}"/>
+              </a:ext>
+            </a:extLst>
+          </p:cNvPr>
+          <p:cNvSpPr txBox="1"/>
+          <p:nvPr/>
+        </p:nvSpPr>
+        <p:spPr>
+          <a:xfrm>
+            <a:off x="5888007" y="1981317"/>
+            <a:ext cx="1632562" cy="461665"/>
+          </a:xfrm>
+          <a:prstGeom prst="rect">
+            <a:avLst/>
+          </a:prstGeom>
+          <a:noFill/>
+        </p:spPr>
+        <p:txBody>
+          <a:bodyPr wrap="square" rtlCol="0">
+            <a:spAutoFit/>
+          </a:bodyPr>
+          <a:lstStyle/>
+          <a:p>
+            <a:pPr algn="ctr"/>
+            <a:r>
+              <a:rPr lang="en-US" sz="1200"/>
+              <a:t>+ 1 Connection</a:t>
+            </a:r>
+          </a:p>
+          <a:p>
+            <a:pPr algn="ctr"/>
+            <a:r>
+              <a:rPr lang="en-US" sz="1200"/>
+              <a:t>Create new Actor</a:t>
+            </a:r>
+          </a:p>
+        </p:txBody>
+      </p:sp>
+      <p:cxnSp>
+        <p:nvCxnSpPr>
+          <p:cNvPr id="24" name="Connector: Curved 23">
+            <a:extLst>
+              <a:ext uri="{FF2B5EF4-FFF2-40B4-BE49-F238E27FC236}">
+                <a16:creationId xmlns:a16="http://schemas.microsoft.com/office/drawing/2014/main" id="{0AA06163-BF86-93E0-D9E2-518E0EDD0B70}"/>
+              </a:ext>
+            </a:extLst>
+          </p:cNvPr>
+          <p:cNvCxnSpPr>
+            <a:cxnSpLocks/>
+            <a:stCxn id="7" idx="4"/>
+            <a:endCxn id="6" idx="6"/>
+          </p:cNvCxnSpPr>
+          <p:nvPr/>
+        </p:nvCxnSpPr>
+        <p:spPr>
+          <a:xfrm rot="5400000">
+            <a:off x="6602400" y="3986724"/>
+            <a:ext cx="2235322" cy="1550000"/>
+          </a:xfrm>
+          <a:prstGeom prst="curvedConnector2">
+            <a:avLst/>
+          </a:prstGeom>
+          <a:ln w="28575">
+            <a:headEnd type="triangle"/>
+            <a:tailEnd type="triangle"/>
+          </a:ln>
+        </p:spPr>
+        <p:style>
+          <a:lnRef idx="1">
+            <a:schemeClr val="dk1"/>
+          </a:lnRef>
+          <a:fillRef idx="0">
+            <a:schemeClr val="dk1"/>
+          </a:fillRef>
+          <a:effectRef idx="0">
+            <a:schemeClr val="dk1"/>
+          </a:effectRef>
+          <a:fontRef idx="minor">
+            <a:schemeClr val="tx1"/>
+          </a:fontRef>
+        </p:style>
+      </p:cxnSp>
+      <p:sp>
+        <p:nvSpPr>
+          <p:cNvPr id="26" name="TextBox 25">
+            <a:extLst>
+              <a:ext uri="{FF2B5EF4-FFF2-40B4-BE49-F238E27FC236}">
+                <a16:creationId xmlns:a16="http://schemas.microsoft.com/office/drawing/2014/main" id="{ED9401C0-30CA-B209-1591-E3246B3CBB81}"/>
+              </a:ext>
+            </a:extLst>
+          </p:cNvPr>
+          <p:cNvSpPr txBox="1"/>
+          <p:nvPr/>
+        </p:nvSpPr>
+        <p:spPr>
+          <a:xfrm rot="19493869">
+            <a:off x="7119832" y="5539763"/>
+            <a:ext cx="1272464" cy="276999"/>
+          </a:xfrm>
+          <a:prstGeom prst="rect">
+            <a:avLst/>
+          </a:prstGeom>
+          <a:noFill/>
+        </p:spPr>
+        <p:txBody>
+          <a:bodyPr wrap="none" rtlCol="0">
+            <a:spAutoFit/>
+          </a:bodyPr>
+          <a:lstStyle/>
+          <a:p>
+            <a:r>
+              <a:rPr lang="en-US" sz="1200"/>
+              <a:t>! Decoded packet</a:t>
+            </a:r>
+          </a:p>
+        </p:txBody>
+      </p:sp>
+      <p:sp>
+        <p:nvSpPr>
+          <p:cNvPr id="32" name="TextBox 31">
+            <a:extLst>
+              <a:ext uri="{FF2B5EF4-FFF2-40B4-BE49-F238E27FC236}">
+                <a16:creationId xmlns:a16="http://schemas.microsoft.com/office/drawing/2014/main" id="{79909873-B902-EF69-88C2-249A2D37BAD1}"/>
+              </a:ext>
+            </a:extLst>
+          </p:cNvPr>
+          <p:cNvSpPr txBox="1"/>
+          <p:nvPr/>
+        </p:nvSpPr>
+        <p:spPr>
+          <a:xfrm>
+            <a:off x="6190353" y="4582811"/>
+            <a:ext cx="1270541" cy="461665"/>
+          </a:xfrm>
+          <a:prstGeom prst="rect">
+            <a:avLst/>
+          </a:prstGeom>
+          <a:noFill/>
+        </p:spPr>
+        <p:txBody>
+          <a:bodyPr wrap="none" rtlCol="0">
+            <a:spAutoFit/>
+          </a:bodyPr>
+          <a:lstStyle/>
+          <a:p>
+            <a:r>
+              <a:rPr lang="en-US" sz="1200"/>
+              <a:t>+ Packet valid</a:t>
+            </a:r>
+          </a:p>
+          <a:p>
+            <a:r>
+              <a:rPr lang="en-US" sz="1200"/>
+              <a:t>Create new Actor</a:t>
+            </a:r>
+          </a:p>
+        </p:txBody>
+      </p:sp>
+      <p:sp>
+        <p:nvSpPr>
+          <p:cNvPr id="37" name="TextBox 36">
+            <a:extLst>
+              <a:ext uri="{FF2B5EF4-FFF2-40B4-BE49-F238E27FC236}">
+                <a16:creationId xmlns:a16="http://schemas.microsoft.com/office/drawing/2014/main" id="{7E10595A-1269-63B9-DAC2-7A94FB4B7793}"/>
+              </a:ext>
+            </a:extLst>
+          </p:cNvPr>
+          <p:cNvSpPr txBox="1"/>
+          <p:nvPr/>
+        </p:nvSpPr>
+        <p:spPr>
+          <a:xfrm>
+            <a:off x="881547" y="4353692"/>
+            <a:ext cx="1608967" cy="646331"/>
+          </a:xfrm>
+          <a:prstGeom prst="rect">
+            <a:avLst/>
+          </a:prstGeom>
+          <a:noFill/>
+        </p:spPr>
+        <p:txBody>
+          <a:bodyPr wrap="none" rtlCol="0">
+            <a:spAutoFit/>
+          </a:bodyPr>
+          <a:lstStyle/>
+          <a:p>
+            <a:pPr algn="ctr"/>
+            <a:r>
+              <a:rPr lang="en-US" sz="1200"/>
+              <a:t>? New </a:t>
+            </a:r>
+            <a:r>
+              <a:rPr lang="en-US" sz="1200" err="1"/>
+              <a:t>SessionHandler</a:t>
+            </a:r>
+            <a:r>
+              <a:rPr lang="en-US" sz="1200"/>
+              <a:t> </a:t>
+            </a:r>
+          </a:p>
+          <a:p>
+            <a:pPr algn="ctr"/>
+            <a:r>
+              <a:rPr lang="en-US" sz="1200"/>
+              <a:t>Actor  to Handle </a:t>
+            </a:r>
+          </a:p>
+          <a:p>
+            <a:pPr algn="ctr"/>
+            <a:r>
+              <a:rPr lang="en-US" sz="1200"/>
+              <a:t>new Connection</a:t>
+            </a:r>
+          </a:p>
+        </p:txBody>
+      </p:sp>
+      <p:sp>
+        <p:nvSpPr>
+          <p:cNvPr id="43" name="TextBox 42">
+            <a:extLst>
+              <a:ext uri="{FF2B5EF4-FFF2-40B4-BE49-F238E27FC236}">
+                <a16:creationId xmlns:a16="http://schemas.microsoft.com/office/drawing/2014/main" id="{8EC46595-E9FE-929C-9F05-8C07297D949C}"/>
+              </a:ext>
+            </a:extLst>
+          </p:cNvPr>
+          <p:cNvSpPr txBox="1"/>
+          <p:nvPr/>
+        </p:nvSpPr>
+        <p:spPr>
+          <a:xfrm>
+            <a:off x="2882992" y="3128781"/>
+            <a:ext cx="1270541" cy="461665"/>
+          </a:xfrm>
+          <a:prstGeom prst="rect">
+            <a:avLst/>
+          </a:prstGeom>
+          <a:noFill/>
+        </p:spPr>
+        <p:txBody>
+          <a:bodyPr wrap="none" rtlCol="0">
+            <a:spAutoFit/>
+          </a:bodyPr>
+          <a:lstStyle/>
+          <a:p>
+            <a:r>
+              <a:rPr lang="en-US" sz="1200"/>
+              <a:t>+ New device</a:t>
+            </a:r>
+          </a:p>
+          <a:p>
+            <a:r>
+              <a:rPr lang="en-US" sz="1200"/>
+              <a:t>Create new Actor</a:t>
+            </a:r>
+          </a:p>
+        </p:txBody>
+      </p:sp>
+      <p:sp>
+        <p:nvSpPr>
+          <p:cNvPr id="46" name="TextBox 45">
+            <a:extLst>
+              <a:ext uri="{FF2B5EF4-FFF2-40B4-BE49-F238E27FC236}">
+                <a16:creationId xmlns:a16="http://schemas.microsoft.com/office/drawing/2014/main" id="{8C5A3595-7A94-EFA2-BF1C-2B788EB740C5}"/>
+              </a:ext>
+            </a:extLst>
+          </p:cNvPr>
+          <p:cNvSpPr txBox="1"/>
+          <p:nvPr/>
+        </p:nvSpPr>
+        <p:spPr>
+          <a:xfrm>
+            <a:off x="9888238" y="2707263"/>
+            <a:ext cx="1441741" cy="276999"/>
+          </a:xfrm>
+          <a:prstGeom prst="rect">
+            <a:avLst/>
+          </a:prstGeom>
+          <a:noFill/>
+        </p:spPr>
+        <p:txBody>
+          <a:bodyPr wrap="none" rtlCol="0">
+            <a:spAutoFit/>
+          </a:bodyPr>
+          <a:lstStyle/>
+          <a:p>
+            <a:r>
+              <a:rPr lang="en-US" sz="1200"/>
+              <a:t>Receive raw packets</a:t>
+            </a:r>
+          </a:p>
+        </p:txBody>
+      </p:sp>
+      <p:sp>
+        <p:nvSpPr>
+          <p:cNvPr id="49" name="TextBox 48">
+            <a:extLst>
+              <a:ext uri="{FF2B5EF4-FFF2-40B4-BE49-F238E27FC236}">
+                <a16:creationId xmlns:a16="http://schemas.microsoft.com/office/drawing/2014/main" id="{A1D2755F-B6B6-9F59-C7EC-70254FC61857}"/>
+              </a:ext>
+            </a:extLst>
+          </p:cNvPr>
+          <p:cNvSpPr txBox="1"/>
+          <p:nvPr/>
+        </p:nvSpPr>
+        <p:spPr>
+          <a:xfrm>
+            <a:off x="9993556" y="3126933"/>
+            <a:ext cx="1174424" cy="276999"/>
+          </a:xfrm>
+          <a:prstGeom prst="rect">
+            <a:avLst/>
+          </a:prstGeom>
+          <a:noFill/>
+        </p:spPr>
+        <p:txBody>
+          <a:bodyPr wrap="none" rtlCol="0">
+            <a:spAutoFit/>
+          </a:bodyPr>
+          <a:lstStyle/>
+          <a:p>
+            <a:r>
+              <a:rPr lang="en-US" sz="1200"/>
+              <a:t>Analyze packets</a:t>
+            </a:r>
+          </a:p>
+        </p:txBody>
+      </p:sp>
+      <p:sp>
+        <p:nvSpPr>
+          <p:cNvPr id="50" name="TextBox 49">
+            <a:extLst>
+              <a:ext uri="{FF2B5EF4-FFF2-40B4-BE49-F238E27FC236}">
+                <a16:creationId xmlns:a16="http://schemas.microsoft.com/office/drawing/2014/main" id="{EDECA568-596F-F50C-20DE-94F32E7EBD2A}"/>
+              </a:ext>
+            </a:extLst>
+          </p:cNvPr>
+          <p:cNvSpPr txBox="1"/>
+          <p:nvPr/>
+        </p:nvSpPr>
+        <p:spPr>
+          <a:xfrm>
+            <a:off x="9965780" y="3569605"/>
+            <a:ext cx="1308820" cy="276999"/>
+          </a:xfrm>
+          <a:prstGeom prst="rect">
+            <a:avLst/>
+          </a:prstGeom>
+          <a:noFill/>
+        </p:spPr>
+        <p:txBody>
+          <a:bodyPr wrap="none" rtlCol="0">
+            <a:spAutoFit/>
+          </a:bodyPr>
+          <a:lstStyle/>
+          <a:p>
+            <a:r>
+              <a:rPr lang="en-US" sz="1200"/>
+              <a:t>Distribute packets</a:t>
+            </a:r>
+          </a:p>
+        </p:txBody>
+      </p:sp>
+      <p:sp>
+        <p:nvSpPr>
+          <p:cNvPr id="56" name="TextBox 55">
+            <a:extLst>
+              <a:ext uri="{FF2B5EF4-FFF2-40B4-BE49-F238E27FC236}">
+                <a16:creationId xmlns:a16="http://schemas.microsoft.com/office/drawing/2014/main" id="{7CCCB0F6-B427-9637-E638-76168ACD40FE}"/>
+              </a:ext>
+            </a:extLst>
+          </p:cNvPr>
+          <p:cNvSpPr txBox="1"/>
+          <p:nvPr/>
+        </p:nvSpPr>
+        <p:spPr>
+          <a:xfrm>
+            <a:off x="8375170" y="5734808"/>
+            <a:ext cx="1749197" cy="276999"/>
+          </a:xfrm>
+          <a:prstGeom prst="rect">
+            <a:avLst/>
+          </a:prstGeom>
+          <a:noFill/>
+        </p:spPr>
+        <p:txBody>
+          <a:bodyPr wrap="none" rtlCol="0">
+            <a:spAutoFit/>
+          </a:bodyPr>
+          <a:lstStyle/>
+          <a:p>
+            <a:r>
+              <a:rPr lang="en-US" sz="1200"/>
+              <a:t>Receive decoded packets</a:t>
+            </a:r>
+          </a:p>
+        </p:txBody>
+      </p:sp>
+      <p:sp>
+        <p:nvSpPr>
+          <p:cNvPr id="59" name="TextBox 58">
+            <a:extLst>
+              <a:ext uri="{FF2B5EF4-FFF2-40B4-BE49-F238E27FC236}">
+                <a16:creationId xmlns:a16="http://schemas.microsoft.com/office/drawing/2014/main" id="{AA0D86C8-3F50-ABD4-7B26-BB329CDFABB0}"/>
+              </a:ext>
+            </a:extLst>
+          </p:cNvPr>
+          <p:cNvSpPr txBox="1"/>
+          <p:nvPr/>
+        </p:nvSpPr>
+        <p:spPr>
+          <a:xfrm>
+            <a:off x="8375170" y="5982754"/>
+            <a:ext cx="2184765" cy="461665"/>
+          </a:xfrm>
+          <a:prstGeom prst="rect">
+            <a:avLst/>
+          </a:prstGeom>
+          <a:noFill/>
+        </p:spPr>
+        <p:txBody>
+          <a:bodyPr wrap="none" rtlCol="0">
+            <a:spAutoFit/>
+          </a:bodyPr>
+          <a:lstStyle/>
+          <a:p>
+            <a:r>
+              <a:rPr lang="en-US" sz="1200"/>
+              <a:t>If connection: request to create </a:t>
+            </a:r>
+          </a:p>
+          <a:p>
+            <a:r>
+              <a:rPr lang="en-US" sz="1200"/>
+              <a:t>new </a:t>
+            </a:r>
+            <a:r>
+              <a:rPr lang="en-US" sz="1200" err="1"/>
+              <a:t>SessionHandler</a:t>
+            </a:r>
+            <a:r>
+              <a:rPr lang="en-US" sz="1200"/>
+              <a:t> Actor </a:t>
+            </a:r>
+          </a:p>
+        </p:txBody>
+      </p:sp>
+      <p:sp>
+        <p:nvSpPr>
+          <p:cNvPr id="60" name="TextBox 59">
+            <a:extLst>
+              <a:ext uri="{FF2B5EF4-FFF2-40B4-BE49-F238E27FC236}">
+                <a16:creationId xmlns:a16="http://schemas.microsoft.com/office/drawing/2014/main" id="{96181793-3501-2AE9-A0CD-4039B61D605D}"/>
+              </a:ext>
+            </a:extLst>
+          </p:cNvPr>
+          <p:cNvSpPr txBox="1"/>
+          <p:nvPr/>
+        </p:nvSpPr>
+        <p:spPr>
+          <a:xfrm>
+            <a:off x="8356530" y="6415366"/>
+            <a:ext cx="3380862" cy="276999"/>
+          </a:xfrm>
+          <a:prstGeom prst="rect">
+            <a:avLst/>
+          </a:prstGeom>
+          <a:noFill/>
+        </p:spPr>
+        <p:txBody>
+          <a:bodyPr wrap="none" rtlCol="0">
+            <a:spAutoFit/>
+          </a:bodyPr>
+          <a:lstStyle/>
+          <a:p>
+            <a:r>
+              <a:rPr lang="en-US" sz="1200"/>
+              <a:t>Check packet and tell PacketTransformer the action</a:t>
+            </a:r>
+          </a:p>
+        </p:txBody>
+      </p:sp>
+      <p:cxnSp>
+        <p:nvCxnSpPr>
+          <p:cNvPr id="62" name="Straight Connector 61">
+            <a:extLst>
+              <a:ext uri="{FF2B5EF4-FFF2-40B4-BE49-F238E27FC236}">
+                <a16:creationId xmlns:a16="http://schemas.microsoft.com/office/drawing/2014/main" id="{FE542DF7-7FBD-EBB8-80DD-9AC1A8CA721C}"/>
+              </a:ext>
+            </a:extLst>
+          </p:cNvPr>
+          <p:cNvCxnSpPr>
+            <a:stCxn id="6" idx="5"/>
+            <a:endCxn id="60" idx="1"/>
+          </p:cNvCxnSpPr>
+          <p:nvPr/>
+        </p:nvCxnSpPr>
+        <p:spPr>
+          <a:xfrm>
+            <a:off x="6578164" y="6138599"/>
+            <a:ext cx="1778366" cy="415267"/>
+          </a:xfrm>
+          <a:prstGeom prst="line">
+            <a:avLst/>
+          </a:prstGeom>
+          <a:ln>
+            <a:solidFill>
+              <a:schemeClr val="tx1"/>
+            </a:solidFill>
+          </a:ln>
+        </p:spPr>
+        <p:style>
+          <a:lnRef idx="1">
+            <a:schemeClr val="accent1"/>
+          </a:lnRef>
+          <a:fillRef idx="0">
+            <a:schemeClr val="accent1"/>
+          </a:fillRef>
+          <a:effectRef idx="0">
+            <a:schemeClr val="accent1"/>
+          </a:effectRef>
+          <a:fontRef idx="minor">
+            <a:schemeClr val="tx1"/>
+          </a:fontRef>
+        </p:style>
+      </p:cxnSp>
+      <p:sp>
+        <p:nvSpPr>
+          <p:cNvPr id="68" name="TextBox 67">
+            <a:extLst>
+              <a:ext uri="{FF2B5EF4-FFF2-40B4-BE49-F238E27FC236}">
+                <a16:creationId xmlns:a16="http://schemas.microsoft.com/office/drawing/2014/main" id="{4F8251FB-CD12-95CF-E13C-34F1DECC2C9D}"/>
+              </a:ext>
+            </a:extLst>
+          </p:cNvPr>
+          <p:cNvSpPr txBox="1"/>
+          <p:nvPr/>
+        </p:nvSpPr>
+        <p:spPr>
+          <a:xfrm>
+            <a:off x="774916" y="1880409"/>
+            <a:ext cx="1715598" cy="492443"/>
+          </a:xfrm>
+          <a:prstGeom prst="rect">
+            <a:avLst/>
+          </a:prstGeom>
+          <a:noFill/>
+        </p:spPr>
+        <p:txBody>
+          <a:bodyPr wrap="none" rtlCol="0">
+            <a:spAutoFit/>
+          </a:bodyPr>
+          <a:lstStyle/>
+          <a:p>
+            <a:r>
+              <a:rPr lang="en-US" sz="1300"/>
+              <a:t>Check and create new </a:t>
+            </a:r>
+          </a:p>
+          <a:p>
+            <a:r>
+              <a:rPr lang="en-US" sz="1300" err="1"/>
+              <a:t>SessionHandler</a:t>
+            </a:r>
+            <a:r>
+              <a:rPr lang="en-US" sz="1300"/>
+              <a:t> Actor</a:t>
+            </a:r>
+          </a:p>
+        </p:txBody>
+      </p:sp>
+      <p:cxnSp>
+        <p:nvCxnSpPr>
+          <p:cNvPr id="81" name="Connector: Curved 80">
+            <a:extLst>
+              <a:ext uri="{FF2B5EF4-FFF2-40B4-BE49-F238E27FC236}">
+                <a16:creationId xmlns:a16="http://schemas.microsoft.com/office/drawing/2014/main" id="{E7BD2B6E-1614-72BA-861C-5E1A16D9DB7B}"/>
+              </a:ext>
+            </a:extLst>
+          </p:cNvPr>
+          <p:cNvCxnSpPr>
+            <a:stCxn id="4" idx="4"/>
+            <a:endCxn id="7" idx="1"/>
+          </p:cNvCxnSpPr>
+          <p:nvPr/>
+        </p:nvCxnSpPr>
+        <p:spPr>
+          <a:xfrm rot="16200000" flipH="1">
+            <a:off x="6009705" y="1392443"/>
+            <a:ext cx="1236640" cy="2180242"/>
+          </a:xfrm>
+          <a:prstGeom prst="curvedConnector3">
+            <a:avLst>
+              <a:gd name="adj1" fmla="val 50000"/>
+            </a:avLst>
+          </a:prstGeom>
+          <a:ln w="28575">
+            <a:solidFill>
+              <a:schemeClr val="accent6">
+                <a:lumMod val="75000"/>
+              </a:schemeClr>
+            </a:solidFill>
+            <a:tailEnd type="triangle"/>
+          </a:ln>
+        </p:spPr>
+        <p:style>
+          <a:lnRef idx="1">
+            <a:schemeClr val="accent1"/>
+          </a:lnRef>
+          <a:fillRef idx="0">
+            <a:schemeClr val="accent1"/>
+          </a:fillRef>
+          <a:effectRef idx="0">
+            <a:schemeClr val="accent1"/>
+          </a:effectRef>
+          <a:fontRef idx="minor">
+            <a:schemeClr val="tx1"/>
+          </a:fontRef>
+        </p:style>
+      </p:cxnSp>
+      <p:cxnSp>
+        <p:nvCxnSpPr>
+          <p:cNvPr id="84" name="Connector: Curved 83">
+            <a:extLst>
+              <a:ext uri="{FF2B5EF4-FFF2-40B4-BE49-F238E27FC236}">
+                <a16:creationId xmlns:a16="http://schemas.microsoft.com/office/drawing/2014/main" id="{DB13D366-F21A-CF98-A3A3-052B6F861817}"/>
+              </a:ext>
+            </a:extLst>
+          </p:cNvPr>
+          <p:cNvCxnSpPr>
+            <a:stCxn id="7" idx="3"/>
+            <a:endCxn id="6" idx="0"/>
+          </p:cNvCxnSpPr>
+          <p:nvPr/>
+        </p:nvCxnSpPr>
+        <p:spPr>
+          <a:xfrm rot="5400000">
+            <a:off x="5724305" y="3518959"/>
+            <a:ext cx="1961933" cy="2025750"/>
+          </a:xfrm>
+          <a:prstGeom prst="curvedConnector3">
+            <a:avLst/>
+          </a:prstGeom>
+          <a:ln w="28575">
+            <a:solidFill>
+              <a:schemeClr val="accent6">
+                <a:lumMod val="75000"/>
+              </a:schemeClr>
+            </a:solidFill>
+            <a:tailEnd type="triangle"/>
+          </a:ln>
+        </p:spPr>
+        <p:style>
+          <a:lnRef idx="1">
+            <a:schemeClr val="accent6"/>
+          </a:lnRef>
+          <a:fillRef idx="0">
+            <a:schemeClr val="accent6"/>
+          </a:fillRef>
+          <a:effectRef idx="0">
+            <a:schemeClr val="accent6"/>
+          </a:effectRef>
+          <a:fontRef idx="minor">
+            <a:schemeClr val="tx1"/>
+          </a:fontRef>
+        </p:style>
+      </p:cxnSp>
+      <p:sp>
+        <p:nvSpPr>
+          <p:cNvPr id="88" name="TextBox 87">
+            <a:extLst>
+              <a:ext uri="{FF2B5EF4-FFF2-40B4-BE49-F238E27FC236}">
+                <a16:creationId xmlns:a16="http://schemas.microsoft.com/office/drawing/2014/main" id="{61204FD1-8A10-C321-B66E-064487524B54}"/>
+              </a:ext>
+            </a:extLst>
+          </p:cNvPr>
+          <p:cNvSpPr txBox="1"/>
+          <p:nvPr/>
+        </p:nvSpPr>
+        <p:spPr>
+          <a:xfrm>
+            <a:off x="7760460" y="1016948"/>
+            <a:ext cx="1307089" cy="292388"/>
+          </a:xfrm>
+          <a:prstGeom prst="rect">
+            <a:avLst/>
+          </a:prstGeom>
+          <a:noFill/>
+        </p:spPr>
+        <p:txBody>
+          <a:bodyPr wrap="none" rtlCol="0">
+            <a:spAutoFit/>
+          </a:bodyPr>
+          <a:lstStyle/>
+          <a:p>
+            <a:r>
+              <a:rPr lang="en-US" sz="1300"/>
+              <a:t>Listen to devices</a:t>
+            </a:r>
+          </a:p>
+        </p:txBody>
+      </p:sp>
+      <p:sp>
+        <p:nvSpPr>
+          <p:cNvPr id="89" name="TextBox 88">
+            <a:extLst>
+              <a:ext uri="{FF2B5EF4-FFF2-40B4-BE49-F238E27FC236}">
+                <a16:creationId xmlns:a16="http://schemas.microsoft.com/office/drawing/2014/main" id="{15EBA0D4-CE92-EB87-438E-B992F1E60ACA}"/>
+              </a:ext>
+            </a:extLst>
+          </p:cNvPr>
+          <p:cNvSpPr txBox="1"/>
+          <p:nvPr/>
+        </p:nvSpPr>
+        <p:spPr>
+          <a:xfrm>
+            <a:off x="7760460" y="1404714"/>
+            <a:ext cx="2825902" cy="292388"/>
+          </a:xfrm>
+          <a:prstGeom prst="rect">
+            <a:avLst/>
+          </a:prstGeom>
+          <a:noFill/>
+        </p:spPr>
+        <p:txBody>
+          <a:bodyPr wrap="none" rtlCol="0">
+            <a:spAutoFit/>
+          </a:bodyPr>
+          <a:lstStyle/>
+          <a:p>
+            <a:r>
+              <a:rPr lang="en-US" sz="1300"/>
+              <a:t>Stream raw data to </a:t>
+            </a:r>
+            <a:r>
+              <a:rPr lang="en-US" sz="1300" err="1"/>
+              <a:t>PacketTransformer</a:t>
+            </a:r>
+            <a:r>
+              <a:rPr lang="en-US" sz="1300"/>
+              <a:t> </a:t>
+            </a:r>
+          </a:p>
+        </p:txBody>
+      </p:sp>
+      <p:cxnSp>
+        <p:nvCxnSpPr>
+          <p:cNvPr id="91" name="Straight Connector 90">
+            <a:extLst>
+              <a:ext uri="{FF2B5EF4-FFF2-40B4-BE49-F238E27FC236}">
+                <a16:creationId xmlns:a16="http://schemas.microsoft.com/office/drawing/2014/main" id="{0AE453DB-9EA4-D33B-1159-033DAD19084B}"/>
+              </a:ext>
+            </a:extLst>
+          </p:cNvPr>
+          <p:cNvCxnSpPr>
+            <a:stCxn id="4" idx="7"/>
+            <a:endCxn id="88" idx="1"/>
+          </p:cNvCxnSpPr>
+          <p:nvPr/>
+        </p:nvCxnSpPr>
+        <p:spPr>
+          <a:xfrm flipV="1">
+            <a:off x="6367971" y="1163142"/>
+            <a:ext cx="1392489" cy="75304"/>
+          </a:xfrm>
+          <a:prstGeom prst="line">
+            <a:avLst/>
+          </a:prstGeom>
+        </p:spPr>
+        <p:style>
+          <a:lnRef idx="1">
+            <a:schemeClr val="dk1"/>
+          </a:lnRef>
+          <a:fillRef idx="0">
+            <a:schemeClr val="dk1"/>
+          </a:fillRef>
+          <a:effectRef idx="0">
+            <a:schemeClr val="dk1"/>
+          </a:effectRef>
+          <a:fontRef idx="minor">
+            <a:schemeClr val="tx1"/>
+          </a:fontRef>
+        </p:style>
+      </p:cxnSp>
+      <p:sp>
+        <p:nvSpPr>
+          <p:cNvPr id="96" name="TextBox 95">
+            <a:extLst>
+              <a:ext uri="{FF2B5EF4-FFF2-40B4-BE49-F238E27FC236}">
+                <a16:creationId xmlns:a16="http://schemas.microsoft.com/office/drawing/2014/main" id="{24023960-4920-7185-305A-135CC3F2678B}"/>
+              </a:ext>
+            </a:extLst>
+          </p:cNvPr>
+          <p:cNvSpPr txBox="1"/>
+          <p:nvPr/>
+        </p:nvSpPr>
+        <p:spPr>
+          <a:xfrm>
+            <a:off x="1770405" y="1525938"/>
+            <a:ext cx="2385077" cy="292388"/>
+          </a:xfrm>
+          <a:prstGeom prst="rect">
+            <a:avLst/>
+          </a:prstGeom>
+          <a:noFill/>
+        </p:spPr>
+        <p:txBody>
+          <a:bodyPr wrap="none" rtlCol="0">
+            <a:spAutoFit/>
+          </a:bodyPr>
+          <a:lstStyle/>
+          <a:p>
+            <a:r>
+              <a:rPr lang="en-US" sz="1300"/>
+              <a:t>Implement tasks for each packet</a:t>
+            </a:r>
+          </a:p>
+        </p:txBody>
+      </p:sp>
+      <p:sp>
+        <p:nvSpPr>
+          <p:cNvPr id="97" name="TextBox 96">
+            <a:extLst>
+              <a:ext uri="{FF2B5EF4-FFF2-40B4-BE49-F238E27FC236}">
+                <a16:creationId xmlns:a16="http://schemas.microsoft.com/office/drawing/2014/main" id="{A5B1C2F5-E5EC-90F4-171B-420A5A131026}"/>
+              </a:ext>
+            </a:extLst>
+          </p:cNvPr>
+          <p:cNvSpPr txBox="1"/>
+          <p:nvPr/>
+        </p:nvSpPr>
+        <p:spPr>
+          <a:xfrm>
+            <a:off x="2935330" y="4579667"/>
+            <a:ext cx="1174681" cy="292388"/>
+          </a:xfrm>
+          <a:prstGeom prst="rect">
+            <a:avLst/>
+          </a:prstGeom>
+          <a:noFill/>
+        </p:spPr>
+        <p:txBody>
+          <a:bodyPr wrap="none" rtlCol="0">
+            <a:spAutoFit/>
+          </a:bodyPr>
+          <a:lstStyle/>
+          <a:p>
+            <a:r>
+              <a:rPr lang="en-US" sz="1300"/>
+              <a:t>Classify packet</a:t>
+            </a:r>
+          </a:p>
+        </p:txBody>
+      </p:sp>
+      <p:sp>
+        <p:nvSpPr>
+          <p:cNvPr id="98" name="TextBox 97">
+            <a:extLst>
+              <a:ext uri="{FF2B5EF4-FFF2-40B4-BE49-F238E27FC236}">
+                <a16:creationId xmlns:a16="http://schemas.microsoft.com/office/drawing/2014/main" id="{8348CB7F-06A9-DFAA-A346-5C6A2598729A}"/>
+              </a:ext>
+            </a:extLst>
+          </p:cNvPr>
+          <p:cNvSpPr txBox="1"/>
+          <p:nvPr/>
+        </p:nvSpPr>
+        <p:spPr>
+          <a:xfrm>
+            <a:off x="2762184" y="4287279"/>
+            <a:ext cx="1375633" cy="292388"/>
+          </a:xfrm>
+          <a:prstGeom prst="rect">
+            <a:avLst/>
+          </a:prstGeom>
+          <a:noFill/>
+        </p:spPr>
+        <p:txBody>
+          <a:bodyPr wrap="none" rtlCol="0">
+            <a:spAutoFit/>
+          </a:bodyPr>
+          <a:lstStyle/>
+          <a:p>
+            <a:r>
+              <a:rPr lang="en-US" sz="1300"/>
+              <a:t>Get packet’s </a:t>
+            </a:r>
+            <a:r>
+              <a:rPr lang="en-US" sz="1300" err="1"/>
+              <a:t>infor</a:t>
+            </a:r>
+            <a:endParaRPr lang="en-US" sz="1300"/>
+          </a:p>
+        </p:txBody>
+      </p:sp>
+      <p:cxnSp>
+        <p:nvCxnSpPr>
+          <p:cNvPr id="51" name="Straight Connector 50">
+            <a:extLst>
+              <a:ext uri="{FF2B5EF4-FFF2-40B4-BE49-F238E27FC236}">
+                <a16:creationId xmlns:a16="http://schemas.microsoft.com/office/drawing/2014/main" id="{D11620F7-8A8E-3BB3-8AC2-1ABAF54AAA29}"/>
+              </a:ext>
+            </a:extLst>
+          </p:cNvPr>
+          <p:cNvCxnSpPr>
+            <a:stCxn id="6" idx="5"/>
+            <a:endCxn id="56" idx="1"/>
+          </p:cNvCxnSpPr>
+          <p:nvPr/>
+        </p:nvCxnSpPr>
+        <p:spPr>
+          <a:xfrm flipV="1">
+            <a:off x="6578164" y="5873308"/>
+            <a:ext cx="1797006" cy="265291"/>
+          </a:xfrm>
+          <a:prstGeom prst="line">
+            <a:avLst/>
+          </a:prstGeom>
+        </p:spPr>
+        <p:style>
+          <a:lnRef idx="1">
+            <a:schemeClr val="dk1"/>
+          </a:lnRef>
+          <a:fillRef idx="0">
+            <a:schemeClr val="dk1"/>
+          </a:fillRef>
+          <a:effectRef idx="0">
+            <a:schemeClr val="dk1"/>
+          </a:effectRef>
+          <a:fontRef idx="minor">
+            <a:schemeClr val="tx1"/>
+          </a:fontRef>
+        </p:style>
+      </p:cxnSp>
+      <p:cxnSp>
+        <p:nvCxnSpPr>
+          <p:cNvPr id="54" name="Straight Connector 53">
+            <a:extLst>
+              <a:ext uri="{FF2B5EF4-FFF2-40B4-BE49-F238E27FC236}">
+                <a16:creationId xmlns:a16="http://schemas.microsoft.com/office/drawing/2014/main" id="{DF15BB7B-BC46-D9FD-E92D-F69B31BCFCE3}"/>
+              </a:ext>
+            </a:extLst>
+          </p:cNvPr>
+          <p:cNvCxnSpPr>
+            <a:stCxn id="6" idx="5"/>
+            <a:endCxn id="59" idx="1"/>
+          </p:cNvCxnSpPr>
+          <p:nvPr/>
+        </p:nvCxnSpPr>
+        <p:spPr>
+          <a:xfrm>
+            <a:off x="6578164" y="6138599"/>
+            <a:ext cx="1797006" cy="74988"/>
+          </a:xfrm>
+          <a:prstGeom prst="line">
+            <a:avLst/>
+          </a:prstGeom>
+        </p:spPr>
+        <p:style>
+          <a:lnRef idx="1">
+            <a:schemeClr val="dk1"/>
+          </a:lnRef>
+          <a:fillRef idx="0">
+            <a:schemeClr val="dk1"/>
+          </a:fillRef>
+          <a:effectRef idx="0">
+            <a:schemeClr val="dk1"/>
+          </a:effectRef>
+          <a:fontRef idx="minor">
+            <a:schemeClr val="tx1"/>
+          </a:fontRef>
+        </p:style>
+      </p:cxnSp>
+      <p:cxnSp>
+        <p:nvCxnSpPr>
+          <p:cNvPr id="64" name="Connector: Curved 63">
+            <a:extLst>
+              <a:ext uri="{FF2B5EF4-FFF2-40B4-BE49-F238E27FC236}">
+                <a16:creationId xmlns:a16="http://schemas.microsoft.com/office/drawing/2014/main" id="{22FC1696-E3D2-3DBB-5ED0-A1ED77213A8C}"/>
+              </a:ext>
+            </a:extLst>
+          </p:cNvPr>
+          <p:cNvCxnSpPr>
+            <a:cxnSpLocks/>
+            <a:stCxn id="6" idx="2"/>
+            <a:endCxn id="8" idx="4"/>
+          </p:cNvCxnSpPr>
+          <p:nvPr/>
+        </p:nvCxnSpPr>
+        <p:spPr>
+          <a:xfrm rot="10800000">
+            <a:off x="2016229" y="3212347"/>
+            <a:ext cx="2423503" cy="2667038"/>
+          </a:xfrm>
+          <a:prstGeom prst="curvedConnector2">
+            <a:avLst/>
+          </a:prstGeom>
+          <a:ln w="28575">
+            <a:solidFill>
+              <a:schemeClr val="tx1"/>
+            </a:solidFill>
+            <a:tailEnd type="triangle"/>
+          </a:ln>
+        </p:spPr>
+        <p:style>
+          <a:lnRef idx="1">
+            <a:schemeClr val="accent1"/>
+          </a:lnRef>
+          <a:fillRef idx="0">
+            <a:schemeClr val="accent1"/>
+          </a:fillRef>
+          <a:effectRef idx="0">
+            <a:schemeClr val="accent1"/>
+          </a:effectRef>
+          <a:fontRef idx="minor">
+            <a:schemeClr val="tx1"/>
+          </a:fontRef>
+        </p:style>
+      </p:cxnSp>
+      <p:cxnSp>
+        <p:nvCxnSpPr>
+          <p:cNvPr id="71" name="Straight Connector 70">
+            <a:extLst>
+              <a:ext uri="{FF2B5EF4-FFF2-40B4-BE49-F238E27FC236}">
+                <a16:creationId xmlns:a16="http://schemas.microsoft.com/office/drawing/2014/main" id="{11D5598C-6B2F-3885-69AA-6E2B415E0CD7}"/>
+              </a:ext>
+            </a:extLst>
+          </p:cNvPr>
+          <p:cNvCxnSpPr>
+            <a:stCxn id="4" idx="7"/>
+            <a:endCxn id="89" idx="1"/>
+          </p:cNvCxnSpPr>
+          <p:nvPr/>
+        </p:nvCxnSpPr>
+        <p:spPr>
+          <a:xfrm>
+            <a:off x="6367971" y="1238446"/>
+            <a:ext cx="1392489" cy="312462"/>
+          </a:xfrm>
+          <a:prstGeom prst="line">
+            <a:avLst/>
+          </a:prstGeom>
+        </p:spPr>
+        <p:style>
+          <a:lnRef idx="1">
+            <a:schemeClr val="dk1"/>
+          </a:lnRef>
+          <a:fillRef idx="0">
+            <a:schemeClr val="dk1"/>
+          </a:fillRef>
+          <a:effectRef idx="0">
+            <a:schemeClr val="dk1"/>
+          </a:effectRef>
+          <a:fontRef idx="minor">
+            <a:schemeClr val="tx1"/>
+          </a:fontRef>
+        </p:style>
+      </p:cxnSp>
+      <p:cxnSp>
+        <p:nvCxnSpPr>
+          <p:cNvPr id="78" name="Connector: Curved 77">
+            <a:extLst>
+              <a:ext uri="{FF2B5EF4-FFF2-40B4-BE49-F238E27FC236}">
+                <a16:creationId xmlns:a16="http://schemas.microsoft.com/office/drawing/2014/main" id="{728D551F-2FCC-7CC0-9544-BF76AD5A6A76}"/>
+              </a:ext>
+            </a:extLst>
+          </p:cNvPr>
+          <p:cNvCxnSpPr>
+            <a:stCxn id="8" idx="5"/>
+            <a:endCxn id="9" idx="2"/>
+          </p:cNvCxnSpPr>
+          <p:nvPr/>
+        </p:nvCxnSpPr>
+        <p:spPr>
+          <a:xfrm rot="16200000" flipH="1">
+            <a:off x="2860518" y="3090754"/>
+            <a:ext cx="945621" cy="974066"/>
+          </a:xfrm>
+          <a:prstGeom prst="curvedConnector2">
+            <a:avLst/>
+          </a:prstGeom>
+          <a:ln w="28575">
+            <a:solidFill>
+              <a:schemeClr val="accent6">
+                <a:lumMod val="75000"/>
+              </a:schemeClr>
+            </a:solidFill>
+            <a:tailEnd type="triangle"/>
+          </a:ln>
+        </p:spPr>
+        <p:style>
+          <a:lnRef idx="1">
+            <a:schemeClr val="accent1"/>
+          </a:lnRef>
+          <a:fillRef idx="0">
+            <a:schemeClr val="accent1"/>
+          </a:fillRef>
+          <a:effectRef idx="0">
+            <a:schemeClr val="accent1"/>
+          </a:effectRef>
+          <a:fontRef idx="minor">
+            <a:schemeClr val="tx1"/>
+          </a:fontRef>
+        </p:style>
+      </p:cxnSp>
+      <p:cxnSp>
+        <p:nvCxnSpPr>
+          <p:cNvPr id="80" name="Straight Connector 79">
+            <a:extLst>
+              <a:ext uri="{FF2B5EF4-FFF2-40B4-BE49-F238E27FC236}">
+                <a16:creationId xmlns:a16="http://schemas.microsoft.com/office/drawing/2014/main" id="{0955C3A1-15D9-3F75-8E7B-F59B2A20E17B}"/>
+              </a:ext>
+            </a:extLst>
+          </p:cNvPr>
+          <p:cNvCxnSpPr>
+            <a:stCxn id="9" idx="4"/>
+            <a:endCxn id="98" idx="3"/>
+          </p:cNvCxnSpPr>
+          <p:nvPr/>
+        </p:nvCxnSpPr>
+        <p:spPr>
+          <a:xfrm flipH="1">
+            <a:off x="4137817" y="4417182"/>
+            <a:ext cx="856436" cy="16291"/>
+          </a:xfrm>
+          <a:prstGeom prst="line">
+            <a:avLst/>
+          </a:prstGeom>
+        </p:spPr>
+        <p:style>
+          <a:lnRef idx="1">
+            <a:schemeClr val="dk1"/>
+          </a:lnRef>
+          <a:fillRef idx="0">
+            <a:schemeClr val="dk1"/>
+          </a:fillRef>
+          <a:effectRef idx="0">
+            <a:schemeClr val="dk1"/>
+          </a:effectRef>
+          <a:fontRef idx="minor">
+            <a:schemeClr val="tx1"/>
+          </a:fontRef>
+        </p:style>
+      </p:cxnSp>
+      <p:cxnSp>
+        <p:nvCxnSpPr>
+          <p:cNvPr id="83" name="Straight Connector 82">
+            <a:extLst>
+              <a:ext uri="{FF2B5EF4-FFF2-40B4-BE49-F238E27FC236}">
+                <a16:creationId xmlns:a16="http://schemas.microsoft.com/office/drawing/2014/main" id="{CB9E0BF7-F0C0-2136-8F3D-1BC9EA4E260E}"/>
+              </a:ext>
+            </a:extLst>
+          </p:cNvPr>
+          <p:cNvCxnSpPr>
+            <a:stCxn id="9" idx="4"/>
+            <a:endCxn id="97" idx="3"/>
+          </p:cNvCxnSpPr>
+          <p:nvPr/>
+        </p:nvCxnSpPr>
+        <p:spPr>
+          <a:xfrm flipH="1">
+            <a:off x="4110011" y="4417182"/>
+            <a:ext cx="884242" cy="308679"/>
+          </a:xfrm>
+          <a:prstGeom prst="line">
+            <a:avLst/>
+          </a:prstGeom>
+        </p:spPr>
+        <p:style>
+          <a:lnRef idx="1">
+            <a:schemeClr val="dk1"/>
+          </a:lnRef>
+          <a:fillRef idx="0">
+            <a:schemeClr val="dk1"/>
+          </a:fillRef>
+          <a:effectRef idx="0">
+            <a:schemeClr val="dk1"/>
+          </a:effectRef>
+          <a:fontRef idx="minor">
+            <a:schemeClr val="tx1"/>
+          </a:fontRef>
+        </p:style>
+      </p:cxnSp>
+      <p:cxnSp>
+        <p:nvCxnSpPr>
+          <p:cNvPr id="94" name="Straight Arrow Connector 93">
+            <a:extLst>
+              <a:ext uri="{FF2B5EF4-FFF2-40B4-BE49-F238E27FC236}">
+                <a16:creationId xmlns:a16="http://schemas.microsoft.com/office/drawing/2014/main" id="{D428ACF1-2BBC-261E-0457-5ABBE1C7EFF3}"/>
+              </a:ext>
+            </a:extLst>
+          </p:cNvPr>
+          <p:cNvCxnSpPr>
+            <a:stCxn id="5" idx="4"/>
+            <a:endCxn id="9" idx="0"/>
+          </p:cNvCxnSpPr>
+          <p:nvPr/>
+        </p:nvCxnSpPr>
+        <p:spPr>
+          <a:xfrm>
+            <a:off x="4302228" y="3163949"/>
+            <a:ext cx="692025" cy="520065"/>
+          </a:xfrm>
+          <a:prstGeom prst="straightConnector1">
+            <a:avLst/>
+          </a:prstGeom>
+          <a:ln w="28575">
+            <a:headEnd type="triangle"/>
+            <a:tailEnd type="triangle"/>
+          </a:ln>
+        </p:spPr>
+        <p:style>
+          <a:lnRef idx="1">
+            <a:schemeClr val="dk1"/>
+          </a:lnRef>
+          <a:fillRef idx="0">
+            <a:schemeClr val="dk1"/>
+          </a:fillRef>
+          <a:effectRef idx="0">
+            <a:schemeClr val="dk1"/>
+          </a:effectRef>
+          <a:fontRef idx="minor">
+            <a:schemeClr val="tx1"/>
+          </a:fontRef>
+        </p:style>
+      </p:cxnSp>
+      <p:cxnSp>
+        <p:nvCxnSpPr>
+          <p:cNvPr id="99" name="Straight Connector 98">
+            <a:extLst>
+              <a:ext uri="{FF2B5EF4-FFF2-40B4-BE49-F238E27FC236}">
+                <a16:creationId xmlns:a16="http://schemas.microsoft.com/office/drawing/2014/main" id="{97B1B3AF-2C14-B682-D5D8-7891374B3ADD}"/>
+              </a:ext>
+            </a:extLst>
+          </p:cNvPr>
+          <p:cNvCxnSpPr>
+            <a:stCxn id="7" idx="6"/>
+            <a:endCxn id="46" idx="1"/>
+          </p:cNvCxnSpPr>
+          <p:nvPr/>
+        </p:nvCxnSpPr>
+        <p:spPr>
+          <a:xfrm flipV="1">
+            <a:off x="9593783" y="2845763"/>
+            <a:ext cx="294455" cy="480113"/>
+          </a:xfrm>
+          <a:prstGeom prst="line">
+            <a:avLst/>
+          </a:prstGeom>
+        </p:spPr>
+        <p:style>
+          <a:lnRef idx="1">
+            <a:schemeClr val="dk1"/>
+          </a:lnRef>
+          <a:fillRef idx="0">
+            <a:schemeClr val="dk1"/>
+          </a:fillRef>
+          <a:effectRef idx="0">
+            <a:schemeClr val="dk1"/>
+          </a:effectRef>
+          <a:fontRef idx="minor">
+            <a:schemeClr val="tx1"/>
+          </a:fontRef>
+        </p:style>
+      </p:cxnSp>
+      <p:cxnSp>
+        <p:nvCxnSpPr>
+          <p:cNvPr id="102" name="Straight Connector 101">
+            <a:extLst>
+              <a:ext uri="{FF2B5EF4-FFF2-40B4-BE49-F238E27FC236}">
+                <a16:creationId xmlns:a16="http://schemas.microsoft.com/office/drawing/2014/main" id="{81AEA8AD-FAF2-3E97-4158-F35389BACAC8}"/>
+              </a:ext>
+            </a:extLst>
+          </p:cNvPr>
+          <p:cNvCxnSpPr>
+            <a:stCxn id="7" idx="6"/>
+            <a:endCxn id="49" idx="1"/>
+          </p:cNvCxnSpPr>
+          <p:nvPr/>
+        </p:nvCxnSpPr>
+        <p:spPr>
+          <a:xfrm flipV="1">
+            <a:off x="9593783" y="3265433"/>
+            <a:ext cx="399773" cy="60443"/>
+          </a:xfrm>
+          <a:prstGeom prst="line">
+            <a:avLst/>
+          </a:prstGeom>
+        </p:spPr>
+        <p:style>
+          <a:lnRef idx="1">
+            <a:schemeClr val="dk1"/>
+          </a:lnRef>
+          <a:fillRef idx="0">
+            <a:schemeClr val="dk1"/>
+          </a:fillRef>
+          <a:effectRef idx="0">
+            <a:schemeClr val="dk1"/>
+          </a:effectRef>
+          <a:fontRef idx="minor">
+            <a:schemeClr val="tx1"/>
+          </a:fontRef>
+        </p:style>
+      </p:cxnSp>
+      <p:cxnSp>
+        <p:nvCxnSpPr>
+          <p:cNvPr id="104" name="Straight Connector 103">
+            <a:extLst>
+              <a:ext uri="{FF2B5EF4-FFF2-40B4-BE49-F238E27FC236}">
+                <a16:creationId xmlns:a16="http://schemas.microsoft.com/office/drawing/2014/main" id="{15797E16-74F8-1005-8753-8C1E17563290}"/>
+              </a:ext>
+            </a:extLst>
+          </p:cNvPr>
+          <p:cNvCxnSpPr>
+            <a:stCxn id="7" idx="6"/>
+            <a:endCxn id="50" idx="1"/>
+          </p:cNvCxnSpPr>
+          <p:nvPr/>
+        </p:nvCxnSpPr>
+        <p:spPr>
+          <a:xfrm>
+            <a:off x="9593783" y="3325876"/>
+            <a:ext cx="371997" cy="382229"/>
+          </a:xfrm>
+          <a:prstGeom prst="line">
+            <a:avLst/>
+          </a:prstGeom>
+        </p:spPr>
+        <p:style>
+          <a:lnRef idx="1">
+            <a:schemeClr val="dk1"/>
+          </a:lnRef>
+          <a:fillRef idx="0">
+            <a:schemeClr val="dk1"/>
+          </a:fillRef>
+          <a:effectRef idx="0">
+            <a:schemeClr val="dk1"/>
+          </a:effectRef>
+          <a:fontRef idx="minor">
+            <a:schemeClr val="tx1"/>
+          </a:fontRef>
+        </p:style>
+      </p:cxnSp>
+      <p:cxnSp>
+        <p:nvCxnSpPr>
+          <p:cNvPr id="113" name="Connector: Curved 112">
+            <a:extLst>
+              <a:ext uri="{FF2B5EF4-FFF2-40B4-BE49-F238E27FC236}">
+                <a16:creationId xmlns:a16="http://schemas.microsoft.com/office/drawing/2014/main" id="{32913139-B9B8-B244-6D1E-24E25A4EA159}"/>
+              </a:ext>
+            </a:extLst>
+          </p:cNvPr>
+          <p:cNvCxnSpPr>
+            <a:stCxn id="4" idx="4"/>
+            <a:endCxn id="5" idx="0"/>
+          </p:cNvCxnSpPr>
+          <p:nvPr/>
+        </p:nvCxnSpPr>
+        <p:spPr>
+          <a:xfrm rot="5400000">
+            <a:off x="4588401" y="1578071"/>
+            <a:ext cx="663331" cy="1235676"/>
+          </a:xfrm>
+          <a:prstGeom prst="curvedConnector3">
+            <a:avLst/>
+          </a:prstGeom>
+          <a:ln w="28575">
+            <a:solidFill>
+              <a:schemeClr val="accent6">
+                <a:lumMod val="75000"/>
+              </a:schemeClr>
+            </a:solidFill>
+            <a:tailEnd type="triangle"/>
+          </a:ln>
+        </p:spPr>
+        <p:style>
+          <a:lnRef idx="1">
+            <a:schemeClr val="accent1"/>
+          </a:lnRef>
+          <a:fillRef idx="0">
+            <a:schemeClr val="accent1"/>
+          </a:fillRef>
+          <a:effectRef idx="0">
+            <a:schemeClr val="accent1"/>
+          </a:effectRef>
+          <a:fontRef idx="minor">
+            <a:schemeClr val="tx1"/>
+          </a:fontRef>
+        </p:style>
+      </p:cxnSp>
+      <p:cxnSp>
+        <p:nvCxnSpPr>
+          <p:cNvPr id="119" name="Connector: Curved 118">
+            <a:extLst>
+              <a:ext uri="{FF2B5EF4-FFF2-40B4-BE49-F238E27FC236}">
+                <a16:creationId xmlns:a16="http://schemas.microsoft.com/office/drawing/2014/main" id="{11557DC5-C7D1-A2F2-6BEB-7FA2AC0AF239}"/>
+              </a:ext>
+            </a:extLst>
+          </p:cNvPr>
+          <p:cNvCxnSpPr>
+            <a:stCxn id="4" idx="4"/>
+            <a:endCxn id="8" idx="0"/>
+          </p:cNvCxnSpPr>
+          <p:nvPr/>
+        </p:nvCxnSpPr>
+        <p:spPr>
+          <a:xfrm rot="5400000">
+            <a:off x="3469599" y="410873"/>
+            <a:ext cx="614935" cy="3521676"/>
+          </a:xfrm>
+          <a:prstGeom prst="curvedConnector3">
+            <a:avLst/>
+          </a:prstGeom>
+          <a:ln w="28575">
+            <a:solidFill>
+              <a:schemeClr val="accent6">
+                <a:lumMod val="75000"/>
+              </a:schemeClr>
+            </a:solidFill>
+            <a:tailEnd type="triangle"/>
+          </a:ln>
+        </p:spPr>
+        <p:style>
+          <a:lnRef idx="1">
+            <a:schemeClr val="accent1"/>
+          </a:lnRef>
+          <a:fillRef idx="0">
+            <a:schemeClr val="accent1"/>
+          </a:fillRef>
+          <a:effectRef idx="0">
+            <a:schemeClr val="accent1"/>
+          </a:effectRef>
+          <a:fontRef idx="minor">
+            <a:schemeClr val="tx1"/>
+          </a:fontRef>
+        </p:style>
+      </p:cxnSp>
+      <p:cxnSp>
+        <p:nvCxnSpPr>
+          <p:cNvPr id="121" name="Straight Connector 120">
+            <a:extLst>
+              <a:ext uri="{FF2B5EF4-FFF2-40B4-BE49-F238E27FC236}">
+                <a16:creationId xmlns:a16="http://schemas.microsoft.com/office/drawing/2014/main" id="{9A11AD75-49C9-5DF5-4D82-AAD458D19BC0}"/>
+              </a:ext>
+            </a:extLst>
+          </p:cNvPr>
+          <p:cNvCxnSpPr>
+            <a:stCxn id="5" idx="2"/>
+            <a:endCxn id="96" idx="2"/>
+          </p:cNvCxnSpPr>
+          <p:nvPr/>
+        </p:nvCxnSpPr>
+        <p:spPr>
+          <a:xfrm flipH="1" flipV="1">
+            <a:off x="2962944" y="1818326"/>
+            <a:ext cx="427972" cy="1027436"/>
+          </a:xfrm>
+          <a:prstGeom prst="line">
+            <a:avLst/>
+          </a:prstGeom>
+        </p:spPr>
+        <p:style>
+          <a:lnRef idx="1">
+            <a:schemeClr val="dk1"/>
+          </a:lnRef>
+          <a:fillRef idx="0">
+            <a:schemeClr val="dk1"/>
+          </a:fillRef>
+          <a:effectRef idx="0">
+            <a:schemeClr val="dk1"/>
+          </a:effectRef>
+          <a:fontRef idx="minor">
+            <a:schemeClr val="tx1"/>
+          </a:fontRef>
+        </p:style>
+      </p:cxnSp>
+      <p:cxnSp>
+        <p:nvCxnSpPr>
+          <p:cNvPr id="124" name="Straight Connector 123">
+            <a:extLst>
+              <a:ext uri="{FF2B5EF4-FFF2-40B4-BE49-F238E27FC236}">
+                <a16:creationId xmlns:a16="http://schemas.microsoft.com/office/drawing/2014/main" id="{5E66B919-87C8-DCF2-A40B-A02C23F9425E}"/>
+              </a:ext>
+            </a:extLst>
+          </p:cNvPr>
+          <p:cNvCxnSpPr>
+            <a:stCxn id="8" idx="1"/>
+            <a:endCxn id="68" idx="2"/>
+          </p:cNvCxnSpPr>
+          <p:nvPr/>
+        </p:nvCxnSpPr>
+        <p:spPr>
+          <a:xfrm flipV="1">
+            <a:off x="1186161" y="2372852"/>
+            <a:ext cx="446554" cy="213697"/>
+          </a:xfrm>
+          <a:prstGeom prst="line">
+            <a:avLst/>
+          </a:prstGeom>
+        </p:spPr>
+        <p:style>
+          <a:lnRef idx="1">
+            <a:schemeClr val="dk1"/>
+          </a:lnRef>
+          <a:fillRef idx="0">
+            <a:schemeClr val="dk1"/>
+          </a:fillRef>
+          <a:effectRef idx="0">
+            <a:schemeClr val="dk1"/>
+          </a:effectRef>
+          <a:fontRef idx="minor">
+            <a:schemeClr val="tx1"/>
+          </a:fontRef>
+        </p:style>
+      </p:cxnSp>
+      <p:sp>
+        <p:nvSpPr>
+          <p:cNvPr id="139" name="TextBox 138">
+            <a:extLst>
+              <a:ext uri="{FF2B5EF4-FFF2-40B4-BE49-F238E27FC236}">
+                <a16:creationId xmlns:a16="http://schemas.microsoft.com/office/drawing/2014/main" id="{CB5BE816-8752-526A-0B3E-73A7E2AA95FD}"/>
+              </a:ext>
+            </a:extLst>
+          </p:cNvPr>
+          <p:cNvSpPr txBox="1"/>
+          <p:nvPr/>
+        </p:nvSpPr>
+        <p:spPr>
+          <a:xfrm>
+            <a:off x="3057830" y="4912996"/>
+            <a:ext cx="1240532" cy="292388"/>
+          </a:xfrm>
+          <a:prstGeom prst="rect">
+            <a:avLst/>
+          </a:prstGeom>
+          <a:noFill/>
+        </p:spPr>
+        <p:txBody>
+          <a:bodyPr wrap="none" rtlCol="0">
+            <a:spAutoFit/>
+          </a:bodyPr>
+          <a:lstStyle/>
+          <a:p>
+            <a:r>
+              <a:rPr lang="en-US" sz="1300"/>
+              <a:t>Control process</a:t>
+            </a:r>
+          </a:p>
+        </p:txBody>
+      </p:sp>
+      <p:cxnSp>
+        <p:nvCxnSpPr>
+          <p:cNvPr id="141" name="Straight Connector 140">
+            <a:extLst>
+              <a:ext uri="{FF2B5EF4-FFF2-40B4-BE49-F238E27FC236}">
+                <a16:creationId xmlns:a16="http://schemas.microsoft.com/office/drawing/2014/main" id="{47BBFFCD-0E8F-243A-5F79-CDFC7339064E}"/>
+              </a:ext>
+            </a:extLst>
+          </p:cNvPr>
+          <p:cNvCxnSpPr>
+            <a:stCxn id="9" idx="4"/>
+            <a:endCxn id="139" idx="3"/>
+          </p:cNvCxnSpPr>
+          <p:nvPr/>
+        </p:nvCxnSpPr>
+        <p:spPr>
+          <a:xfrm flipH="1">
+            <a:off x="4298362" y="4417182"/>
+            <a:ext cx="695891" cy="642008"/>
+          </a:xfrm>
+          <a:prstGeom prst="line">
+            <a:avLst/>
+          </a:prstGeom>
+        </p:spPr>
+        <p:style>
+          <a:lnRef idx="1">
+            <a:schemeClr val="dk1"/>
+          </a:lnRef>
+          <a:fillRef idx="0">
+            <a:schemeClr val="dk1"/>
+          </a:fillRef>
+          <a:effectRef idx="0">
+            <a:schemeClr val="dk1"/>
+          </a:effectRef>
+          <a:fontRef idx="minor">
+            <a:schemeClr val="tx1"/>
+          </a:fontRef>
+        </p:style>
+      </p:cxnSp>
+      <p:sp>
+        <p:nvSpPr>
+          <p:cNvPr id="143" name="TextBox 142">
+            <a:extLst>
+              <a:ext uri="{FF2B5EF4-FFF2-40B4-BE49-F238E27FC236}">
+                <a16:creationId xmlns:a16="http://schemas.microsoft.com/office/drawing/2014/main" id="{D01A786B-3965-17D4-FE6C-B001E091927B}"/>
+              </a:ext>
+            </a:extLst>
+          </p:cNvPr>
+          <p:cNvSpPr txBox="1"/>
+          <p:nvPr/>
+        </p:nvSpPr>
+        <p:spPr>
+          <a:xfrm>
+            <a:off x="4453930" y="3100621"/>
+            <a:ext cx="1185517" cy="292388"/>
+          </a:xfrm>
+          <a:prstGeom prst="rect">
+            <a:avLst/>
+          </a:prstGeom>
+          <a:noFill/>
+        </p:spPr>
+        <p:txBody>
+          <a:bodyPr wrap="none" rtlCol="0">
+            <a:spAutoFit/>
+          </a:bodyPr>
+          <a:lstStyle/>
+          <a:p>
+            <a:r>
+              <a:rPr lang="en-US" sz="1300"/>
+              <a:t>! </a:t>
+            </a:r>
+            <a:r>
+              <a:rPr lang="en-US" sz="1300" err="1"/>
+              <a:t>Packet+event</a:t>
+            </a:r>
+            <a:endParaRPr lang="en-US" sz="1300"/>
+          </a:p>
+        </p:txBody>
+      </p:sp>
+      <p:sp>
+        <p:nvSpPr>
+          <p:cNvPr id="147" name="TextBox 146">
+            <a:extLst>
+              <a:ext uri="{FF2B5EF4-FFF2-40B4-BE49-F238E27FC236}">
+                <a16:creationId xmlns:a16="http://schemas.microsoft.com/office/drawing/2014/main" id="{E272B534-54E4-15AC-CE37-A571E55A15CC}"/>
+              </a:ext>
+            </a:extLst>
+          </p:cNvPr>
+          <p:cNvSpPr txBox="1"/>
+          <p:nvPr/>
+        </p:nvSpPr>
+        <p:spPr>
+          <a:xfrm>
+            <a:off x="1273974" y="5798327"/>
+            <a:ext cx="1851533" cy="492443"/>
+          </a:xfrm>
+          <a:prstGeom prst="rect">
+            <a:avLst/>
+          </a:prstGeom>
+          <a:noFill/>
+        </p:spPr>
+        <p:txBody>
+          <a:bodyPr wrap="none" rtlCol="0">
+            <a:spAutoFit/>
+          </a:bodyPr>
+          <a:lstStyle/>
+          <a:p>
+            <a:r>
+              <a:rPr lang="en-US" sz="1300"/>
+              <a:t>(!): tell – fire and forget</a:t>
+            </a:r>
+          </a:p>
+          <a:p>
+            <a:r>
+              <a:rPr lang="en-US" sz="1300"/>
+              <a:t>(?): ask – require answer</a:t>
+            </a:r>
+          </a:p>
+        </p:txBody>
+      </p:sp>
+      <p:sp>
+        <p:nvSpPr>
+          <p:cNvPr id="148" name="Rectangle 147">
+            <a:extLst>
+              <a:ext uri="{FF2B5EF4-FFF2-40B4-BE49-F238E27FC236}">
+                <a16:creationId xmlns:a16="http://schemas.microsoft.com/office/drawing/2014/main" id="{5584575C-C9BC-B20E-30A6-B653441D33EF}"/>
+              </a:ext>
+            </a:extLst>
+          </p:cNvPr>
+          <p:cNvSpPr/>
+          <p:nvPr/>
+        </p:nvSpPr>
+        <p:spPr>
+          <a:xfrm>
+            <a:off x="1278005" y="5798327"/>
+            <a:ext cx="1866142" cy="492443"/>
+          </a:xfrm>
+          <a:prstGeom prst="rect">
+            <a:avLst/>
+          </a:prstGeom>
+          <a:noFill/>
+          <a:ln w="28575" cap="flat" cmpd="sng" algn="ctr">
+            <a:solidFill>
+              <a:srgbClr val="FF0000"/>
+            </a:solidFill>
+            <a:prstDash val="solid"/>
+            <a:round/>
+            <a:headEnd type="none" w="med" len="med"/>
+            <a:tailEnd type="none" w="med" len="med"/>
+          </a:ln>
+        </p:spPr>
+        <p:style>
+          <a:lnRef idx="0">
+            <a:scrgbClr r="0" g="0" b="0"/>
+          </a:lnRef>
+          <a:fillRef idx="0">
+            <a:scrgbClr r="0" g="0" b="0"/>
+          </a:fillRef>
+          <a:effectRef idx="0">
+            <a:scrgbClr r="0" g="0" b="0"/>
+          </a:effectRef>
+          <a:fontRef idx="minor">
+            <a:schemeClr val="accent2"/>
+          </a:fontRef>
+        </p:style>
+        <p:txBody>
+          <a:bodyPr rtlCol="0" anchor="ctr"/>
+          <a:lstStyle/>
+          <a:p>
+            <a:pPr algn="ctr"/>
+            <a:endParaRPr lang="en-US"/>
+          </a:p>
+        </p:txBody>
+      </p:sp>
+      <p:cxnSp>
+        <p:nvCxnSpPr>
+          <p:cNvPr id="167" name="Connector: Curved 166">
+            <a:extLst>
+              <a:ext uri="{FF2B5EF4-FFF2-40B4-BE49-F238E27FC236}">
+                <a16:creationId xmlns:a16="http://schemas.microsoft.com/office/drawing/2014/main" id="{0CDEB4F8-84DA-9290-6757-87826582D141}"/>
+              </a:ext>
+            </a:extLst>
+          </p:cNvPr>
+          <p:cNvCxnSpPr>
+            <a:stCxn id="9" idx="5"/>
+            <a:endCxn id="6" idx="1"/>
+          </p:cNvCxnSpPr>
+          <p:nvPr/>
+        </p:nvCxnSpPr>
+        <p:spPr>
+          <a:xfrm rot="5400000">
+            <a:off x="4660295" y="4456145"/>
+            <a:ext cx="1310359" cy="1017692"/>
+          </a:xfrm>
+          <a:prstGeom prst="curvedConnector3">
+            <a:avLst/>
+          </a:prstGeom>
+          <a:ln w="28575">
+            <a:solidFill>
+              <a:schemeClr val="tx1"/>
+            </a:solidFill>
+            <a:headEnd type="triangle"/>
+            <a:tailEnd type="triangle"/>
+          </a:ln>
+        </p:spPr>
+        <p:style>
+          <a:lnRef idx="1">
+            <a:schemeClr val="accent1"/>
+          </a:lnRef>
+          <a:fillRef idx="0">
+            <a:schemeClr val="accent1"/>
+          </a:fillRef>
+          <a:effectRef idx="0">
+            <a:schemeClr val="accent1"/>
+          </a:effectRef>
+          <a:fontRef idx="minor">
+            <a:schemeClr val="tx1"/>
+          </a:fontRef>
+        </p:style>
+      </p:cxnSp>
+      <p:sp>
+        <p:nvSpPr>
+          <p:cNvPr id="168" name="TextBox 167">
+            <a:extLst>
+              <a:ext uri="{FF2B5EF4-FFF2-40B4-BE49-F238E27FC236}">
+                <a16:creationId xmlns:a16="http://schemas.microsoft.com/office/drawing/2014/main" id="{B445A428-1F6C-2DF4-AD0B-307BF7D905BB}"/>
+              </a:ext>
+            </a:extLst>
+          </p:cNvPr>
+          <p:cNvSpPr txBox="1"/>
+          <p:nvPr/>
+        </p:nvSpPr>
+        <p:spPr>
+          <a:xfrm rot="17847370">
+            <a:off x="5312842" y="4611919"/>
+            <a:ext cx="1009828" cy="276999"/>
+          </a:xfrm>
+          <a:prstGeom prst="rect">
+            <a:avLst/>
+          </a:prstGeom>
+          <a:noFill/>
+        </p:spPr>
+        <p:txBody>
+          <a:bodyPr wrap="none" rtlCol="0">
+            <a:spAutoFit/>
+          </a:bodyPr>
+          <a:lstStyle/>
+          <a:p>
+            <a:r>
+              <a:rPr lang="en-US" sz="1200"/>
+              <a:t>! Packet Infor</a:t>
+            </a:r>
+          </a:p>
+        </p:txBody>
+      </p:sp>
+      <p:sp>
+        <p:nvSpPr>
+          <p:cNvPr id="169" name="TextBox 168">
+            <a:extLst>
+              <a:ext uri="{FF2B5EF4-FFF2-40B4-BE49-F238E27FC236}">
+                <a16:creationId xmlns:a16="http://schemas.microsoft.com/office/drawing/2014/main" id="{5C1DEE2F-4B32-643B-6989-ECF4C7A6971C}"/>
+              </a:ext>
+            </a:extLst>
+          </p:cNvPr>
+          <p:cNvSpPr txBox="1"/>
+          <p:nvPr/>
+        </p:nvSpPr>
+        <p:spPr>
+          <a:xfrm rot="16846335">
+            <a:off x="7973151" y="3823034"/>
+            <a:ext cx="673582" cy="276999"/>
+          </a:xfrm>
+          <a:prstGeom prst="rect">
+            <a:avLst/>
+          </a:prstGeom>
+          <a:noFill/>
+        </p:spPr>
+        <p:txBody>
+          <a:bodyPr wrap="none" rtlCol="0">
+            <a:spAutoFit/>
+          </a:bodyPr>
+          <a:lstStyle/>
+          <a:p>
+            <a:r>
+              <a:rPr lang="en-US" sz="1200"/>
+              <a:t>! Action</a:t>
+            </a:r>
+          </a:p>
+        </p:txBody>
+      </p:sp>
+      <p:sp>
+        <p:nvSpPr>
+          <p:cNvPr id="181" name="TextBox 180">
+            <a:extLst>
+              <a:ext uri="{FF2B5EF4-FFF2-40B4-BE49-F238E27FC236}">
+                <a16:creationId xmlns:a16="http://schemas.microsoft.com/office/drawing/2014/main" id="{18FA430E-60E3-F779-3C20-88B861F782FF}"/>
+              </a:ext>
+            </a:extLst>
+          </p:cNvPr>
+          <p:cNvSpPr txBox="1"/>
+          <p:nvPr/>
+        </p:nvSpPr>
+        <p:spPr>
+          <a:xfrm rot="17847370">
+            <a:off x="4321626" y="5135992"/>
+            <a:ext cx="964688" cy="276999"/>
+          </a:xfrm>
+          <a:prstGeom prst="rect">
+            <a:avLst/>
+          </a:prstGeom>
+          <a:noFill/>
+        </p:spPr>
+        <p:txBody>
+          <a:bodyPr wrap="none" rtlCol="0">
+            <a:spAutoFit/>
+          </a:bodyPr>
+          <a:lstStyle/>
+          <a:p>
+            <a:r>
+              <a:rPr lang="en-US" sz="1200"/>
+              <a:t>! ACK Packet</a:t>
+            </a:r>
+          </a:p>
+        </p:txBody>
+      </p:sp>
+      <p:sp>
+        <p:nvSpPr>
+          <p:cNvPr id="183" name="TextBox 182">
+            <a:extLst>
+              <a:ext uri="{FF2B5EF4-FFF2-40B4-BE49-F238E27FC236}">
+                <a16:creationId xmlns:a16="http://schemas.microsoft.com/office/drawing/2014/main" id="{3AC2EDA5-18CE-1132-9982-EA9D3C11E05C}"/>
+              </a:ext>
+            </a:extLst>
+          </p:cNvPr>
+          <p:cNvSpPr txBox="1"/>
+          <p:nvPr/>
+        </p:nvSpPr>
+        <p:spPr>
+          <a:xfrm>
+            <a:off x="4318294" y="3454691"/>
+            <a:ext cx="593047" cy="292388"/>
+          </a:xfrm>
+          <a:prstGeom prst="rect">
+            <a:avLst/>
+          </a:prstGeom>
+          <a:noFill/>
+        </p:spPr>
+        <p:txBody>
+          <a:bodyPr wrap="none" rtlCol="0">
+            <a:spAutoFit/>
+          </a:bodyPr>
+          <a:lstStyle/>
+          <a:p>
+            <a:r>
+              <a:rPr lang="en-US" sz="1300"/>
+              <a:t>! Data</a:t>
+            </a:r>
+          </a:p>
+        </p:txBody>
+      </p:sp>
+      <p:sp>
+        <p:nvSpPr>
+          <p:cNvPr id="2" name="Oval 1">
+            <a:extLst>
+              <a:ext uri="{FF2B5EF4-FFF2-40B4-BE49-F238E27FC236}">
+                <a16:creationId xmlns:a16="http://schemas.microsoft.com/office/drawing/2014/main" id="{085B718B-5489-5CE1-4DE2-10143C674F51}"/>
+              </a:ext>
+            </a:extLst>
+          </p:cNvPr>
+          <p:cNvSpPr/>
+          <p:nvPr/>
+        </p:nvSpPr>
+        <p:spPr>
+          <a:xfrm>
+            <a:off x="2387176" y="722445"/>
+            <a:ext cx="1605887" cy="501488"/>
+          </a:xfrm>
+          <a:prstGeom prst="ellipse">
+            <a:avLst/>
+          </a:prstGeom>
+          <a:noFill/>
+          <a:ln w="28575" cap="flat" cmpd="sng" algn="ctr">
+            <a:solidFill>
+              <a:schemeClr val="dk1"/>
+            </a:solidFill>
+            <a:prstDash val="solid"/>
+            <a:round/>
+            <a:headEnd type="none" w="med" len="med"/>
+            <a:tailEnd type="none" w="med" len="med"/>
+          </a:ln>
+        </p:spPr>
+        <p:style>
+          <a:lnRef idx="0">
+            <a:scrgbClr r="0" g="0" b="0"/>
+          </a:lnRef>
+          <a:fillRef idx="0">
+            <a:scrgbClr r="0" g="0" b="0"/>
+          </a:fillRef>
+          <a:effectRef idx="0">
+            <a:scrgbClr r="0" g="0" b="0"/>
+          </a:effectRef>
+          <a:fontRef idx="minor">
+            <a:schemeClr val="dk1"/>
+          </a:fontRef>
+        </p:style>
+        <p:txBody>
+          <a:bodyPr rtlCol="0" anchor="ctr"/>
+          <a:lstStyle/>
+          <a:p>
+            <a:pPr algn="ctr"/>
+            <a:r>
+              <a:rPr lang="en-US" sz="1300" b="1">
+                <a:highlight>
+                  <a:srgbClr val="FFFF00"/>
+                </a:highlight>
+              </a:rPr>
+              <a:t>HTTPHandler</a:t>
+            </a:r>
+          </a:p>
+        </p:txBody>
+      </p:sp>
+      <p:sp>
+        <p:nvSpPr>
+          <p:cNvPr id="3" name="TextBox 2">
+            <a:extLst>
+              <a:ext uri="{FF2B5EF4-FFF2-40B4-BE49-F238E27FC236}">
+                <a16:creationId xmlns:a16="http://schemas.microsoft.com/office/drawing/2014/main" id="{52BE99E1-D19F-715E-8D2C-9B5F8A7191D4}"/>
+              </a:ext>
+            </a:extLst>
+          </p:cNvPr>
+          <p:cNvSpPr txBox="1"/>
+          <p:nvPr/>
+        </p:nvSpPr>
+        <p:spPr>
+          <a:xfrm>
+            <a:off x="4646307" y="649831"/>
+            <a:ext cx="1719766" cy="292388"/>
+          </a:xfrm>
+          <a:prstGeom prst="rect">
+            <a:avLst/>
+          </a:prstGeom>
+          <a:noFill/>
+        </p:spPr>
+        <p:txBody>
+          <a:bodyPr wrap="none" rtlCol="0">
+            <a:spAutoFit/>
+          </a:bodyPr>
+          <a:lstStyle/>
+          <a:p>
+            <a:r>
+              <a:rPr lang="en-US" sz="1300"/>
+              <a:t>HTTP-MQTT Converter</a:t>
+            </a:r>
+          </a:p>
+        </p:txBody>
+      </p:sp>
+      <p:cxnSp>
+        <p:nvCxnSpPr>
+          <p:cNvPr id="11" name="Connector: Curved 10">
+            <a:extLst>
+              <a:ext uri="{FF2B5EF4-FFF2-40B4-BE49-F238E27FC236}">
+                <a16:creationId xmlns:a16="http://schemas.microsoft.com/office/drawing/2014/main" id="{E4EACA28-DC7C-8477-C5F2-CD3905D3CF0F}"/>
+              </a:ext>
+            </a:extLst>
+          </p:cNvPr>
+          <p:cNvCxnSpPr>
+            <a:cxnSpLocks/>
+            <a:stCxn id="4" idx="2"/>
+            <a:endCxn id="2" idx="4"/>
+          </p:cNvCxnSpPr>
+          <p:nvPr/>
+        </p:nvCxnSpPr>
+        <p:spPr>
+          <a:xfrm rot="10800000">
+            <a:off x="3190120" y="1223934"/>
+            <a:ext cx="1173892" cy="273727"/>
+          </a:xfrm>
+          <a:prstGeom prst="curvedConnector2">
+            <a:avLst/>
+          </a:prstGeom>
+          <a:ln w="28575">
+            <a:tailEnd type="triangle"/>
+          </a:ln>
+        </p:spPr>
+        <p:style>
+          <a:lnRef idx="2">
+            <a:schemeClr val="accent6"/>
+          </a:lnRef>
+          <a:fillRef idx="0">
+            <a:schemeClr val="accent6"/>
+          </a:fillRef>
+          <a:effectRef idx="1">
+            <a:schemeClr val="accent6"/>
+          </a:effectRef>
+          <a:fontRef idx="minor">
+            <a:schemeClr val="tx1"/>
+          </a:fontRef>
+        </p:style>
+      </p:cxnSp>
+      <p:cxnSp>
+        <p:nvCxnSpPr>
+          <p:cNvPr id="13" name="Straight Connector 12">
+            <a:extLst>
+              <a:ext uri="{FF2B5EF4-FFF2-40B4-BE49-F238E27FC236}">
+                <a16:creationId xmlns:a16="http://schemas.microsoft.com/office/drawing/2014/main" id="{0BDEF290-0BCB-AC55-2347-4900D248E235}"/>
+              </a:ext>
+            </a:extLst>
+          </p:cNvPr>
+          <p:cNvCxnSpPr>
+            <a:stCxn id="2" idx="6"/>
+            <a:endCxn id="3" idx="1"/>
+          </p:cNvCxnSpPr>
+          <p:nvPr/>
+        </p:nvCxnSpPr>
+        <p:spPr>
+          <a:xfrm flipV="1">
+            <a:off x="3993063" y="796025"/>
+            <a:ext cx="653244" cy="177164"/>
+          </a:xfrm>
+          <a:prstGeom prst="line">
+            <a:avLst/>
+          </a:prstGeom>
+        </p:spPr>
+        <p:style>
+          <a:lnRef idx="1">
+            <a:schemeClr val="dk1"/>
+          </a:lnRef>
+          <a:fillRef idx="0">
+            <a:schemeClr val="dk1"/>
+          </a:fillRef>
+          <a:effectRef idx="0">
+            <a:schemeClr val="dk1"/>
+          </a:effectRef>
+          <a:fontRef idx="minor">
+            <a:schemeClr val="tx1"/>
+          </a:fontRef>
+        </p:style>
+      </p:cxnSp>
+    </p:spTree>
+    <p:extLst>
+      <p:ext uri="{BB962C8B-B14F-4D97-AF65-F5344CB8AC3E}">
+        <p14:creationId xmlns:p14="http://schemas.microsoft.com/office/powerpoint/2010/main" val="3070436604"/>
+      </p:ext>
+    </p:extLst>
+  </p:cSld>
+  <p:clrMapOvr>
+    <a:masterClrMapping/>
+  </p:clrMapOvr>
+</p:sld>
+</file>
+
 <file path=ppt/theme/theme1.xml><?xml version="1.0" encoding="utf-8"?>
 <a:theme xmlns:a="http://schemas.openxmlformats.org/drawingml/2006/main" name="Office Theme">
   <a:themeElements>

</xml_diff>